<commit_message>
update Figure 1 with lambda subscripts
</commit_message>
<xml_diff>
--- a/figs/labeled_realistic_membrane.pptx
+++ b/figs/labeled_realistic_membrane.pptx
@@ -104,6 +104,11 @@
       </a:defRPr>
     </a:lvl9pPr>
   </p:defaultTextStyle>
+  <p:extLst>
+    <p:ext uri="{EFAFB233-063F-42B5-8137-9DF3F51BA10A}">
+      <p15:sldGuideLst xmlns:p15="http://schemas.microsoft.com/office/powerpoint/2012/main"/>
+    </p:ext>
+  </p:extLst>
 </p:presentation>
 </file>
 
@@ -254,7 +259,7 @@
           <a:p>
             <a:fld id="{3FE4A416-97FA-944C-BA97-257286476C07}" type="datetimeFigureOut">
               <a:rPr lang="en-US" smtClean="0"/>
-              <a:t>12/19/23</a:t>
+              <a:t>2/1/24</a:t>
             </a:fld>
             <a:endParaRPr lang="en-US"/>
           </a:p>
@@ -452,7 +457,7 @@
           <a:p>
             <a:fld id="{3FE4A416-97FA-944C-BA97-257286476C07}" type="datetimeFigureOut">
               <a:rPr lang="en-US" smtClean="0"/>
-              <a:t>12/19/23</a:t>
+              <a:t>2/1/24</a:t>
             </a:fld>
             <a:endParaRPr lang="en-US"/>
           </a:p>
@@ -660,7 +665,7 @@
           <a:p>
             <a:fld id="{3FE4A416-97FA-944C-BA97-257286476C07}" type="datetimeFigureOut">
               <a:rPr lang="en-US" smtClean="0"/>
-              <a:t>12/19/23</a:t>
+              <a:t>2/1/24</a:t>
             </a:fld>
             <a:endParaRPr lang="en-US"/>
           </a:p>
@@ -858,7 +863,7 @@
           <a:p>
             <a:fld id="{3FE4A416-97FA-944C-BA97-257286476C07}" type="datetimeFigureOut">
               <a:rPr lang="en-US" smtClean="0"/>
-              <a:t>12/19/23</a:t>
+              <a:t>2/1/24</a:t>
             </a:fld>
             <a:endParaRPr lang="en-US"/>
           </a:p>
@@ -1133,7 +1138,7 @@
           <a:p>
             <a:fld id="{3FE4A416-97FA-944C-BA97-257286476C07}" type="datetimeFigureOut">
               <a:rPr lang="en-US" smtClean="0"/>
-              <a:t>12/19/23</a:t>
+              <a:t>2/1/24</a:t>
             </a:fld>
             <a:endParaRPr lang="en-US"/>
           </a:p>
@@ -1398,7 +1403,7 @@
           <a:p>
             <a:fld id="{3FE4A416-97FA-944C-BA97-257286476C07}" type="datetimeFigureOut">
               <a:rPr lang="en-US" smtClean="0"/>
-              <a:t>12/19/23</a:t>
+              <a:t>2/1/24</a:t>
             </a:fld>
             <a:endParaRPr lang="en-US"/>
           </a:p>
@@ -1810,7 +1815,7 @@
           <a:p>
             <a:fld id="{3FE4A416-97FA-944C-BA97-257286476C07}" type="datetimeFigureOut">
               <a:rPr lang="en-US" smtClean="0"/>
-              <a:t>12/19/23</a:t>
+              <a:t>2/1/24</a:t>
             </a:fld>
             <a:endParaRPr lang="en-US"/>
           </a:p>
@@ -1951,7 +1956,7 @@
           <a:p>
             <a:fld id="{3FE4A416-97FA-944C-BA97-257286476C07}" type="datetimeFigureOut">
               <a:rPr lang="en-US" smtClean="0"/>
-              <a:t>12/19/23</a:t>
+              <a:t>2/1/24</a:t>
             </a:fld>
             <a:endParaRPr lang="en-US"/>
           </a:p>
@@ -2064,7 +2069,7 @@
           <a:p>
             <a:fld id="{3FE4A416-97FA-944C-BA97-257286476C07}" type="datetimeFigureOut">
               <a:rPr lang="en-US" smtClean="0"/>
-              <a:t>12/19/23</a:t>
+              <a:t>2/1/24</a:t>
             </a:fld>
             <a:endParaRPr lang="en-US"/>
           </a:p>
@@ -2375,7 +2380,7 @@
           <a:p>
             <a:fld id="{3FE4A416-97FA-944C-BA97-257286476C07}" type="datetimeFigureOut">
               <a:rPr lang="en-US" smtClean="0"/>
-              <a:t>12/19/23</a:t>
+              <a:t>2/1/24</a:t>
             </a:fld>
             <a:endParaRPr lang="en-US"/>
           </a:p>
@@ -2663,7 +2668,7 @@
           <a:p>
             <a:fld id="{3FE4A416-97FA-944C-BA97-257286476C07}" type="datetimeFigureOut">
               <a:rPr lang="en-US" smtClean="0"/>
-              <a:t>12/19/23</a:t>
+              <a:t>2/1/24</a:t>
             </a:fld>
             <a:endParaRPr lang="en-US"/>
           </a:p>
@@ -2904,7 +2909,7 @@
           <a:p>
             <a:fld id="{3FE4A416-97FA-944C-BA97-257286476C07}" type="datetimeFigureOut">
               <a:rPr lang="en-US" smtClean="0"/>
-              <a:t>12/19/23</a:t>
+              <a:t>2/1/24</a:t>
             </a:fld>
             <a:endParaRPr lang="en-US"/>
           </a:p>
@@ -3479,8 +3484,8 @@
               </a:fontRef>
             </p:style>
           </p:cxnSp>
-          <mc:AlternateContent xmlns:mc="http://schemas.openxmlformats.org/markup-compatibility/2006">
-            <mc:Choice xmlns:a14="http://schemas.microsoft.com/office/drawing/2010/main" Requires="a14">
+          <mc:AlternateContent xmlns:mc="http://schemas.openxmlformats.org/markup-compatibility/2006" xmlns:a14="http://schemas.microsoft.com/office/drawing/2010/main">
+            <mc:Choice Requires="a14">
               <p:sp>
                 <p:nvSpPr>
                   <p:cNvPr id="18" name="TextBox 17">
@@ -3549,7 +3554,7 @@
                 </p:txBody>
               </p:sp>
             </mc:Choice>
-            <mc:Fallback>
+            <mc:Fallback xmlns="">
               <p:sp>
                 <p:nvSpPr>
                   <p:cNvPr id="18" name="TextBox 17">
@@ -3594,8 +3599,8 @@
               </p:sp>
             </mc:Fallback>
           </mc:AlternateContent>
-          <mc:AlternateContent xmlns:mc="http://schemas.openxmlformats.org/markup-compatibility/2006">
-            <mc:Choice xmlns:a14="http://schemas.microsoft.com/office/drawing/2010/main" Requires="a14">
+          <mc:AlternateContent xmlns:mc="http://schemas.openxmlformats.org/markup-compatibility/2006" xmlns:a14="http://schemas.microsoft.com/office/drawing/2010/main">
+            <mc:Choice Requires="a14">
               <p:sp>
                 <p:nvSpPr>
                   <p:cNvPr id="19" name="TextBox 18">
@@ -3664,7 +3669,7 @@
                 </p:txBody>
               </p:sp>
             </mc:Choice>
-            <mc:Fallback>
+            <mc:Fallback xmlns="">
               <p:sp>
                 <p:nvSpPr>
                   <p:cNvPr id="19" name="TextBox 18">
@@ -4405,8 +4410,8 @@
             </p:txBody>
           </p:sp>
         </p:grpSp>
-        <mc:AlternateContent xmlns:mc="http://schemas.openxmlformats.org/markup-compatibility/2006">
-          <mc:Choice xmlns:a14="http://schemas.microsoft.com/office/drawing/2010/main" Requires="a14">
+        <mc:AlternateContent xmlns:mc="http://schemas.openxmlformats.org/markup-compatibility/2006" xmlns:a14="http://schemas.microsoft.com/office/drawing/2010/main">
+          <mc:Choice Requires="a14">
             <p:sp>
               <p:nvSpPr>
                 <p:cNvPr id="33" name="TextBox 32">
@@ -4435,6 +4440,7 @@
                 </a:bodyPr>
                 <a:lstStyle/>
                 <a:p>
+                  <a:pPr/>
                   <a14:m>
                     <m:oMathPara xmlns:m="http://schemas.openxmlformats.org/officeDocument/2006/math">
                       <m:oMathParaPr>
@@ -4475,7 +4481,7 @@
               </p:txBody>
             </p:sp>
           </mc:Choice>
-          <mc:Fallback>
+          <mc:Fallback xmlns="">
             <p:sp>
               <p:nvSpPr>
                 <p:cNvPr id="33" name="TextBox 32">
@@ -4556,8 +4562,8 @@
                 </p:nvSpPr>
                 <p:spPr>
                   <a:xfrm>
-                    <a:off x="2966489" y="4213148"/>
-                    <a:ext cx="273858" cy="430887"/>
+                    <a:off x="2873352" y="4213148"/>
+                    <a:ext cx="658963" cy="430887"/>
                   </a:xfrm>
                   <a:prstGeom prst="rect">
                     <a:avLst/>
@@ -4577,12 +4583,31 @@
                           <m:jc m:val="centerGroup"/>
                         </m:oMathParaPr>
                         <m:oMath xmlns:m="http://schemas.openxmlformats.org/officeDocument/2006/math">
-                          <m:r>
-                            <a:rPr lang="en-US" sz="2800" i="1" smtClean="0">
-                              <a:latin typeface="Cambria Math" panose="02040503050406030204" pitchFamily="18" charset="0"/>
-                            </a:rPr>
-                            <m:t>𝜆</m:t>
-                          </m:r>
+                          <m:sSub>
+                            <m:sSubPr>
+                              <m:ctrlPr>
+                                <a:rPr lang="en-US" sz="2800" b="0" i="1" smtClean="0">
+                                  <a:latin typeface="Cambria Math" panose="02040503050406030204" pitchFamily="18" charset="0"/>
+                                </a:rPr>
+                              </m:ctrlPr>
+                            </m:sSubPr>
+                            <m:e>
+                              <m:r>
+                                <a:rPr lang="en-US" sz="2800" i="1" smtClean="0">
+                                  <a:latin typeface="Cambria Math" panose="02040503050406030204" pitchFamily="18" charset="0"/>
+                                </a:rPr>
+                                <m:t>𝜆</m:t>
+                              </m:r>
+                            </m:e>
+                            <m:sub>
+                              <m:r>
+                                <a:rPr lang="en-US" sz="2800" b="0" i="1" smtClean="0">
+                                  <a:latin typeface="Cambria Math" panose="02040503050406030204" pitchFamily="18" charset="0"/>
+                                </a:rPr>
+                                <m:t>𝑠𝑚</m:t>
+                              </m:r>
+                            </m:sub>
+                          </m:sSub>
                         </m:oMath>
                       </m:oMathPara>
                     </a14:m>
@@ -4608,8 +4633,8 @@
                 </p:nvSpPr>
                 <p:spPr>
                   <a:xfrm>
-                    <a:off x="2966489" y="4213148"/>
-                    <a:ext cx="273858" cy="430887"/>
+                    <a:off x="2873352" y="4213148"/>
+                    <a:ext cx="658963" cy="430887"/>
                   </a:xfrm>
                   <a:prstGeom prst="rect">
                     <a:avLst/>
@@ -4617,7 +4642,7 @@
                   <a:blipFill>
                     <a:blip r:embed="rId6"/>
                     <a:stretch>
-                      <a:fillRect l="-30435" r="-26087" b="-8824"/>
+                      <a:fillRect l="-13462" r="-1923" b="-11765"/>
                     </a:stretch>
                   </a:blipFill>
                 </p:spPr>
@@ -4700,7 +4725,7 @@
               <p:spPr>
                 <a:xfrm>
                   <a:off x="4203533" y="3174497"/>
-                  <a:ext cx="273858" cy="430887"/>
+                  <a:ext cx="519821" cy="430887"/>
                 </a:xfrm>
                 <a:prstGeom prst="rect">
                   <a:avLst/>
@@ -4720,12 +4745,31 @@
                         <m:jc m:val="centerGroup"/>
                       </m:oMathParaPr>
                       <m:oMath xmlns:m="http://schemas.openxmlformats.org/officeDocument/2006/math">
-                        <m:r>
-                          <a:rPr lang="en-US" sz="2800" i="1" smtClean="0">
-                            <a:latin typeface="Cambria Math" panose="02040503050406030204" pitchFamily="18" charset="0"/>
-                          </a:rPr>
-                          <m:t>𝜆</m:t>
-                        </m:r>
+                        <m:sSub>
+                          <m:sSubPr>
+                            <m:ctrlPr>
+                              <a:rPr lang="en-US" sz="2800" b="0" i="1" smtClean="0">
+                                <a:latin typeface="Cambria Math" panose="02040503050406030204" pitchFamily="18" charset="0"/>
+                              </a:rPr>
+                            </m:ctrlPr>
+                          </m:sSubPr>
+                          <m:e>
+                            <m:r>
+                              <a:rPr lang="en-US" sz="2800" i="1" smtClean="0">
+                                <a:latin typeface="Cambria Math" panose="02040503050406030204" pitchFamily="18" charset="0"/>
+                              </a:rPr>
+                              <m:t>𝜆</m:t>
+                            </m:r>
+                          </m:e>
+                          <m:sub>
+                            <m:r>
+                              <a:rPr lang="en-US" sz="2800" b="0" i="1" smtClean="0">
+                                <a:latin typeface="Cambria Math" panose="02040503050406030204" pitchFamily="18" charset="0"/>
+                              </a:rPr>
+                              <m:t>𝑀</m:t>
+                            </m:r>
+                          </m:sub>
+                        </m:sSub>
                       </m:oMath>
                     </m:oMathPara>
                   </a14:m>
@@ -4752,7 +4796,7 @@
               <p:spPr>
                 <a:xfrm>
                   <a:off x="4203533" y="3174497"/>
-                  <a:ext cx="273858" cy="430887"/>
+                  <a:ext cx="519821" cy="430887"/>
                 </a:xfrm>
                 <a:prstGeom prst="rect">
                   <a:avLst/>
@@ -4760,7 +4804,7 @@
                 <a:blipFill>
                   <a:blip r:embed="rId7"/>
                   <a:stretch>
-                    <a:fillRect l="-31818" r="-31818" b="-8824"/>
+                    <a:fillRect l="-17073" r="-4878" b="-14706"/>
                   </a:stretch>
                 </a:blipFill>
               </p:spPr>
@@ -4942,8 +4986,8 @@
                 </a:fontRef>
               </p:style>
             </p:cxnSp>
-            <mc:AlternateContent xmlns:mc="http://schemas.openxmlformats.org/markup-compatibility/2006">
-              <mc:Choice xmlns:a14="http://schemas.microsoft.com/office/drawing/2010/main" Requires="a14">
+            <mc:AlternateContent xmlns:mc="http://schemas.openxmlformats.org/markup-compatibility/2006" xmlns:a14="http://schemas.microsoft.com/office/drawing/2010/main">
+              <mc:Choice Requires="a14">
                 <p:sp>
                   <p:nvSpPr>
                     <p:cNvPr id="57" name="TextBox 56">
@@ -5012,7 +5056,7 @@
                   </p:txBody>
                 </p:sp>
               </mc:Choice>
-              <mc:Fallback>
+              <mc:Fallback xmlns="">
                 <p:sp>
                   <p:nvSpPr>
                     <p:cNvPr id="57" name="TextBox 56">
@@ -5057,8 +5101,8 @@
                 </p:sp>
               </mc:Fallback>
             </mc:AlternateContent>
-            <mc:AlternateContent xmlns:mc="http://schemas.openxmlformats.org/markup-compatibility/2006">
-              <mc:Choice xmlns:a14="http://schemas.microsoft.com/office/drawing/2010/main" Requires="a14">
+            <mc:AlternateContent xmlns:mc="http://schemas.openxmlformats.org/markup-compatibility/2006" xmlns:a14="http://schemas.microsoft.com/office/drawing/2010/main">
+              <mc:Choice Requires="a14">
                 <p:sp>
                   <p:nvSpPr>
                     <p:cNvPr id="58" name="TextBox 57">
@@ -5127,7 +5171,7 @@
                   </p:txBody>
                 </p:sp>
               </mc:Choice>
-              <mc:Fallback>
+              <mc:Fallback xmlns="">
                 <p:sp>
                   <p:nvSpPr>
                     <p:cNvPr id="58" name="TextBox 57">
@@ -5191,7 +5235,7 @@
               <p:spPr>
                 <a:xfrm>
                   <a:off x="5533830" y="3212710"/>
-                  <a:ext cx="273858" cy="430887"/>
+                  <a:ext cx="519821" cy="430887"/>
                 </a:xfrm>
                 <a:prstGeom prst="rect">
                   <a:avLst/>
@@ -5211,12 +5255,31 @@
                         <m:jc m:val="centerGroup"/>
                       </m:oMathParaPr>
                       <m:oMath xmlns:m="http://schemas.openxmlformats.org/officeDocument/2006/math">
-                        <m:r>
-                          <a:rPr lang="en-US" sz="2800" i="1" smtClean="0">
-                            <a:latin typeface="Cambria Math" panose="02040503050406030204" pitchFamily="18" charset="0"/>
-                          </a:rPr>
-                          <m:t>𝜆</m:t>
-                        </m:r>
+                        <m:sSub>
+                          <m:sSubPr>
+                            <m:ctrlPr>
+                              <a:rPr lang="en-US" sz="2800" b="0" i="1" smtClean="0">
+                                <a:latin typeface="Cambria Math" panose="02040503050406030204" pitchFamily="18" charset="0"/>
+                              </a:rPr>
+                            </m:ctrlPr>
+                          </m:sSubPr>
+                          <m:e>
+                            <m:r>
+                              <a:rPr lang="en-US" sz="2800" i="1" smtClean="0">
+                                <a:latin typeface="Cambria Math" panose="02040503050406030204" pitchFamily="18" charset="0"/>
+                              </a:rPr>
+                              <m:t>𝜆</m:t>
+                            </m:r>
+                          </m:e>
+                          <m:sub>
+                            <m:r>
+                              <a:rPr lang="en-US" sz="2800" b="0" i="1" smtClean="0">
+                                <a:latin typeface="Cambria Math" panose="02040503050406030204" pitchFamily="18" charset="0"/>
+                              </a:rPr>
+                              <m:t>𝑀</m:t>
+                            </m:r>
+                          </m:sub>
+                        </m:sSub>
                       </m:oMath>
                     </m:oMathPara>
                   </a14:m>
@@ -5243,7 +5306,7 @@
               <p:spPr>
                 <a:xfrm>
                   <a:off x="5533830" y="3212710"/>
-                  <a:ext cx="273858" cy="430887"/>
+                  <a:ext cx="519821" cy="430887"/>
                 </a:xfrm>
                 <a:prstGeom prst="rect">
                   <a:avLst/>
@@ -5251,7 +5314,7 @@
                 <a:blipFill>
                   <a:blip r:embed="rId9"/>
                   <a:stretch>
-                    <a:fillRect l="-30435" r="-26087" b="-5556"/>
+                    <a:fillRect l="-16667" r="-4762" b="-11111"/>
                   </a:stretch>
                 </a:blipFill>
               </p:spPr>
@@ -5286,8 +5349,8 @@
               </p:nvSpPr>
               <p:spPr>
                 <a:xfrm>
-                  <a:off x="6836990" y="3212710"/>
-                  <a:ext cx="273858" cy="430887"/>
+                  <a:off x="6794655" y="3212710"/>
+                  <a:ext cx="519821" cy="430887"/>
                 </a:xfrm>
                 <a:prstGeom prst="rect">
                   <a:avLst/>
@@ -5307,12 +5370,31 @@
                         <m:jc m:val="centerGroup"/>
                       </m:oMathParaPr>
                       <m:oMath xmlns:m="http://schemas.openxmlformats.org/officeDocument/2006/math">
-                        <m:r>
-                          <a:rPr lang="en-US" sz="2800" i="1" smtClean="0">
-                            <a:latin typeface="Cambria Math" panose="02040503050406030204" pitchFamily="18" charset="0"/>
-                          </a:rPr>
-                          <m:t>𝜆</m:t>
-                        </m:r>
+                        <m:sSub>
+                          <m:sSubPr>
+                            <m:ctrlPr>
+                              <a:rPr lang="en-US" sz="2800" b="0" i="1" smtClean="0">
+                                <a:latin typeface="Cambria Math" panose="02040503050406030204" pitchFamily="18" charset="0"/>
+                              </a:rPr>
+                            </m:ctrlPr>
+                          </m:sSubPr>
+                          <m:e>
+                            <m:r>
+                              <a:rPr lang="en-US" sz="2800" i="1" smtClean="0">
+                                <a:latin typeface="Cambria Math" panose="02040503050406030204" pitchFamily="18" charset="0"/>
+                              </a:rPr>
+                              <m:t>𝜆</m:t>
+                            </m:r>
+                          </m:e>
+                          <m:sub>
+                            <m:r>
+                              <a:rPr lang="en-US" sz="2800" b="0" i="1" smtClean="0">
+                                <a:latin typeface="Cambria Math" panose="02040503050406030204" pitchFamily="18" charset="0"/>
+                              </a:rPr>
+                              <m:t>𝑀</m:t>
+                            </m:r>
+                          </m:sub>
+                        </m:sSub>
                       </m:oMath>
                     </m:oMathPara>
                   </a14:m>
@@ -5338,16 +5420,16 @@
               </p:nvSpPr>
               <p:spPr>
                 <a:xfrm>
-                  <a:off x="6836990" y="3212710"/>
-                  <a:ext cx="273858" cy="430887"/>
+                  <a:off x="6794655" y="3212710"/>
+                  <a:ext cx="519821" cy="430887"/>
                 </a:xfrm>
                 <a:prstGeom prst="rect">
                   <a:avLst/>
                 </a:prstGeom>
                 <a:blipFill>
-                  <a:blip r:embed="rId9"/>
+                  <a:blip r:embed="rId10"/>
                   <a:stretch>
-                    <a:fillRect l="-31818" r="-31818" b="-5556"/>
+                    <a:fillRect l="-17073" r="-4878" b="-11111"/>
                   </a:stretch>
                 </a:blipFill>
               </p:spPr>
@@ -5382,8 +5464,8 @@
               </p:nvSpPr>
               <p:spPr>
                 <a:xfrm>
-                  <a:off x="8102464" y="3212710"/>
-                  <a:ext cx="273858" cy="430887"/>
+                  <a:off x="8077063" y="3204243"/>
+                  <a:ext cx="519821" cy="430887"/>
                 </a:xfrm>
                 <a:prstGeom prst="rect">
                   <a:avLst/>
@@ -5403,12 +5485,31 @@
                         <m:jc m:val="centerGroup"/>
                       </m:oMathParaPr>
                       <m:oMath xmlns:m="http://schemas.openxmlformats.org/officeDocument/2006/math">
-                        <m:r>
-                          <a:rPr lang="en-US" sz="2800" i="1" smtClean="0">
-                            <a:latin typeface="Cambria Math" panose="02040503050406030204" pitchFamily="18" charset="0"/>
-                          </a:rPr>
-                          <m:t>𝜆</m:t>
-                        </m:r>
+                        <m:sSub>
+                          <m:sSubPr>
+                            <m:ctrlPr>
+                              <a:rPr lang="en-US" sz="2800" b="0" i="1" smtClean="0">
+                                <a:latin typeface="Cambria Math" panose="02040503050406030204" pitchFamily="18" charset="0"/>
+                              </a:rPr>
+                            </m:ctrlPr>
+                          </m:sSubPr>
+                          <m:e>
+                            <m:r>
+                              <a:rPr lang="en-US" sz="2800" i="1" smtClean="0">
+                                <a:latin typeface="Cambria Math" panose="02040503050406030204" pitchFamily="18" charset="0"/>
+                              </a:rPr>
+                              <m:t>𝜆</m:t>
+                            </m:r>
+                          </m:e>
+                          <m:sub>
+                            <m:r>
+                              <a:rPr lang="en-US" sz="2800" b="0" i="1" smtClean="0">
+                                <a:latin typeface="Cambria Math" panose="02040503050406030204" pitchFamily="18" charset="0"/>
+                              </a:rPr>
+                              <m:t>𝑀</m:t>
+                            </m:r>
+                          </m:sub>
+                        </m:sSub>
                       </m:oMath>
                     </m:oMathPara>
                   </a14:m>
@@ -5434,16 +5535,16 @@
               </p:nvSpPr>
               <p:spPr>
                 <a:xfrm>
-                  <a:off x="8102464" y="3212710"/>
-                  <a:ext cx="273858" cy="430887"/>
+                  <a:off x="8077063" y="3204243"/>
+                  <a:ext cx="519821" cy="430887"/>
                 </a:xfrm>
                 <a:prstGeom prst="rect">
                   <a:avLst/>
                 </a:prstGeom>
                 <a:blipFill>
-                  <a:blip r:embed="rId10"/>
+                  <a:blip r:embed="rId11"/>
                   <a:stretch>
-                    <a:fillRect l="-26087" r="-26087" b="-5556"/>
+                    <a:fillRect l="-17073" r="-4878" b="-11429"/>
                   </a:stretch>
                 </a:blipFill>
               </p:spPr>
@@ -5478,8 +5579,8 @@
               </p:nvSpPr>
               <p:spPr>
                 <a:xfrm>
-                  <a:off x="9397665" y="3212710"/>
-                  <a:ext cx="273858" cy="430887"/>
+                  <a:off x="9304528" y="3212710"/>
+                  <a:ext cx="659861" cy="430887"/>
                 </a:xfrm>
                 <a:prstGeom prst="rect">
                   <a:avLst/>
@@ -5499,12 +5600,31 @@
                         <m:jc m:val="centerGroup"/>
                       </m:oMathParaPr>
                       <m:oMath xmlns:m="http://schemas.openxmlformats.org/officeDocument/2006/math">
-                        <m:r>
-                          <a:rPr lang="en-US" sz="2800" i="1" smtClean="0">
-                            <a:latin typeface="Cambria Math" panose="02040503050406030204" pitchFamily="18" charset="0"/>
-                          </a:rPr>
-                          <m:t>𝜆</m:t>
-                        </m:r>
+                        <m:sSub>
+                          <m:sSubPr>
+                            <m:ctrlPr>
+                              <a:rPr lang="en-US" sz="2800" b="0" i="1" smtClean="0">
+                                <a:latin typeface="Cambria Math" panose="02040503050406030204" pitchFamily="18" charset="0"/>
+                              </a:rPr>
+                            </m:ctrlPr>
+                          </m:sSubPr>
+                          <m:e>
+                            <m:r>
+                              <a:rPr lang="en-US" sz="2800" i="1" smtClean="0">
+                                <a:latin typeface="Cambria Math" panose="02040503050406030204" pitchFamily="18" charset="0"/>
+                              </a:rPr>
+                              <m:t>𝜆</m:t>
+                            </m:r>
+                          </m:e>
+                          <m:sub>
+                            <m:r>
+                              <a:rPr lang="en-US" sz="2800" b="0" i="1" smtClean="0">
+                                <a:latin typeface="Cambria Math" panose="02040503050406030204" pitchFamily="18" charset="0"/>
+                              </a:rPr>
+                              <m:t>𝑚𝑠</m:t>
+                            </m:r>
+                          </m:sub>
+                        </m:sSub>
                       </m:oMath>
                     </m:oMathPara>
                   </a14:m>
@@ -5530,16 +5650,16 @@
               </p:nvSpPr>
               <p:spPr>
                 <a:xfrm>
-                  <a:off x="9397665" y="3212710"/>
-                  <a:ext cx="273858" cy="430887"/>
+                  <a:off x="9304528" y="3212710"/>
+                  <a:ext cx="659861" cy="430887"/>
                 </a:xfrm>
                 <a:prstGeom prst="rect">
                   <a:avLst/>
                 </a:prstGeom>
                 <a:blipFill>
-                  <a:blip r:embed="rId11"/>
+                  <a:blip r:embed="rId12"/>
                   <a:stretch>
-                    <a:fillRect l="-36364" r="-27273" b="-5556"/>
+                    <a:fillRect l="-13208" b="-5556"/>
                   </a:stretch>
                 </a:blipFill>
               </p:spPr>
@@ -5666,8 +5786,8 @@
               </a:fontRef>
             </p:style>
           </p:cxnSp>
-          <mc:AlternateContent xmlns:mc="http://schemas.openxmlformats.org/markup-compatibility/2006">
-            <mc:Choice xmlns:a14="http://schemas.microsoft.com/office/drawing/2010/main" Requires="a14">
+          <mc:AlternateContent xmlns:mc="http://schemas.openxmlformats.org/markup-compatibility/2006" xmlns:a14="http://schemas.microsoft.com/office/drawing/2010/main">
+            <mc:Choice Requires="a14">
               <p:sp>
                 <p:nvSpPr>
                   <p:cNvPr id="66" name="TextBox 65">
@@ -5736,7 +5856,7 @@
                 </p:txBody>
               </p:sp>
             </mc:Choice>
-            <mc:Fallback>
+            <mc:Fallback xmlns="">
               <p:sp>
                 <p:nvSpPr>
                   <p:cNvPr id="66" name="TextBox 65">
@@ -5760,7 +5880,7 @@
                     <a:avLst/>
                   </a:prstGeom>
                   <a:blipFill>
-                    <a:blip r:embed="rId12"/>
+                    <a:blip r:embed="rId13"/>
                     <a:stretch>
                       <a:fillRect l="-16279" r="-2326" b="-11429"/>
                     </a:stretch>
@@ -5781,8 +5901,8 @@
               </p:sp>
             </mc:Fallback>
           </mc:AlternateContent>
-          <mc:AlternateContent xmlns:mc="http://schemas.openxmlformats.org/markup-compatibility/2006">
-            <mc:Choice xmlns:a14="http://schemas.microsoft.com/office/drawing/2010/main" Requires="a14">
+          <mc:AlternateContent xmlns:mc="http://schemas.openxmlformats.org/markup-compatibility/2006" xmlns:a14="http://schemas.microsoft.com/office/drawing/2010/main">
+            <mc:Choice Requires="a14">
               <p:sp>
                 <p:nvSpPr>
                   <p:cNvPr id="67" name="TextBox 66">
@@ -5851,7 +5971,7 @@
                 </p:txBody>
               </p:sp>
             </mc:Choice>
-            <mc:Fallback>
+            <mc:Fallback xmlns="">
               <p:sp>
                 <p:nvSpPr>
                   <p:cNvPr id="67" name="TextBox 66">
@@ -5875,7 +5995,7 @@
                     <a:avLst/>
                   </a:prstGeom>
                   <a:blipFill>
-                    <a:blip r:embed="rId13"/>
+                    <a:blip r:embed="rId14"/>
                     <a:stretch>
                       <a:fillRect l="-16279" r="-2326" b="-14286"/>
                     </a:stretch>
@@ -6005,8 +6125,8 @@
               </a:fontRef>
             </p:style>
           </p:cxnSp>
-          <mc:AlternateContent xmlns:mc="http://schemas.openxmlformats.org/markup-compatibility/2006">
-            <mc:Choice xmlns:a14="http://schemas.microsoft.com/office/drawing/2010/main" Requires="a14">
+          <mc:AlternateContent xmlns:mc="http://schemas.openxmlformats.org/markup-compatibility/2006" xmlns:a14="http://schemas.microsoft.com/office/drawing/2010/main">
+            <mc:Choice Requires="a14">
               <p:sp>
                 <p:nvSpPr>
                   <p:cNvPr id="71" name="TextBox 70">
@@ -6075,7 +6195,7 @@
                 </p:txBody>
               </p:sp>
             </mc:Choice>
-            <mc:Fallback>
+            <mc:Fallback xmlns="">
               <p:sp>
                 <p:nvSpPr>
                   <p:cNvPr id="71" name="TextBox 70">
@@ -6099,7 +6219,7 @@
                     <a:avLst/>
                   </a:prstGeom>
                   <a:blipFill>
-                    <a:blip r:embed="rId14"/>
+                    <a:blip r:embed="rId15"/>
                     <a:stretch>
                       <a:fillRect l="-16279" r="-4651" b="-14706"/>
                     </a:stretch>
@@ -6120,8 +6240,8 @@
               </p:sp>
             </mc:Fallback>
           </mc:AlternateContent>
-          <mc:AlternateContent xmlns:mc="http://schemas.openxmlformats.org/markup-compatibility/2006">
-            <mc:Choice xmlns:a14="http://schemas.microsoft.com/office/drawing/2010/main" Requires="a14">
+          <mc:AlternateContent xmlns:mc="http://schemas.openxmlformats.org/markup-compatibility/2006" xmlns:a14="http://schemas.microsoft.com/office/drawing/2010/main">
+            <mc:Choice Requires="a14">
               <p:sp>
                 <p:nvSpPr>
                   <p:cNvPr id="72" name="TextBox 71">
@@ -6190,7 +6310,7 @@
                 </p:txBody>
               </p:sp>
             </mc:Choice>
-            <mc:Fallback>
+            <mc:Fallback xmlns="">
               <p:sp>
                 <p:nvSpPr>
                   <p:cNvPr id="72" name="TextBox 71">
@@ -6214,7 +6334,7 @@
                     <a:avLst/>
                   </a:prstGeom>
                   <a:blipFill>
-                    <a:blip r:embed="rId15"/>
+                    <a:blip r:embed="rId16"/>
                     <a:stretch>
                       <a:fillRect l="-16279" r="-4651" b="-11111"/>
                     </a:stretch>
@@ -6344,8 +6464,8 @@
               </a:fontRef>
             </p:style>
           </p:cxnSp>
-          <mc:AlternateContent xmlns:mc="http://schemas.openxmlformats.org/markup-compatibility/2006">
-            <mc:Choice xmlns:a14="http://schemas.microsoft.com/office/drawing/2010/main" Requires="a14">
+          <mc:AlternateContent xmlns:mc="http://schemas.openxmlformats.org/markup-compatibility/2006" xmlns:a14="http://schemas.microsoft.com/office/drawing/2010/main">
+            <mc:Choice Requires="a14">
               <p:sp>
                 <p:nvSpPr>
                   <p:cNvPr id="76" name="TextBox 75">
@@ -6414,7 +6534,7 @@
                 </p:txBody>
               </p:sp>
             </mc:Choice>
-            <mc:Fallback>
+            <mc:Fallback xmlns="">
               <p:sp>
                 <p:nvSpPr>
                   <p:cNvPr id="76" name="TextBox 75">
@@ -6438,7 +6558,7 @@
                     <a:avLst/>
                   </a:prstGeom>
                   <a:blipFill>
-                    <a:blip r:embed="rId16"/>
+                    <a:blip r:embed="rId17"/>
                     <a:stretch>
                       <a:fillRect l="-16279" r="-2326" b="-14286"/>
                     </a:stretch>
@@ -6459,8 +6579,8 @@
               </p:sp>
             </mc:Fallback>
           </mc:AlternateContent>
-          <mc:AlternateContent xmlns:mc="http://schemas.openxmlformats.org/markup-compatibility/2006">
-            <mc:Choice xmlns:a14="http://schemas.microsoft.com/office/drawing/2010/main" Requires="a14">
+          <mc:AlternateContent xmlns:mc="http://schemas.openxmlformats.org/markup-compatibility/2006" xmlns:a14="http://schemas.microsoft.com/office/drawing/2010/main">
+            <mc:Choice Requires="a14">
               <p:sp>
                 <p:nvSpPr>
                   <p:cNvPr id="77" name="TextBox 76">
@@ -6529,7 +6649,7 @@
                 </p:txBody>
               </p:sp>
             </mc:Choice>
-            <mc:Fallback>
+            <mc:Fallback xmlns="">
               <p:sp>
                 <p:nvSpPr>
                   <p:cNvPr id="77" name="TextBox 76">
@@ -6553,7 +6673,7 @@
                     <a:avLst/>
                   </a:prstGeom>
                   <a:blipFill>
-                    <a:blip r:embed="rId16"/>
+                    <a:blip r:embed="rId17"/>
                     <a:stretch>
                       <a:fillRect l="-16279" r="-2326" b="-14286"/>
                     </a:stretch>
@@ -6683,8 +6803,8 @@
               </a:fontRef>
             </p:style>
           </p:cxnSp>
-          <mc:AlternateContent xmlns:mc="http://schemas.openxmlformats.org/markup-compatibility/2006">
-            <mc:Choice xmlns:a14="http://schemas.microsoft.com/office/drawing/2010/main" Requires="a14">
+          <mc:AlternateContent xmlns:mc="http://schemas.openxmlformats.org/markup-compatibility/2006" xmlns:a14="http://schemas.microsoft.com/office/drawing/2010/main">
+            <mc:Choice Requires="a14">
               <p:sp>
                 <p:nvSpPr>
                   <p:cNvPr id="81" name="TextBox 80">
@@ -6753,7 +6873,7 @@
                 </p:txBody>
               </p:sp>
             </mc:Choice>
-            <mc:Fallback>
+            <mc:Fallback xmlns="">
               <p:sp>
                 <p:nvSpPr>
                   <p:cNvPr id="81" name="TextBox 80">
@@ -6777,7 +6897,7 @@
                     <a:avLst/>
                   </a:prstGeom>
                   <a:blipFill>
-                    <a:blip r:embed="rId17"/>
+                    <a:blip r:embed="rId18"/>
                     <a:stretch>
                       <a:fillRect l="-16279" r="-4651" b="-14286"/>
                     </a:stretch>
@@ -6798,8 +6918,8 @@
               </p:sp>
             </mc:Fallback>
           </mc:AlternateContent>
-          <mc:AlternateContent xmlns:mc="http://schemas.openxmlformats.org/markup-compatibility/2006">
-            <mc:Choice xmlns:a14="http://schemas.microsoft.com/office/drawing/2010/main" Requires="a14">
+          <mc:AlternateContent xmlns:mc="http://schemas.openxmlformats.org/markup-compatibility/2006" xmlns:a14="http://schemas.microsoft.com/office/drawing/2010/main">
+            <mc:Choice Requires="a14">
               <p:sp>
                 <p:nvSpPr>
                   <p:cNvPr id="82" name="TextBox 81">
@@ -6868,7 +6988,7 @@
                 </p:txBody>
               </p:sp>
             </mc:Choice>
-            <mc:Fallback>
+            <mc:Fallback xmlns="">
               <p:sp>
                 <p:nvSpPr>
                   <p:cNvPr id="82" name="TextBox 81">
@@ -6892,7 +7012,7 @@
                     <a:avLst/>
                   </a:prstGeom>
                   <a:blipFill>
-                    <a:blip r:embed="rId18"/>
+                    <a:blip r:embed="rId19"/>
                     <a:stretch>
                       <a:fillRect l="-16279" r="-4651" b="-11429"/>
                     </a:stretch>
@@ -7022,8 +7142,8 @@
               </a:fontRef>
             </p:style>
           </p:cxnSp>
-          <mc:AlternateContent xmlns:mc="http://schemas.openxmlformats.org/markup-compatibility/2006">
-            <mc:Choice xmlns:a14="http://schemas.microsoft.com/office/drawing/2010/main" Requires="a14">
+          <mc:AlternateContent xmlns:mc="http://schemas.openxmlformats.org/markup-compatibility/2006" xmlns:a14="http://schemas.microsoft.com/office/drawing/2010/main">
+            <mc:Choice Requires="a14">
               <p:sp>
                 <p:nvSpPr>
                   <p:cNvPr id="86" name="TextBox 85">
@@ -7092,7 +7212,7 @@
                 </p:txBody>
               </p:sp>
             </mc:Choice>
-            <mc:Fallback>
+            <mc:Fallback xmlns="">
               <p:sp>
                 <p:nvSpPr>
                   <p:cNvPr id="86" name="TextBox 85">
@@ -7116,7 +7236,7 @@
                     <a:avLst/>
                   </a:prstGeom>
                   <a:blipFill>
-                    <a:blip r:embed="rId19"/>
+                    <a:blip r:embed="rId20"/>
                     <a:stretch>
                       <a:fillRect l="-11111" r="-1852" b="-8571"/>
                     </a:stretch>
@@ -7137,8 +7257,8 @@
               </p:sp>
             </mc:Fallback>
           </mc:AlternateContent>
-          <mc:AlternateContent xmlns:mc="http://schemas.openxmlformats.org/markup-compatibility/2006">
-            <mc:Choice xmlns:a14="http://schemas.microsoft.com/office/drawing/2010/main" Requires="a14">
+          <mc:AlternateContent xmlns:mc="http://schemas.openxmlformats.org/markup-compatibility/2006" xmlns:a14="http://schemas.microsoft.com/office/drawing/2010/main">
+            <mc:Choice Requires="a14">
               <p:sp>
                 <p:nvSpPr>
                   <p:cNvPr id="87" name="TextBox 86">
@@ -7207,7 +7327,7 @@
                 </p:txBody>
               </p:sp>
             </mc:Choice>
-            <mc:Fallback>
+            <mc:Fallback xmlns="">
               <p:sp>
                 <p:nvSpPr>
                   <p:cNvPr id="87" name="TextBox 86">
@@ -7231,7 +7351,7 @@
                     <a:avLst/>
                   </a:prstGeom>
                   <a:blipFill>
-                    <a:blip r:embed="rId19"/>
+                    <a:blip r:embed="rId20"/>
                     <a:stretch>
                       <a:fillRect l="-11111" r="-1852" b="-8571"/>
                     </a:stretch>
@@ -7416,8 +7536,8 @@
                 </a:fontRef>
               </p:style>
             </p:cxnSp>
-            <mc:AlternateContent xmlns:mc="http://schemas.openxmlformats.org/markup-compatibility/2006">
-              <mc:Choice xmlns:a14="http://schemas.microsoft.com/office/drawing/2010/main" Requires="a14">
+            <mc:AlternateContent xmlns:mc="http://schemas.openxmlformats.org/markup-compatibility/2006" xmlns:a14="http://schemas.microsoft.com/office/drawing/2010/main">
+              <mc:Choice Requires="a14">
                 <p:sp>
                   <p:nvSpPr>
                     <p:cNvPr id="91" name="TextBox 90">
@@ -7486,7 +7606,7 @@
                   </p:txBody>
                 </p:sp>
               </mc:Choice>
-              <mc:Fallback>
+              <mc:Fallback xmlns="">
                 <p:sp>
                   <p:nvSpPr>
                     <p:cNvPr id="91" name="TextBox 90">
@@ -7531,8 +7651,8 @@
                 </p:sp>
               </mc:Fallback>
             </mc:AlternateContent>
-            <mc:AlternateContent xmlns:mc="http://schemas.openxmlformats.org/markup-compatibility/2006">
-              <mc:Choice xmlns:a14="http://schemas.microsoft.com/office/drawing/2010/main" Requires="a14">
+            <mc:AlternateContent xmlns:mc="http://schemas.openxmlformats.org/markup-compatibility/2006" xmlns:a14="http://schemas.microsoft.com/office/drawing/2010/main">
+              <mc:Choice Requires="a14">
                 <p:sp>
                   <p:nvSpPr>
                     <p:cNvPr id="92" name="TextBox 91">
@@ -7601,7 +7721,7 @@
                   </p:txBody>
                 </p:sp>
               </mc:Choice>
-              <mc:Fallback>
+              <mc:Fallback xmlns="">
                 <p:sp>
                   <p:nvSpPr>
                     <p:cNvPr id="92" name="TextBox 91">

</xml_diff>

<commit_message>
update bibliography and Fig. 1
</commit_message>
<xml_diff>
--- a/figs/labeled_realistic_membrane.pptx
+++ b/figs/labeled_realistic_membrane.pptx
@@ -259,7 +259,7 @@
           <a:p>
             <a:fld id="{3FE4A416-97FA-944C-BA97-257286476C07}" type="datetimeFigureOut">
               <a:rPr lang="en-US" smtClean="0"/>
-              <a:t>2/1/24</a:t>
+              <a:t>2/5/24</a:t>
             </a:fld>
             <a:endParaRPr lang="en-US"/>
           </a:p>
@@ -457,7 +457,7 @@
           <a:p>
             <a:fld id="{3FE4A416-97FA-944C-BA97-257286476C07}" type="datetimeFigureOut">
               <a:rPr lang="en-US" smtClean="0"/>
-              <a:t>2/1/24</a:t>
+              <a:t>2/5/24</a:t>
             </a:fld>
             <a:endParaRPr lang="en-US"/>
           </a:p>
@@ -665,7 +665,7 @@
           <a:p>
             <a:fld id="{3FE4A416-97FA-944C-BA97-257286476C07}" type="datetimeFigureOut">
               <a:rPr lang="en-US" smtClean="0"/>
-              <a:t>2/1/24</a:t>
+              <a:t>2/5/24</a:t>
             </a:fld>
             <a:endParaRPr lang="en-US"/>
           </a:p>
@@ -863,7 +863,7 @@
           <a:p>
             <a:fld id="{3FE4A416-97FA-944C-BA97-257286476C07}" type="datetimeFigureOut">
               <a:rPr lang="en-US" smtClean="0"/>
-              <a:t>2/1/24</a:t>
+              <a:t>2/5/24</a:t>
             </a:fld>
             <a:endParaRPr lang="en-US"/>
           </a:p>
@@ -1138,7 +1138,7 @@
           <a:p>
             <a:fld id="{3FE4A416-97FA-944C-BA97-257286476C07}" type="datetimeFigureOut">
               <a:rPr lang="en-US" smtClean="0"/>
-              <a:t>2/1/24</a:t>
+              <a:t>2/5/24</a:t>
             </a:fld>
             <a:endParaRPr lang="en-US"/>
           </a:p>
@@ -1403,7 +1403,7 @@
           <a:p>
             <a:fld id="{3FE4A416-97FA-944C-BA97-257286476C07}" type="datetimeFigureOut">
               <a:rPr lang="en-US" smtClean="0"/>
-              <a:t>2/1/24</a:t>
+              <a:t>2/5/24</a:t>
             </a:fld>
             <a:endParaRPr lang="en-US"/>
           </a:p>
@@ -1815,7 +1815,7 @@
           <a:p>
             <a:fld id="{3FE4A416-97FA-944C-BA97-257286476C07}" type="datetimeFigureOut">
               <a:rPr lang="en-US" smtClean="0"/>
-              <a:t>2/1/24</a:t>
+              <a:t>2/5/24</a:t>
             </a:fld>
             <a:endParaRPr lang="en-US"/>
           </a:p>
@@ -1956,7 +1956,7 @@
           <a:p>
             <a:fld id="{3FE4A416-97FA-944C-BA97-257286476C07}" type="datetimeFigureOut">
               <a:rPr lang="en-US" smtClean="0"/>
-              <a:t>2/1/24</a:t>
+              <a:t>2/5/24</a:t>
             </a:fld>
             <a:endParaRPr lang="en-US"/>
           </a:p>
@@ -2069,7 +2069,7 @@
           <a:p>
             <a:fld id="{3FE4A416-97FA-944C-BA97-257286476C07}" type="datetimeFigureOut">
               <a:rPr lang="en-US" smtClean="0"/>
-              <a:t>2/1/24</a:t>
+              <a:t>2/5/24</a:t>
             </a:fld>
             <a:endParaRPr lang="en-US"/>
           </a:p>
@@ -2380,7 +2380,7 @@
           <a:p>
             <a:fld id="{3FE4A416-97FA-944C-BA97-257286476C07}" type="datetimeFigureOut">
               <a:rPr lang="en-US" smtClean="0"/>
-              <a:t>2/1/24</a:t>
+              <a:t>2/5/24</a:t>
             </a:fld>
             <a:endParaRPr lang="en-US"/>
           </a:p>
@@ -2668,7 +2668,7 @@
           <a:p>
             <a:fld id="{3FE4A416-97FA-944C-BA97-257286476C07}" type="datetimeFigureOut">
               <a:rPr lang="en-US" smtClean="0"/>
-              <a:t>2/1/24</a:t>
+              <a:t>2/5/24</a:t>
             </a:fld>
             <a:endParaRPr lang="en-US"/>
           </a:p>
@@ -2909,7 +2909,7 @@
           <a:p>
             <a:fld id="{3FE4A416-97FA-944C-BA97-257286476C07}" type="datetimeFigureOut">
               <a:rPr lang="en-US" smtClean="0"/>
-              <a:t>2/1/24</a:t>
+              <a:t>2/5/24</a:t>
             </a:fld>
             <a:endParaRPr lang="en-US"/>
           </a:p>
@@ -4410,8 +4410,8 @@
             </p:txBody>
           </p:sp>
         </p:grpSp>
-        <mc:AlternateContent xmlns:mc="http://schemas.openxmlformats.org/markup-compatibility/2006" xmlns:a14="http://schemas.microsoft.com/office/drawing/2010/main">
-          <mc:Choice Requires="a14">
+        <mc:AlternateContent xmlns:mc="http://schemas.openxmlformats.org/markup-compatibility/2006">
+          <mc:Choice xmlns:a14="http://schemas.microsoft.com/office/drawing/2010/main" Requires="a14">
             <p:sp>
               <p:nvSpPr>
                 <p:cNvPr id="33" name="TextBox 32">
@@ -4427,7 +4427,7 @@
               <p:spPr>
                 <a:xfrm>
                   <a:off x="5821179" y="5398221"/>
-                  <a:ext cx="1477456" cy="523220"/>
+                  <a:ext cx="1731179" cy="523220"/>
                 </a:xfrm>
                 <a:prstGeom prst="rect">
                   <a:avLst/>
@@ -4466,13 +4466,34 @@
                           </a:rPr>
                           <m:t>𝒎</m:t>
                         </m:r>
-                        <m:r>
-                          <a:rPr lang="en-US" sz="2800" b="1" i="1" smtClean="0">
-                            <a:latin typeface="Cambria Math" panose="02040503050406030204" pitchFamily="18" charset="0"/>
-                            <a:ea typeface="Cambria Math" panose="02040503050406030204" pitchFamily="18" charset="0"/>
-                          </a:rPr>
-                          <m:t>𝝀</m:t>
-                        </m:r>
+                        <m:sSub>
+                          <m:sSubPr>
+                            <m:ctrlPr>
+                              <a:rPr lang="en-US" sz="2800" b="1" i="1" smtClean="0">
+                                <a:latin typeface="Cambria Math" panose="02040503050406030204" pitchFamily="18" charset="0"/>
+                                <a:ea typeface="Cambria Math" panose="02040503050406030204" pitchFamily="18" charset="0"/>
+                              </a:rPr>
+                            </m:ctrlPr>
+                          </m:sSubPr>
+                          <m:e>
+                            <m:r>
+                              <a:rPr lang="en-US" sz="2800" b="1" i="1" smtClean="0">
+                                <a:latin typeface="Cambria Math" panose="02040503050406030204" pitchFamily="18" charset="0"/>
+                                <a:ea typeface="Cambria Math" panose="02040503050406030204" pitchFamily="18" charset="0"/>
+                              </a:rPr>
+                              <m:t>𝝀</m:t>
+                            </m:r>
+                          </m:e>
+                          <m:sub>
+                            <m:r>
+                              <a:rPr lang="en-US" sz="2800" b="1" i="1" smtClean="0">
+                                <a:latin typeface="Cambria Math" panose="02040503050406030204" pitchFamily="18" charset="0"/>
+                                <a:ea typeface="Cambria Math" panose="02040503050406030204" pitchFamily="18" charset="0"/>
+                              </a:rPr>
+                              <m:t>𝑴</m:t>
+                            </m:r>
+                          </m:sub>
+                        </m:sSub>
                       </m:oMath>
                     </m:oMathPara>
                   </a14:m>
@@ -4481,7 +4502,7 @@
               </p:txBody>
             </p:sp>
           </mc:Choice>
-          <mc:Fallback xmlns="">
+          <mc:Fallback>
             <p:sp>
               <p:nvSpPr>
                 <p:cNvPr id="33" name="TextBox 32">
@@ -4499,7 +4520,7 @@
               <p:spPr>
                 <a:xfrm>
                   <a:off x="5821179" y="5398221"/>
-                  <a:ext cx="1477456" cy="523220"/>
+                  <a:ext cx="1731179" cy="523220"/>
                 </a:xfrm>
                 <a:prstGeom prst="rect">
                   <a:avLst/>
@@ -4507,7 +4528,7 @@
                 <a:blipFill>
                   <a:blip r:embed="rId5"/>
                   <a:stretch>
-                    <a:fillRect/>
+                    <a:fillRect b="-2381"/>
                   </a:stretch>
                 </a:blipFill>
               </p:spPr>
@@ -4546,8 +4567,8 @@
               <a:chExt cx="1302327" cy="430887"/>
             </a:xfrm>
           </p:grpSpPr>
-          <mc:AlternateContent xmlns:mc="http://schemas.openxmlformats.org/markup-compatibility/2006">
-            <mc:Choice xmlns:a14="http://schemas.microsoft.com/office/drawing/2010/main" Requires="a14">
+          <mc:AlternateContent xmlns:mc="http://schemas.openxmlformats.org/markup-compatibility/2006" xmlns:a14="http://schemas.microsoft.com/office/drawing/2010/main">
+            <mc:Choice Requires="a14">
               <p:sp>
                 <p:nvSpPr>
                   <p:cNvPr id="32" name="TextBox 31">
@@ -4616,7 +4637,7 @@
                 </p:txBody>
               </p:sp>
             </mc:Choice>
-            <mc:Fallback>
+            <mc:Fallback xmlns="">
               <p:sp>
                 <p:nvSpPr>
                   <p:cNvPr id="32" name="TextBox 31">
@@ -4708,8 +4729,8 @@
             </p:style>
           </p:cxnSp>
         </p:grpSp>
-        <mc:AlternateContent xmlns:mc="http://schemas.openxmlformats.org/markup-compatibility/2006">
-          <mc:Choice xmlns:a14="http://schemas.microsoft.com/office/drawing/2010/main" Requires="a14">
+        <mc:AlternateContent xmlns:mc="http://schemas.openxmlformats.org/markup-compatibility/2006" xmlns:a14="http://schemas.microsoft.com/office/drawing/2010/main">
+          <mc:Choice Requires="a14">
             <p:sp>
               <p:nvSpPr>
                 <p:cNvPr id="41" name="TextBox 40">
@@ -4778,7 +4799,7 @@
               </p:txBody>
             </p:sp>
           </mc:Choice>
-          <mc:Fallback>
+          <mc:Fallback xmlns="">
             <p:sp>
               <p:nvSpPr>
                 <p:cNvPr id="41" name="TextBox 40">
@@ -5218,8 +5239,8 @@
             </mc:AlternateContent>
           </p:grpSp>
         </p:grpSp>
-        <mc:AlternateContent xmlns:mc="http://schemas.openxmlformats.org/markup-compatibility/2006">
-          <mc:Choice xmlns:a14="http://schemas.microsoft.com/office/drawing/2010/main" Requires="a14">
+        <mc:AlternateContent xmlns:mc="http://schemas.openxmlformats.org/markup-compatibility/2006" xmlns:a14="http://schemas.microsoft.com/office/drawing/2010/main">
+          <mc:Choice Requires="a14">
             <p:sp>
               <p:nvSpPr>
                 <p:cNvPr id="59" name="TextBox 58">
@@ -5288,7 +5309,7 @@
               </p:txBody>
             </p:sp>
           </mc:Choice>
-          <mc:Fallback>
+          <mc:Fallback xmlns="">
             <p:sp>
               <p:nvSpPr>
                 <p:cNvPr id="59" name="TextBox 58">
@@ -5333,8 +5354,8 @@
             </p:sp>
           </mc:Fallback>
         </mc:AlternateContent>
-        <mc:AlternateContent xmlns:mc="http://schemas.openxmlformats.org/markup-compatibility/2006">
-          <mc:Choice xmlns:a14="http://schemas.microsoft.com/office/drawing/2010/main" Requires="a14">
+        <mc:AlternateContent xmlns:mc="http://schemas.openxmlformats.org/markup-compatibility/2006" xmlns:a14="http://schemas.microsoft.com/office/drawing/2010/main">
+          <mc:Choice Requires="a14">
             <p:sp>
               <p:nvSpPr>
                 <p:cNvPr id="60" name="TextBox 59">
@@ -5403,7 +5424,7 @@
               </p:txBody>
             </p:sp>
           </mc:Choice>
-          <mc:Fallback>
+          <mc:Fallback xmlns="">
             <p:sp>
               <p:nvSpPr>
                 <p:cNvPr id="60" name="TextBox 59">
@@ -5448,8 +5469,8 @@
             </p:sp>
           </mc:Fallback>
         </mc:AlternateContent>
-        <mc:AlternateContent xmlns:mc="http://schemas.openxmlformats.org/markup-compatibility/2006">
-          <mc:Choice xmlns:a14="http://schemas.microsoft.com/office/drawing/2010/main" Requires="a14">
+        <mc:AlternateContent xmlns:mc="http://schemas.openxmlformats.org/markup-compatibility/2006" xmlns:a14="http://schemas.microsoft.com/office/drawing/2010/main">
+          <mc:Choice Requires="a14">
             <p:sp>
               <p:nvSpPr>
                 <p:cNvPr id="61" name="TextBox 60">
@@ -5518,7 +5539,7 @@
               </p:txBody>
             </p:sp>
           </mc:Choice>
-          <mc:Fallback>
+          <mc:Fallback xmlns="">
             <p:sp>
               <p:nvSpPr>
                 <p:cNvPr id="61" name="TextBox 60">
@@ -5563,8 +5584,8 @@
             </p:sp>
           </mc:Fallback>
         </mc:AlternateContent>
-        <mc:AlternateContent xmlns:mc="http://schemas.openxmlformats.org/markup-compatibility/2006">
-          <mc:Choice xmlns:a14="http://schemas.microsoft.com/office/drawing/2010/main" Requires="a14">
+        <mc:AlternateContent xmlns:mc="http://schemas.openxmlformats.org/markup-compatibility/2006" xmlns:a14="http://schemas.microsoft.com/office/drawing/2010/main">
+          <mc:Choice Requires="a14">
             <p:sp>
               <p:nvSpPr>
                 <p:cNvPr id="62" name="TextBox 61">
@@ -5633,7 +5654,7 @@
               </p:txBody>
             </p:sp>
           </mc:Choice>
-          <mc:Fallback>
+          <mc:Fallback xmlns="">
             <p:sp>
               <p:nvSpPr>
                 <p:cNvPr id="62" name="TextBox 61">

</xml_diff>

<commit_message>
update rendered image and path plotting for presentations
</commit_message>
<xml_diff>
--- a/figs/labeled_realistic_membrane.pptx
+++ b/figs/labeled_realistic_membrane.pptx
@@ -259,7 +259,7 @@
           <a:p>
             <a:fld id="{3FE4A416-97FA-944C-BA97-257286476C07}" type="datetimeFigureOut">
               <a:rPr lang="en-US" smtClean="0"/>
-              <a:t>2/5/24</a:t>
+              <a:t>5/21/24</a:t>
             </a:fld>
             <a:endParaRPr lang="en-US"/>
           </a:p>
@@ -457,7 +457,7 @@
           <a:p>
             <a:fld id="{3FE4A416-97FA-944C-BA97-257286476C07}" type="datetimeFigureOut">
               <a:rPr lang="en-US" smtClean="0"/>
-              <a:t>2/5/24</a:t>
+              <a:t>5/21/24</a:t>
             </a:fld>
             <a:endParaRPr lang="en-US"/>
           </a:p>
@@ -665,7 +665,7 @@
           <a:p>
             <a:fld id="{3FE4A416-97FA-944C-BA97-257286476C07}" type="datetimeFigureOut">
               <a:rPr lang="en-US" smtClean="0"/>
-              <a:t>2/5/24</a:t>
+              <a:t>5/21/24</a:t>
             </a:fld>
             <a:endParaRPr lang="en-US"/>
           </a:p>
@@ -863,7 +863,7 @@
           <a:p>
             <a:fld id="{3FE4A416-97FA-944C-BA97-257286476C07}" type="datetimeFigureOut">
               <a:rPr lang="en-US" smtClean="0"/>
-              <a:t>2/5/24</a:t>
+              <a:t>5/21/24</a:t>
             </a:fld>
             <a:endParaRPr lang="en-US"/>
           </a:p>
@@ -1138,7 +1138,7 @@
           <a:p>
             <a:fld id="{3FE4A416-97FA-944C-BA97-257286476C07}" type="datetimeFigureOut">
               <a:rPr lang="en-US" smtClean="0"/>
-              <a:t>2/5/24</a:t>
+              <a:t>5/21/24</a:t>
             </a:fld>
             <a:endParaRPr lang="en-US"/>
           </a:p>
@@ -1403,7 +1403,7 @@
           <a:p>
             <a:fld id="{3FE4A416-97FA-944C-BA97-257286476C07}" type="datetimeFigureOut">
               <a:rPr lang="en-US" smtClean="0"/>
-              <a:t>2/5/24</a:t>
+              <a:t>5/21/24</a:t>
             </a:fld>
             <a:endParaRPr lang="en-US"/>
           </a:p>
@@ -1815,7 +1815,7 @@
           <a:p>
             <a:fld id="{3FE4A416-97FA-944C-BA97-257286476C07}" type="datetimeFigureOut">
               <a:rPr lang="en-US" smtClean="0"/>
-              <a:t>2/5/24</a:t>
+              <a:t>5/21/24</a:t>
             </a:fld>
             <a:endParaRPr lang="en-US"/>
           </a:p>
@@ -1956,7 +1956,7 @@
           <a:p>
             <a:fld id="{3FE4A416-97FA-944C-BA97-257286476C07}" type="datetimeFigureOut">
               <a:rPr lang="en-US" smtClean="0"/>
-              <a:t>2/5/24</a:t>
+              <a:t>5/21/24</a:t>
             </a:fld>
             <a:endParaRPr lang="en-US"/>
           </a:p>
@@ -2069,7 +2069,7 @@
           <a:p>
             <a:fld id="{3FE4A416-97FA-944C-BA97-257286476C07}" type="datetimeFigureOut">
               <a:rPr lang="en-US" smtClean="0"/>
-              <a:t>2/5/24</a:t>
+              <a:t>5/21/24</a:t>
             </a:fld>
             <a:endParaRPr lang="en-US"/>
           </a:p>
@@ -2380,7 +2380,7 @@
           <a:p>
             <a:fld id="{3FE4A416-97FA-944C-BA97-257286476C07}" type="datetimeFigureOut">
               <a:rPr lang="en-US" smtClean="0"/>
-              <a:t>2/5/24</a:t>
+              <a:t>5/21/24</a:t>
             </a:fld>
             <a:endParaRPr lang="en-US"/>
           </a:p>
@@ -2668,7 +2668,7 @@
           <a:p>
             <a:fld id="{3FE4A416-97FA-944C-BA97-257286476C07}" type="datetimeFigureOut">
               <a:rPr lang="en-US" smtClean="0"/>
-              <a:t>2/5/24</a:t>
+              <a:t>5/21/24</a:t>
             </a:fld>
             <a:endParaRPr lang="en-US"/>
           </a:p>
@@ -2909,7 +2909,7 @@
           <a:p>
             <a:fld id="{3FE4A416-97FA-944C-BA97-257286476C07}" type="datetimeFigureOut">
               <a:rPr lang="en-US" smtClean="0"/>
-              <a:t>2/5/24</a:t>
+              <a:t>5/21/24</a:t>
             </a:fld>
             <a:endParaRPr lang="en-US"/>
           </a:p>
@@ -4427,7 +4427,7 @@
               <p:spPr>
                 <a:xfrm>
                   <a:off x="5821179" y="5398221"/>
-                  <a:ext cx="1731179" cy="523220"/>
+                  <a:ext cx="1727974" cy="523220"/>
                 </a:xfrm>
                 <a:prstGeom prst="rect">
                   <a:avLst/>
@@ -4462,9 +4462,8 @@
                         <m:r>
                           <a:rPr lang="en-US" sz="2800" b="1" i="1" smtClean="0">
                             <a:latin typeface="Cambria Math" panose="02040503050406030204" pitchFamily="18" charset="0"/>
-                            <a:ea typeface="Cambria Math" panose="02040503050406030204" pitchFamily="18" charset="0"/>
                           </a:rPr>
-                          <m:t>𝒎</m:t>
+                          <m:t>𝑴</m:t>
                         </m:r>
                         <m:sSub>
                           <m:sSubPr>
@@ -4490,7 +4489,7 @@
                                 <a:latin typeface="Cambria Math" panose="02040503050406030204" pitchFamily="18" charset="0"/>
                                 <a:ea typeface="Cambria Math" panose="02040503050406030204" pitchFamily="18" charset="0"/>
                               </a:rPr>
-                              <m:t>𝑴</m:t>
+                              <m:t>𝒎</m:t>
                             </m:r>
                           </m:sub>
                         </m:sSub>
@@ -4520,7 +4519,7 @@
               <p:spPr>
                 <a:xfrm>
                   <a:off x="5821179" y="5398221"/>
-                  <a:ext cx="1731179" cy="523220"/>
+                  <a:ext cx="1727974" cy="523220"/>
                 </a:xfrm>
                 <a:prstGeom prst="rect">
                   <a:avLst/>
@@ -4528,7 +4527,7 @@
                 <a:blipFill>
                   <a:blip r:embed="rId5"/>
                   <a:stretch>
-                    <a:fillRect b="-2381"/>
+                    <a:fillRect/>
                   </a:stretch>
                 </a:blipFill>
               </p:spPr>
@@ -4729,8 +4728,8 @@
             </p:style>
           </p:cxnSp>
         </p:grpSp>
-        <mc:AlternateContent xmlns:mc="http://schemas.openxmlformats.org/markup-compatibility/2006" xmlns:a14="http://schemas.microsoft.com/office/drawing/2010/main">
-          <mc:Choice Requires="a14">
+        <mc:AlternateContent xmlns:mc="http://schemas.openxmlformats.org/markup-compatibility/2006">
+          <mc:Choice xmlns:a14="http://schemas.microsoft.com/office/drawing/2010/main" Requires="a14">
             <p:sp>
               <p:nvSpPr>
                 <p:cNvPr id="41" name="TextBox 40">
@@ -4746,7 +4745,7 @@
               <p:spPr>
                 <a:xfrm>
                   <a:off x="4203533" y="3174497"/>
-                  <a:ext cx="519821" cy="430887"/>
+                  <a:ext cx="532325" cy="430887"/>
                 </a:xfrm>
                 <a:prstGeom prst="rect">
                   <a:avLst/>
@@ -4787,7 +4786,7 @@
                               <a:rPr lang="en-US" sz="2800" b="0" i="1" smtClean="0">
                                 <a:latin typeface="Cambria Math" panose="02040503050406030204" pitchFamily="18" charset="0"/>
                               </a:rPr>
-                              <m:t>𝑀</m:t>
+                              <m:t>𝑚</m:t>
                             </m:r>
                           </m:sub>
                         </m:sSub>
@@ -4799,7 +4798,7 @@
               </p:txBody>
             </p:sp>
           </mc:Choice>
-          <mc:Fallback xmlns="">
+          <mc:Fallback>
             <p:sp>
               <p:nvSpPr>
                 <p:cNvPr id="41" name="TextBox 40">
@@ -4817,7 +4816,7 @@
               <p:spPr>
                 <a:xfrm>
                   <a:off x="4203533" y="3174497"/>
-                  <a:ext cx="519821" cy="430887"/>
+                  <a:ext cx="532325" cy="430887"/>
                 </a:xfrm>
                 <a:prstGeom prst="rect">
                   <a:avLst/>
@@ -4825,7 +4824,7 @@
                 <a:blipFill>
                   <a:blip r:embed="rId7"/>
                   <a:stretch>
-                    <a:fillRect l="-17073" r="-4878" b="-14706"/>
+                    <a:fillRect l="-16667" r="-2381" b="-11765"/>
                   </a:stretch>
                 </a:blipFill>
               </p:spPr>
@@ -5239,8 +5238,8 @@
             </mc:AlternateContent>
           </p:grpSp>
         </p:grpSp>
-        <mc:AlternateContent xmlns:mc="http://schemas.openxmlformats.org/markup-compatibility/2006" xmlns:a14="http://schemas.microsoft.com/office/drawing/2010/main">
-          <mc:Choice Requires="a14">
+        <mc:AlternateContent xmlns:mc="http://schemas.openxmlformats.org/markup-compatibility/2006">
+          <mc:Choice xmlns:a14="http://schemas.microsoft.com/office/drawing/2010/main" Requires="a14">
             <p:sp>
               <p:nvSpPr>
                 <p:cNvPr id="59" name="TextBox 58">
@@ -5256,7 +5255,7 @@
               <p:spPr>
                 <a:xfrm>
                   <a:off x="5533830" y="3212710"/>
-                  <a:ext cx="519821" cy="430887"/>
+                  <a:ext cx="532325" cy="430887"/>
                 </a:xfrm>
                 <a:prstGeom prst="rect">
                   <a:avLst/>
@@ -5297,7 +5296,7 @@
                               <a:rPr lang="en-US" sz="2800" b="0" i="1" smtClean="0">
                                 <a:latin typeface="Cambria Math" panose="02040503050406030204" pitchFamily="18" charset="0"/>
                               </a:rPr>
-                              <m:t>𝑀</m:t>
+                              <m:t>𝑚</m:t>
                             </m:r>
                           </m:sub>
                         </m:sSub>
@@ -5309,7 +5308,7 @@
               </p:txBody>
             </p:sp>
           </mc:Choice>
-          <mc:Fallback xmlns="">
+          <mc:Fallback>
             <p:sp>
               <p:nvSpPr>
                 <p:cNvPr id="59" name="TextBox 58">
@@ -5327,7 +5326,7 @@
               <p:spPr>
                 <a:xfrm>
                   <a:off x="5533830" y="3212710"/>
-                  <a:ext cx="519821" cy="430887"/>
+                  <a:ext cx="532325" cy="430887"/>
                 </a:xfrm>
                 <a:prstGeom prst="rect">
                   <a:avLst/>
@@ -5335,7 +5334,7 @@
                 <a:blipFill>
                   <a:blip r:embed="rId9"/>
                   <a:stretch>
-                    <a:fillRect l="-16667" r="-4762" b="-11111"/>
+                    <a:fillRect l="-16279" r="-2326" b="-5556"/>
                   </a:stretch>
                 </a:blipFill>
               </p:spPr>
@@ -5354,8 +5353,8 @@
             </p:sp>
           </mc:Fallback>
         </mc:AlternateContent>
-        <mc:AlternateContent xmlns:mc="http://schemas.openxmlformats.org/markup-compatibility/2006" xmlns:a14="http://schemas.microsoft.com/office/drawing/2010/main">
-          <mc:Choice Requires="a14">
+        <mc:AlternateContent xmlns:mc="http://schemas.openxmlformats.org/markup-compatibility/2006">
+          <mc:Choice xmlns:a14="http://schemas.microsoft.com/office/drawing/2010/main" Requires="a14">
             <p:sp>
               <p:nvSpPr>
                 <p:cNvPr id="60" name="TextBox 59">
@@ -5371,7 +5370,7 @@
               <p:spPr>
                 <a:xfrm>
                   <a:off x="6794655" y="3212710"/>
-                  <a:ext cx="519821" cy="430887"/>
+                  <a:ext cx="532325" cy="430887"/>
                 </a:xfrm>
                 <a:prstGeom prst="rect">
                   <a:avLst/>
@@ -5412,7 +5411,7 @@
                               <a:rPr lang="en-US" sz="2800" b="0" i="1" smtClean="0">
                                 <a:latin typeface="Cambria Math" panose="02040503050406030204" pitchFamily="18" charset="0"/>
                               </a:rPr>
-                              <m:t>𝑀</m:t>
+                              <m:t>𝑚</m:t>
                             </m:r>
                           </m:sub>
                         </m:sSub>
@@ -5424,7 +5423,7 @@
               </p:txBody>
             </p:sp>
           </mc:Choice>
-          <mc:Fallback xmlns="">
+          <mc:Fallback>
             <p:sp>
               <p:nvSpPr>
                 <p:cNvPr id="60" name="TextBox 59">
@@ -5442,7 +5441,7 @@
               <p:spPr>
                 <a:xfrm>
                   <a:off x="6794655" y="3212710"/>
-                  <a:ext cx="519821" cy="430887"/>
+                  <a:ext cx="532325" cy="430887"/>
                 </a:xfrm>
                 <a:prstGeom prst="rect">
                   <a:avLst/>
@@ -5450,7 +5449,7 @@
                 <a:blipFill>
                   <a:blip r:embed="rId10"/>
                   <a:stretch>
-                    <a:fillRect l="-17073" r="-4878" b="-11111"/>
+                    <a:fillRect l="-16667" r="-2381" b="-5556"/>
                   </a:stretch>
                 </a:blipFill>
               </p:spPr>
@@ -5469,8 +5468,8 @@
             </p:sp>
           </mc:Fallback>
         </mc:AlternateContent>
-        <mc:AlternateContent xmlns:mc="http://schemas.openxmlformats.org/markup-compatibility/2006" xmlns:a14="http://schemas.microsoft.com/office/drawing/2010/main">
-          <mc:Choice Requires="a14">
+        <mc:AlternateContent xmlns:mc="http://schemas.openxmlformats.org/markup-compatibility/2006">
+          <mc:Choice xmlns:a14="http://schemas.microsoft.com/office/drawing/2010/main" Requires="a14">
             <p:sp>
               <p:nvSpPr>
                 <p:cNvPr id="61" name="TextBox 60">
@@ -5486,7 +5485,7 @@
               <p:spPr>
                 <a:xfrm>
                   <a:off x="8077063" y="3204243"/>
-                  <a:ext cx="519821" cy="430887"/>
+                  <a:ext cx="532325" cy="430887"/>
                 </a:xfrm>
                 <a:prstGeom prst="rect">
                   <a:avLst/>
@@ -5527,7 +5526,7 @@
                               <a:rPr lang="en-US" sz="2800" b="0" i="1" smtClean="0">
                                 <a:latin typeface="Cambria Math" panose="02040503050406030204" pitchFamily="18" charset="0"/>
                               </a:rPr>
-                              <m:t>𝑀</m:t>
+                              <m:t>𝑚</m:t>
                             </m:r>
                           </m:sub>
                         </m:sSub>
@@ -5539,7 +5538,7 @@
               </p:txBody>
             </p:sp>
           </mc:Choice>
-          <mc:Fallback xmlns="">
+          <mc:Fallback>
             <p:sp>
               <p:nvSpPr>
                 <p:cNvPr id="61" name="TextBox 60">
@@ -5557,7 +5556,7 @@
               <p:spPr>
                 <a:xfrm>
                   <a:off x="8077063" y="3204243"/>
-                  <a:ext cx="519821" cy="430887"/>
+                  <a:ext cx="532325" cy="430887"/>
                 </a:xfrm>
                 <a:prstGeom prst="rect">
                   <a:avLst/>
@@ -5565,7 +5564,7 @@
                 <a:blipFill>
                   <a:blip r:embed="rId11"/>
                   <a:stretch>
-                    <a:fillRect l="-17073" r="-4878" b="-11429"/>
+                    <a:fillRect l="-16667" r="-2381" b="-8571"/>
                   </a:stretch>
                 </a:blipFill>
               </p:spPr>
@@ -5807,8 +5806,8 @@
               </a:fontRef>
             </p:style>
           </p:cxnSp>
-          <mc:AlternateContent xmlns:mc="http://schemas.openxmlformats.org/markup-compatibility/2006" xmlns:a14="http://schemas.microsoft.com/office/drawing/2010/main">
-            <mc:Choice Requires="a14">
+          <mc:AlternateContent xmlns:mc="http://schemas.openxmlformats.org/markup-compatibility/2006">
+            <mc:Choice xmlns:a14="http://schemas.microsoft.com/office/drawing/2010/main" Requires="a14">
               <p:sp>
                 <p:nvSpPr>
                   <p:cNvPr id="66" name="TextBox 65">
@@ -5824,7 +5823,7 @@
                 <p:spPr>
                   <a:xfrm>
                     <a:off x="2375860" y="545028"/>
-                    <a:ext cx="535852" cy="430887"/>
+                    <a:ext cx="545149" cy="430887"/>
                   </a:xfrm>
                   <a:prstGeom prst="rect">
                     <a:avLst/>
@@ -5865,7 +5864,7 @@
                                 <a:rPr lang="en-US" sz="2800" b="0" i="1" smtClean="0">
                                   <a:latin typeface="Cambria Math" panose="02040503050406030204" pitchFamily="18" charset="0"/>
                                 </a:rPr>
-                                <m:t>𝑀</m:t>
+                                <m:t>𝑚</m:t>
                               </m:r>
                             </m:sub>
                           </m:sSub>
@@ -5877,7 +5876,7 @@
                 </p:txBody>
               </p:sp>
             </mc:Choice>
-            <mc:Fallback xmlns="">
+            <mc:Fallback>
               <p:sp>
                 <p:nvSpPr>
                   <p:cNvPr id="66" name="TextBox 65">
@@ -5895,7 +5894,7 @@
                 <p:spPr>
                   <a:xfrm>
                     <a:off x="2375860" y="545028"/>
-                    <a:ext cx="535852" cy="430887"/>
+                    <a:ext cx="545149" cy="430887"/>
                   </a:xfrm>
                   <a:prstGeom prst="rect">
                     <a:avLst/>
@@ -5903,7 +5902,7 @@
                   <a:blipFill>
                     <a:blip r:embed="rId13"/>
                     <a:stretch>
-                      <a:fillRect l="-16279" r="-2326" b="-11429"/>
+                      <a:fillRect l="-15909" b="-8571"/>
                     </a:stretch>
                   </a:blipFill>
                 </p:spPr>
@@ -5922,8 +5921,8 @@
               </p:sp>
             </mc:Fallback>
           </mc:AlternateContent>
-          <mc:AlternateContent xmlns:mc="http://schemas.openxmlformats.org/markup-compatibility/2006" xmlns:a14="http://schemas.microsoft.com/office/drawing/2010/main">
-            <mc:Choice Requires="a14">
+          <mc:AlternateContent xmlns:mc="http://schemas.openxmlformats.org/markup-compatibility/2006">
+            <mc:Choice xmlns:a14="http://schemas.microsoft.com/office/drawing/2010/main" Requires="a14">
               <p:sp>
                 <p:nvSpPr>
                   <p:cNvPr id="67" name="TextBox 66">
@@ -5939,7 +5938,7 @@
                 <p:spPr>
                   <a:xfrm>
                     <a:off x="2375860" y="1256408"/>
-                    <a:ext cx="535852" cy="430887"/>
+                    <a:ext cx="545149" cy="430887"/>
                   </a:xfrm>
                   <a:prstGeom prst="rect">
                     <a:avLst/>
@@ -5980,7 +5979,7 @@
                                 <a:rPr lang="en-US" sz="2800" b="0" i="1" smtClean="0">
                                   <a:latin typeface="Cambria Math" panose="02040503050406030204" pitchFamily="18" charset="0"/>
                                 </a:rPr>
-                                <m:t>𝑀</m:t>
+                                <m:t>𝑚</m:t>
                               </m:r>
                             </m:sub>
                           </m:sSub>
@@ -5992,7 +5991,7 @@
                 </p:txBody>
               </p:sp>
             </mc:Choice>
-            <mc:Fallback xmlns="">
+            <mc:Fallback>
               <p:sp>
                 <p:nvSpPr>
                   <p:cNvPr id="67" name="TextBox 66">
@@ -6010,15 +6009,15 @@
                 <p:spPr>
                   <a:xfrm>
                     <a:off x="2375860" y="1256408"/>
-                    <a:ext cx="535852" cy="430887"/>
+                    <a:ext cx="545149" cy="430887"/>
                   </a:xfrm>
                   <a:prstGeom prst="rect">
                     <a:avLst/>
                   </a:prstGeom>
                   <a:blipFill>
-                    <a:blip r:embed="rId14"/>
+                    <a:blip r:embed="rId13"/>
                     <a:stretch>
-                      <a:fillRect l="-16279" r="-2326" b="-14286"/>
+                      <a:fillRect l="-15909" b="-8571"/>
                     </a:stretch>
                   </a:blipFill>
                 </p:spPr>
@@ -6146,8 +6145,8 @@
               </a:fontRef>
             </p:style>
           </p:cxnSp>
-          <mc:AlternateContent xmlns:mc="http://schemas.openxmlformats.org/markup-compatibility/2006" xmlns:a14="http://schemas.microsoft.com/office/drawing/2010/main">
-            <mc:Choice Requires="a14">
+          <mc:AlternateContent xmlns:mc="http://schemas.openxmlformats.org/markup-compatibility/2006">
+            <mc:Choice xmlns:a14="http://schemas.microsoft.com/office/drawing/2010/main" Requires="a14">
               <p:sp>
                 <p:nvSpPr>
                   <p:cNvPr id="71" name="TextBox 70">
@@ -6163,7 +6162,7 @@
                 <p:spPr>
                   <a:xfrm>
                     <a:off x="2375860" y="545028"/>
-                    <a:ext cx="535852" cy="430887"/>
+                    <a:ext cx="545149" cy="430887"/>
                   </a:xfrm>
                   <a:prstGeom prst="rect">
                     <a:avLst/>
@@ -6204,7 +6203,7 @@
                                 <a:rPr lang="en-US" sz="2800" b="0" i="1" smtClean="0">
                                   <a:latin typeface="Cambria Math" panose="02040503050406030204" pitchFamily="18" charset="0"/>
                                 </a:rPr>
-                                <m:t>𝑀</m:t>
+                                <m:t>𝑚</m:t>
                               </m:r>
                             </m:sub>
                           </m:sSub>
@@ -6216,7 +6215,7 @@
                 </p:txBody>
               </p:sp>
             </mc:Choice>
-            <mc:Fallback xmlns="">
+            <mc:Fallback>
               <p:sp>
                 <p:nvSpPr>
                   <p:cNvPr id="71" name="TextBox 70">
@@ -6234,15 +6233,15 @@
                 <p:spPr>
                   <a:xfrm>
                     <a:off x="2375860" y="545028"/>
-                    <a:ext cx="535852" cy="430887"/>
+                    <a:ext cx="545149" cy="430887"/>
                   </a:xfrm>
                   <a:prstGeom prst="rect">
                     <a:avLst/>
                   </a:prstGeom>
                   <a:blipFill>
-                    <a:blip r:embed="rId15"/>
+                    <a:blip r:embed="rId14"/>
                     <a:stretch>
-                      <a:fillRect l="-16279" r="-4651" b="-14706"/>
+                      <a:fillRect l="-15909" b="-11765"/>
                     </a:stretch>
                   </a:blipFill>
                 </p:spPr>
@@ -6261,8 +6260,8 @@
               </p:sp>
             </mc:Fallback>
           </mc:AlternateContent>
-          <mc:AlternateContent xmlns:mc="http://schemas.openxmlformats.org/markup-compatibility/2006" xmlns:a14="http://schemas.microsoft.com/office/drawing/2010/main">
-            <mc:Choice Requires="a14">
+          <mc:AlternateContent xmlns:mc="http://schemas.openxmlformats.org/markup-compatibility/2006">
+            <mc:Choice xmlns:a14="http://schemas.microsoft.com/office/drawing/2010/main" Requires="a14">
               <p:sp>
                 <p:nvSpPr>
                   <p:cNvPr id="72" name="TextBox 71">
@@ -6278,7 +6277,7 @@
                 <p:spPr>
                   <a:xfrm>
                     <a:off x="2375860" y="1256408"/>
-                    <a:ext cx="535852" cy="430887"/>
+                    <a:ext cx="545149" cy="430887"/>
                   </a:xfrm>
                   <a:prstGeom prst="rect">
                     <a:avLst/>
@@ -6319,7 +6318,7 @@
                                 <a:rPr lang="en-US" sz="2800" b="0" i="1" smtClean="0">
                                   <a:latin typeface="Cambria Math" panose="02040503050406030204" pitchFamily="18" charset="0"/>
                                 </a:rPr>
-                                <m:t>𝑀</m:t>
+                                <m:t>𝑚</m:t>
                               </m:r>
                             </m:sub>
                           </m:sSub>
@@ -6331,7 +6330,7 @@
                 </p:txBody>
               </p:sp>
             </mc:Choice>
-            <mc:Fallback xmlns="">
+            <mc:Fallback>
               <p:sp>
                 <p:nvSpPr>
                   <p:cNvPr id="72" name="TextBox 71">
@@ -6349,15 +6348,15 @@
                 <p:spPr>
                   <a:xfrm>
                     <a:off x="2375860" y="1256408"/>
-                    <a:ext cx="535852" cy="430887"/>
+                    <a:ext cx="545149" cy="430887"/>
                   </a:xfrm>
                   <a:prstGeom prst="rect">
                     <a:avLst/>
                   </a:prstGeom>
                   <a:blipFill>
-                    <a:blip r:embed="rId16"/>
+                    <a:blip r:embed="rId15"/>
                     <a:stretch>
-                      <a:fillRect l="-16279" r="-4651" b="-11111"/>
+                      <a:fillRect l="-15909" b="-5556"/>
                     </a:stretch>
                   </a:blipFill>
                 </p:spPr>
@@ -6485,8 +6484,8 @@
               </a:fontRef>
             </p:style>
           </p:cxnSp>
-          <mc:AlternateContent xmlns:mc="http://schemas.openxmlformats.org/markup-compatibility/2006" xmlns:a14="http://schemas.microsoft.com/office/drawing/2010/main">
-            <mc:Choice Requires="a14">
+          <mc:AlternateContent xmlns:mc="http://schemas.openxmlformats.org/markup-compatibility/2006">
+            <mc:Choice xmlns:a14="http://schemas.microsoft.com/office/drawing/2010/main" Requires="a14">
               <p:sp>
                 <p:nvSpPr>
                   <p:cNvPr id="76" name="TextBox 75">
@@ -6502,7 +6501,7 @@
                 <p:spPr>
                   <a:xfrm>
                     <a:off x="2375860" y="545028"/>
-                    <a:ext cx="535852" cy="430887"/>
+                    <a:ext cx="545149" cy="430887"/>
                   </a:xfrm>
                   <a:prstGeom prst="rect">
                     <a:avLst/>
@@ -6543,7 +6542,7 @@
                                 <a:rPr lang="en-US" sz="2800" b="0" i="1" smtClean="0">
                                   <a:latin typeface="Cambria Math" panose="02040503050406030204" pitchFamily="18" charset="0"/>
                                 </a:rPr>
-                                <m:t>𝑀</m:t>
+                                <m:t>𝑚</m:t>
                               </m:r>
                             </m:sub>
                           </m:sSub>
@@ -6555,7 +6554,7 @@
                 </p:txBody>
               </p:sp>
             </mc:Choice>
-            <mc:Fallback xmlns="">
+            <mc:Fallback>
               <p:sp>
                 <p:nvSpPr>
                   <p:cNvPr id="76" name="TextBox 75">
@@ -6573,15 +6572,15 @@
                 <p:spPr>
                   <a:xfrm>
                     <a:off x="2375860" y="545028"/>
-                    <a:ext cx="535852" cy="430887"/>
+                    <a:ext cx="545149" cy="430887"/>
                   </a:xfrm>
                   <a:prstGeom prst="rect">
                     <a:avLst/>
                   </a:prstGeom>
                   <a:blipFill>
-                    <a:blip r:embed="rId17"/>
+                    <a:blip r:embed="rId16"/>
                     <a:stretch>
-                      <a:fillRect l="-16279" r="-2326" b="-14286"/>
+                      <a:fillRect l="-15909" b="-8571"/>
                     </a:stretch>
                   </a:blipFill>
                 </p:spPr>
@@ -6600,8 +6599,8 @@
               </p:sp>
             </mc:Fallback>
           </mc:AlternateContent>
-          <mc:AlternateContent xmlns:mc="http://schemas.openxmlformats.org/markup-compatibility/2006" xmlns:a14="http://schemas.microsoft.com/office/drawing/2010/main">
-            <mc:Choice Requires="a14">
+          <mc:AlternateContent xmlns:mc="http://schemas.openxmlformats.org/markup-compatibility/2006">
+            <mc:Choice xmlns:a14="http://schemas.microsoft.com/office/drawing/2010/main" Requires="a14">
               <p:sp>
                 <p:nvSpPr>
                   <p:cNvPr id="77" name="TextBox 76">
@@ -6617,7 +6616,7 @@
                 <p:spPr>
                   <a:xfrm>
                     <a:off x="2375860" y="1256408"/>
-                    <a:ext cx="535852" cy="430887"/>
+                    <a:ext cx="545149" cy="430887"/>
                   </a:xfrm>
                   <a:prstGeom prst="rect">
                     <a:avLst/>
@@ -6658,7 +6657,7 @@
                                 <a:rPr lang="en-US" sz="2800" b="0" i="1" smtClean="0">
                                   <a:latin typeface="Cambria Math" panose="02040503050406030204" pitchFamily="18" charset="0"/>
                                 </a:rPr>
-                                <m:t>𝑀</m:t>
+                                <m:t>𝑚</m:t>
                               </m:r>
                             </m:sub>
                           </m:sSub>
@@ -6670,7 +6669,7 @@
                 </p:txBody>
               </p:sp>
             </mc:Choice>
-            <mc:Fallback xmlns="">
+            <mc:Fallback>
               <p:sp>
                 <p:nvSpPr>
                   <p:cNvPr id="77" name="TextBox 76">
@@ -6688,15 +6687,15 @@
                 <p:spPr>
                   <a:xfrm>
                     <a:off x="2375860" y="1256408"/>
-                    <a:ext cx="535852" cy="430887"/>
+                    <a:ext cx="545149" cy="430887"/>
                   </a:xfrm>
                   <a:prstGeom prst="rect">
                     <a:avLst/>
                   </a:prstGeom>
                   <a:blipFill>
-                    <a:blip r:embed="rId17"/>
+                    <a:blip r:embed="rId16"/>
                     <a:stretch>
-                      <a:fillRect l="-16279" r="-2326" b="-14286"/>
+                      <a:fillRect l="-15909" b="-8571"/>
                     </a:stretch>
                   </a:blipFill>
                 </p:spPr>
@@ -6824,8 +6823,8 @@
               </a:fontRef>
             </p:style>
           </p:cxnSp>
-          <mc:AlternateContent xmlns:mc="http://schemas.openxmlformats.org/markup-compatibility/2006" xmlns:a14="http://schemas.microsoft.com/office/drawing/2010/main">
-            <mc:Choice Requires="a14">
+          <mc:AlternateContent xmlns:mc="http://schemas.openxmlformats.org/markup-compatibility/2006">
+            <mc:Choice xmlns:a14="http://schemas.microsoft.com/office/drawing/2010/main" Requires="a14">
               <p:sp>
                 <p:nvSpPr>
                   <p:cNvPr id="81" name="TextBox 80">
@@ -6841,7 +6840,7 @@
                 <p:spPr>
                   <a:xfrm>
                     <a:off x="2375860" y="545028"/>
-                    <a:ext cx="535852" cy="430887"/>
+                    <a:ext cx="545149" cy="430887"/>
                   </a:xfrm>
                   <a:prstGeom prst="rect">
                     <a:avLst/>
@@ -6882,7 +6881,7 @@
                                 <a:rPr lang="en-US" sz="2800" b="0" i="1" smtClean="0">
                                   <a:latin typeface="Cambria Math" panose="02040503050406030204" pitchFamily="18" charset="0"/>
                                 </a:rPr>
-                                <m:t>𝑀</m:t>
+                                <m:t>𝑚</m:t>
                               </m:r>
                             </m:sub>
                           </m:sSub>
@@ -6894,7 +6893,7 @@
                 </p:txBody>
               </p:sp>
             </mc:Choice>
-            <mc:Fallback xmlns="">
+            <mc:Fallback>
               <p:sp>
                 <p:nvSpPr>
                   <p:cNvPr id="81" name="TextBox 80">
@@ -6912,15 +6911,15 @@
                 <p:spPr>
                   <a:xfrm>
                     <a:off x="2375860" y="545028"/>
-                    <a:ext cx="535852" cy="430887"/>
+                    <a:ext cx="545149" cy="430887"/>
                   </a:xfrm>
                   <a:prstGeom prst="rect">
                     <a:avLst/>
                   </a:prstGeom>
                   <a:blipFill>
-                    <a:blip r:embed="rId18"/>
+                    <a:blip r:embed="rId17"/>
                     <a:stretch>
-                      <a:fillRect l="-16279" r="-4651" b="-14286"/>
+                      <a:fillRect l="-15909" b="-8571"/>
                     </a:stretch>
                   </a:blipFill>
                 </p:spPr>
@@ -6939,8 +6938,8 @@
               </p:sp>
             </mc:Fallback>
           </mc:AlternateContent>
-          <mc:AlternateContent xmlns:mc="http://schemas.openxmlformats.org/markup-compatibility/2006" xmlns:a14="http://schemas.microsoft.com/office/drawing/2010/main">
-            <mc:Choice Requires="a14">
+          <mc:AlternateContent xmlns:mc="http://schemas.openxmlformats.org/markup-compatibility/2006">
+            <mc:Choice xmlns:a14="http://schemas.microsoft.com/office/drawing/2010/main" Requires="a14">
               <p:sp>
                 <p:nvSpPr>
                   <p:cNvPr id="82" name="TextBox 81">
@@ -6956,7 +6955,7 @@
                 <p:spPr>
                   <a:xfrm>
                     <a:off x="2375860" y="1256408"/>
-                    <a:ext cx="535852" cy="430887"/>
+                    <a:ext cx="545149" cy="430887"/>
                   </a:xfrm>
                   <a:prstGeom prst="rect">
                     <a:avLst/>
@@ -6997,7 +6996,7 @@
                                 <a:rPr lang="en-US" sz="2800" b="0" i="1" smtClean="0">
                                   <a:latin typeface="Cambria Math" panose="02040503050406030204" pitchFamily="18" charset="0"/>
                                 </a:rPr>
-                                <m:t>𝑀</m:t>
+                                <m:t>𝑚</m:t>
                               </m:r>
                             </m:sub>
                           </m:sSub>
@@ -7009,7 +7008,7 @@
                 </p:txBody>
               </p:sp>
             </mc:Choice>
-            <mc:Fallback xmlns="">
+            <mc:Fallback>
               <p:sp>
                 <p:nvSpPr>
                   <p:cNvPr id="82" name="TextBox 81">
@@ -7027,15 +7026,15 @@
                 <p:spPr>
                   <a:xfrm>
                     <a:off x="2375860" y="1256408"/>
-                    <a:ext cx="535852" cy="430887"/>
+                    <a:ext cx="545149" cy="430887"/>
                   </a:xfrm>
                   <a:prstGeom prst="rect">
                     <a:avLst/>
                   </a:prstGeom>
                   <a:blipFill>
-                    <a:blip r:embed="rId19"/>
+                    <a:blip r:embed="rId18"/>
                     <a:stretch>
-                      <a:fillRect l="-16279" r="-4651" b="-11429"/>
+                      <a:fillRect l="-15909" b="-5714"/>
                     </a:stretch>
                   </a:blipFill>
                 </p:spPr>

</xml_diff>

<commit_message>
Update figures with lower case m for membrane subscript
</commit_message>
<xml_diff>
--- a/figs/labeled_realistic_membrane.pptx
+++ b/figs/labeled_realistic_membrane.pptx
@@ -3341,9 +3341,9 @@
         <p:grpSpPr>
           <a:xfrm>
             <a:off x="798311" y="519357"/>
-            <a:ext cx="10660721" cy="5439046"/>
+            <a:ext cx="10740871" cy="5439046"/>
             <a:chOff x="798311" y="519357"/>
-            <a:chExt cx="10660721" cy="5439046"/>
+            <a:chExt cx="10740871" cy="5439046"/>
           </a:xfrm>
         </p:grpSpPr>
         <p:pic>
@@ -3484,8 +3484,8 @@
               </a:fontRef>
             </p:style>
           </p:cxnSp>
-          <mc:AlternateContent xmlns:mc="http://schemas.openxmlformats.org/markup-compatibility/2006" xmlns:a14="http://schemas.microsoft.com/office/drawing/2010/main">
-            <mc:Choice Requires="a14">
+          <mc:AlternateContent xmlns:mc="http://schemas.openxmlformats.org/markup-compatibility/2006">
+            <mc:Choice xmlns:a14="http://schemas.microsoft.com/office/drawing/2010/main" Requires="a14">
               <p:sp>
                 <p:nvSpPr>
                   <p:cNvPr id="18" name="TextBox 17">
@@ -3549,12 +3549,14 @@
                         </m:oMath>
                       </m:oMathPara>
                     </a14:m>
-                    <a:endParaRPr lang="en-US" sz="2800" dirty="0"/>
+                    <a:endParaRPr lang="en-US" sz="2800" dirty="0">
+                      <a:latin typeface="Helvetica" pitchFamily="2" charset="0"/>
+                    </a:endParaRPr>
                   </a:p>
                 </p:txBody>
               </p:sp>
             </mc:Choice>
-            <mc:Fallback xmlns="">
+            <mc:Fallback>
               <p:sp>
                 <p:nvSpPr>
                   <p:cNvPr id="18" name="TextBox 17">
@@ -3599,8 +3601,8 @@
               </p:sp>
             </mc:Fallback>
           </mc:AlternateContent>
-          <mc:AlternateContent xmlns:mc="http://schemas.openxmlformats.org/markup-compatibility/2006" xmlns:a14="http://schemas.microsoft.com/office/drawing/2010/main">
-            <mc:Choice Requires="a14">
+          <mc:AlternateContent xmlns:mc="http://schemas.openxmlformats.org/markup-compatibility/2006">
+            <mc:Choice xmlns:a14="http://schemas.microsoft.com/office/drawing/2010/main" Requires="a14">
               <p:sp>
                 <p:nvSpPr>
                   <p:cNvPr id="19" name="TextBox 18">
@@ -3664,12 +3666,14 @@
                         </m:oMath>
                       </m:oMathPara>
                     </a14:m>
-                    <a:endParaRPr lang="en-US" sz="2800" dirty="0"/>
+                    <a:endParaRPr lang="en-US" sz="2800" dirty="0">
+                      <a:latin typeface="Helvetica" pitchFamily="2" charset="0"/>
+                    </a:endParaRPr>
                   </a:p>
                 </p:txBody>
               </p:sp>
             </mc:Choice>
-            <mc:Fallback xmlns="">
+            <mc:Fallback>
               <p:sp>
                 <p:nvSpPr>
                   <p:cNvPr id="19" name="TextBox 18">
@@ -4427,7 +4431,7 @@
               <p:spPr>
                 <a:xfrm>
                   <a:off x="5821179" y="5398221"/>
-                  <a:ext cx="1727974" cy="523220"/>
+                  <a:ext cx="1748812" cy="523220"/>
                 </a:xfrm>
                 <a:prstGeom prst="rect">
                   <a:avLst/>
@@ -4496,7 +4500,9 @@
                       </m:oMath>
                     </m:oMathPara>
                   </a14:m>
-                  <a:endParaRPr lang="en-US" sz="2800" b="1" dirty="0"/>
+                  <a:endParaRPr lang="en-US" sz="2800" b="1" dirty="0">
+                    <a:latin typeface="Helvetica" pitchFamily="2" charset="0"/>
+                  </a:endParaRPr>
                 </a:p>
               </p:txBody>
             </p:sp>
@@ -4519,7 +4525,7 @@
               <p:spPr>
                 <a:xfrm>
                   <a:off x="5821179" y="5398221"/>
-                  <a:ext cx="1727974" cy="523220"/>
+                  <a:ext cx="1748812" cy="523220"/>
                 </a:xfrm>
                 <a:prstGeom prst="rect">
                   <a:avLst/>
@@ -4566,8 +4572,8 @@
               <a:chExt cx="1302327" cy="430887"/>
             </a:xfrm>
           </p:grpSpPr>
-          <mc:AlternateContent xmlns:mc="http://schemas.openxmlformats.org/markup-compatibility/2006" xmlns:a14="http://schemas.microsoft.com/office/drawing/2010/main">
-            <mc:Choice Requires="a14">
+          <mc:AlternateContent xmlns:mc="http://schemas.openxmlformats.org/markup-compatibility/2006">
+            <mc:Choice xmlns:a14="http://schemas.microsoft.com/office/drawing/2010/main" Requires="a14">
               <p:sp>
                 <p:nvSpPr>
                   <p:cNvPr id="32" name="TextBox 31">
@@ -4583,7 +4589,7 @@
                 <p:spPr>
                   <a:xfrm>
                     <a:off x="2873352" y="4213148"/>
-                    <a:ext cx="658963" cy="430887"/>
+                    <a:ext cx="676595" cy="430887"/>
                   </a:xfrm>
                   <a:prstGeom prst="rect">
                     <a:avLst/>
@@ -4631,12 +4637,14 @@
                         </m:oMath>
                       </m:oMathPara>
                     </a14:m>
-                    <a:endParaRPr lang="en-US" sz="2800" dirty="0"/>
+                    <a:endParaRPr lang="en-US" sz="2800" dirty="0">
+                      <a:latin typeface="Helvetica" pitchFamily="2" charset="0"/>
+                    </a:endParaRPr>
                   </a:p>
                 </p:txBody>
               </p:sp>
             </mc:Choice>
-            <mc:Fallback xmlns="">
+            <mc:Fallback>
               <p:sp>
                 <p:nvSpPr>
                   <p:cNvPr id="32" name="TextBox 31">
@@ -4654,7 +4662,7 @@
                 <p:spPr>
                   <a:xfrm>
                     <a:off x="2873352" y="4213148"/>
-                    <a:ext cx="658963" cy="430887"/>
+                    <a:ext cx="676595" cy="430887"/>
                   </a:xfrm>
                   <a:prstGeom prst="rect">
                     <a:avLst/>
@@ -4662,7 +4670,7 @@
                   <a:blipFill>
                     <a:blip r:embed="rId6"/>
                     <a:stretch>
-                      <a:fillRect l="-13462" r="-1923" b="-11765"/>
+                      <a:fillRect l="-11111" b="-11765"/>
                     </a:stretch>
                   </a:blipFill>
                 </p:spPr>
@@ -4745,7 +4753,7 @@
               <p:spPr>
                 <a:xfrm>
                   <a:off x="4203533" y="3174497"/>
-                  <a:ext cx="532325" cy="430887"/>
+                  <a:ext cx="549959" cy="430887"/>
                 </a:xfrm>
                 <a:prstGeom prst="rect">
                   <a:avLst/>
@@ -4793,7 +4801,9 @@
                       </m:oMath>
                     </m:oMathPara>
                   </a14:m>
-                  <a:endParaRPr lang="en-US" sz="2800" dirty="0"/>
+                  <a:endParaRPr lang="en-US" sz="2800" dirty="0">
+                    <a:latin typeface="Helvetica" pitchFamily="2" charset="0"/>
+                  </a:endParaRPr>
                 </a:p>
               </p:txBody>
             </p:sp>
@@ -4816,7 +4826,7 @@
               <p:spPr>
                 <a:xfrm>
                   <a:off x="4203533" y="3174497"/>
-                  <a:ext cx="532325" cy="430887"/>
+                  <a:ext cx="549959" cy="430887"/>
                 </a:xfrm>
                 <a:prstGeom prst="rect">
                   <a:avLst/>
@@ -4824,7 +4834,7 @@
                 <a:blipFill>
                   <a:blip r:embed="rId7"/>
                   <a:stretch>
-                    <a:fillRect l="-16667" r="-2381" b="-11765"/>
+                    <a:fillRect l="-15909" b="-11765"/>
                   </a:stretch>
                 </a:blipFill>
               </p:spPr>
@@ -4858,9 +4868,9 @@
           <p:grpSpPr>
             <a:xfrm>
               <a:off x="798311" y="2163010"/>
-              <a:ext cx="1345240" cy="1665487"/>
+              <a:ext cx="1425390" cy="1665487"/>
               <a:chOff x="798311" y="2149155"/>
-              <a:chExt cx="1345240" cy="1665487"/>
+              <a:chExt cx="1425390" cy="1665487"/>
             </a:xfrm>
           </p:grpSpPr>
           <p:sp>
@@ -4878,7 +4888,7 @@
             <p:spPr>
               <a:xfrm>
                 <a:off x="798311" y="3291422"/>
-                <a:ext cx="1345240" cy="523220"/>
+                <a:ext cx="1425390" cy="523220"/>
               </a:xfrm>
               <a:prstGeom prst="rect">
                 <a:avLst/>
@@ -4892,7 +4902,9 @@
               <a:lstStyle/>
               <a:p>
                 <a:r>
-                  <a:rPr lang="en-US" sz="2800" i="1" dirty="0"/>
+                  <a:rPr lang="en-US" sz="2800" i="1" dirty="0">
+                    <a:latin typeface="Helvetica" pitchFamily="2" charset="0"/>
+                  </a:rPr>
                   <a:t>solution</a:t>
                 </a:r>
               </a:p>
@@ -5006,8 +5018,8 @@
                 </a:fontRef>
               </p:style>
             </p:cxnSp>
-            <mc:AlternateContent xmlns:mc="http://schemas.openxmlformats.org/markup-compatibility/2006" xmlns:a14="http://schemas.microsoft.com/office/drawing/2010/main">
-              <mc:Choice Requires="a14">
+            <mc:AlternateContent xmlns:mc="http://schemas.openxmlformats.org/markup-compatibility/2006">
+              <mc:Choice xmlns:a14="http://schemas.microsoft.com/office/drawing/2010/main" Requires="a14">
                 <p:sp>
                   <p:nvSpPr>
                     <p:cNvPr id="57" name="TextBox 56">
@@ -5023,7 +5035,7 @@
                   <p:spPr>
                     <a:xfrm>
                       <a:off x="2375860" y="545028"/>
-                      <a:ext cx="427425" cy="430887"/>
+                      <a:ext cx="445057" cy="430887"/>
                     </a:xfrm>
                     <a:prstGeom prst="rect">
                       <a:avLst/>
@@ -5071,12 +5083,14 @@
                           </m:oMath>
                         </m:oMathPara>
                       </a14:m>
-                      <a:endParaRPr lang="en-US" sz="2800" dirty="0"/>
+                      <a:endParaRPr lang="en-US" sz="2800" dirty="0">
+                        <a:latin typeface="Helvetica" pitchFamily="2" charset="0"/>
+                      </a:endParaRPr>
                     </a:p>
                   </p:txBody>
                 </p:sp>
               </mc:Choice>
-              <mc:Fallback xmlns="">
+              <mc:Fallback>
                 <p:sp>
                   <p:nvSpPr>
                     <p:cNvPr id="57" name="TextBox 56">
@@ -5094,7 +5108,7 @@
                   <p:spPr>
                     <a:xfrm>
                       <a:off x="2375860" y="545028"/>
-                      <a:ext cx="427425" cy="430887"/>
+                      <a:ext cx="445057" cy="430887"/>
                     </a:xfrm>
                     <a:prstGeom prst="rect">
                       <a:avLst/>
@@ -5102,7 +5116,7 @@
                     <a:blipFill>
                       <a:blip r:embed="rId8"/>
                       <a:stretch>
-                        <a:fillRect l="-20588" r="-2941" b="-8571"/>
+                        <a:fillRect l="-16667" b="-8571"/>
                       </a:stretch>
                     </a:blipFill>
                   </p:spPr>
@@ -5121,8 +5135,8 @@
                 </p:sp>
               </mc:Fallback>
             </mc:AlternateContent>
-            <mc:AlternateContent xmlns:mc="http://schemas.openxmlformats.org/markup-compatibility/2006" xmlns:a14="http://schemas.microsoft.com/office/drawing/2010/main">
-              <mc:Choice Requires="a14">
+            <mc:AlternateContent xmlns:mc="http://schemas.openxmlformats.org/markup-compatibility/2006">
+              <mc:Choice xmlns:a14="http://schemas.microsoft.com/office/drawing/2010/main" Requires="a14">
                 <p:sp>
                   <p:nvSpPr>
                     <p:cNvPr id="58" name="TextBox 57">
@@ -5138,7 +5152,7 @@
                   <p:spPr>
                     <a:xfrm>
                       <a:off x="2375860" y="1256408"/>
-                      <a:ext cx="427425" cy="430887"/>
+                      <a:ext cx="445057" cy="430887"/>
                     </a:xfrm>
                     <a:prstGeom prst="rect">
                       <a:avLst/>
@@ -5186,12 +5200,14 @@
                           </m:oMath>
                         </m:oMathPara>
                       </a14:m>
-                      <a:endParaRPr lang="en-US" sz="2800" dirty="0"/>
+                      <a:endParaRPr lang="en-US" sz="2800" dirty="0">
+                        <a:latin typeface="Helvetica" pitchFamily="2" charset="0"/>
+                      </a:endParaRPr>
                     </a:p>
                   </p:txBody>
                 </p:sp>
               </mc:Choice>
-              <mc:Fallback xmlns="">
+              <mc:Fallback>
                 <p:sp>
                   <p:nvSpPr>
                     <p:cNvPr id="58" name="TextBox 57">
@@ -5209,7 +5225,7 @@
                   <p:spPr>
                     <a:xfrm>
                       <a:off x="2375860" y="1256408"/>
-                      <a:ext cx="427425" cy="430887"/>
+                      <a:ext cx="445057" cy="430887"/>
                     </a:xfrm>
                     <a:prstGeom prst="rect">
                       <a:avLst/>
@@ -5217,7 +5233,7 @@
                     <a:blipFill>
                       <a:blip r:embed="rId8"/>
                       <a:stretch>
-                        <a:fillRect l="-20588" r="-2941" b="-8571"/>
+                        <a:fillRect l="-16667" b="-8571"/>
                       </a:stretch>
                     </a:blipFill>
                   </p:spPr>
@@ -5255,7 +5271,7 @@
               <p:spPr>
                 <a:xfrm>
                   <a:off x="5533830" y="3212710"/>
-                  <a:ext cx="532325" cy="430887"/>
+                  <a:ext cx="549959" cy="430887"/>
                 </a:xfrm>
                 <a:prstGeom prst="rect">
                   <a:avLst/>
@@ -5303,7 +5319,9 @@
                       </m:oMath>
                     </m:oMathPara>
                   </a14:m>
-                  <a:endParaRPr lang="en-US" sz="2800" dirty="0"/>
+                  <a:endParaRPr lang="en-US" sz="2800" dirty="0">
+                    <a:latin typeface="Helvetica" pitchFamily="2" charset="0"/>
+                  </a:endParaRPr>
                 </a:p>
               </p:txBody>
             </p:sp>
@@ -5326,7 +5344,7 @@
               <p:spPr>
                 <a:xfrm>
                   <a:off x="5533830" y="3212710"/>
-                  <a:ext cx="532325" cy="430887"/>
+                  <a:ext cx="549959" cy="430887"/>
                 </a:xfrm>
                 <a:prstGeom prst="rect">
                   <a:avLst/>
@@ -5334,7 +5352,7 @@
                 <a:blipFill>
                   <a:blip r:embed="rId9"/>
                   <a:stretch>
-                    <a:fillRect l="-16279" r="-2326" b="-5556"/>
+                    <a:fillRect l="-13333" b="-5556"/>
                   </a:stretch>
                 </a:blipFill>
               </p:spPr>
@@ -5370,7 +5388,7 @@
               <p:spPr>
                 <a:xfrm>
                   <a:off x="6794655" y="3212710"/>
-                  <a:ext cx="532325" cy="430887"/>
+                  <a:ext cx="549959" cy="430887"/>
                 </a:xfrm>
                 <a:prstGeom prst="rect">
                   <a:avLst/>
@@ -5418,7 +5436,9 @@
                       </m:oMath>
                     </m:oMathPara>
                   </a14:m>
-                  <a:endParaRPr lang="en-US" sz="2800" dirty="0"/>
+                  <a:endParaRPr lang="en-US" sz="2800" dirty="0">
+                    <a:latin typeface="Helvetica" pitchFamily="2" charset="0"/>
+                  </a:endParaRPr>
                 </a:p>
               </p:txBody>
             </p:sp>
@@ -5441,7 +5461,7 @@
               <p:spPr>
                 <a:xfrm>
                   <a:off x="6794655" y="3212710"/>
-                  <a:ext cx="532325" cy="430887"/>
+                  <a:ext cx="549959" cy="430887"/>
                 </a:xfrm>
                 <a:prstGeom prst="rect">
                   <a:avLst/>
@@ -5449,7 +5469,7 @@
                 <a:blipFill>
                   <a:blip r:embed="rId10"/>
                   <a:stretch>
-                    <a:fillRect l="-16667" r="-2381" b="-5556"/>
+                    <a:fillRect l="-15909" b="-5556"/>
                   </a:stretch>
                 </a:blipFill>
               </p:spPr>
@@ -5485,7 +5505,7 @@
               <p:spPr>
                 <a:xfrm>
                   <a:off x="8077063" y="3204243"/>
-                  <a:ext cx="532325" cy="430887"/>
+                  <a:ext cx="549959" cy="430887"/>
                 </a:xfrm>
                 <a:prstGeom prst="rect">
                   <a:avLst/>
@@ -5533,7 +5553,9 @@
                       </m:oMath>
                     </m:oMathPara>
                   </a14:m>
-                  <a:endParaRPr lang="en-US" sz="2800" dirty="0"/>
+                  <a:endParaRPr lang="en-US" sz="2800" dirty="0">
+                    <a:latin typeface="Helvetica" pitchFamily="2" charset="0"/>
+                  </a:endParaRPr>
                 </a:p>
               </p:txBody>
             </p:sp>
@@ -5556,7 +5578,7 @@
               <p:spPr>
                 <a:xfrm>
                   <a:off x="8077063" y="3204243"/>
-                  <a:ext cx="532325" cy="430887"/>
+                  <a:ext cx="549959" cy="430887"/>
                 </a:xfrm>
                 <a:prstGeom prst="rect">
                   <a:avLst/>
@@ -5564,7 +5586,7 @@
                 <a:blipFill>
                   <a:blip r:embed="rId11"/>
                   <a:stretch>
-                    <a:fillRect l="-16667" r="-2381" b="-8571"/>
+                    <a:fillRect l="-15909" b="-8571"/>
                   </a:stretch>
                 </a:blipFill>
               </p:spPr>
@@ -5583,8 +5605,8 @@
             </p:sp>
           </mc:Fallback>
         </mc:AlternateContent>
-        <mc:AlternateContent xmlns:mc="http://schemas.openxmlformats.org/markup-compatibility/2006" xmlns:a14="http://schemas.microsoft.com/office/drawing/2010/main">
-          <mc:Choice Requires="a14">
+        <mc:AlternateContent xmlns:mc="http://schemas.openxmlformats.org/markup-compatibility/2006">
+          <mc:Choice xmlns:a14="http://schemas.microsoft.com/office/drawing/2010/main" Requires="a14">
             <p:sp>
               <p:nvSpPr>
                 <p:cNvPr id="62" name="TextBox 61">
@@ -5600,7 +5622,7 @@
               <p:spPr>
                 <a:xfrm>
                   <a:off x="9304528" y="3212710"/>
-                  <a:ext cx="659861" cy="430887"/>
+                  <a:ext cx="677493" cy="430887"/>
                 </a:xfrm>
                 <a:prstGeom prst="rect">
                   <a:avLst/>
@@ -5648,12 +5670,14 @@
                       </m:oMath>
                     </m:oMathPara>
                   </a14:m>
-                  <a:endParaRPr lang="en-US" sz="2800" dirty="0"/>
+                  <a:endParaRPr lang="en-US" sz="2800" dirty="0">
+                    <a:latin typeface="Helvetica" pitchFamily="2" charset="0"/>
+                  </a:endParaRPr>
                 </a:p>
               </p:txBody>
             </p:sp>
           </mc:Choice>
-          <mc:Fallback xmlns="">
+          <mc:Fallback>
             <p:sp>
               <p:nvSpPr>
                 <p:cNvPr id="62" name="TextBox 61">
@@ -5671,7 +5695,7 @@
               <p:spPr>
                 <a:xfrm>
                   <a:off x="9304528" y="3212710"/>
-                  <a:ext cx="659861" cy="430887"/>
+                  <a:ext cx="677493" cy="430887"/>
                 </a:xfrm>
                 <a:prstGeom prst="rect">
                   <a:avLst/>
@@ -5679,7 +5703,7 @@
                 <a:blipFill>
                   <a:blip r:embed="rId12"/>
                   <a:stretch>
-                    <a:fillRect l="-13208" b="-5556"/>
+                    <a:fillRect l="-11111" b="-5556"/>
                   </a:stretch>
                 </a:blipFill>
               </p:spPr>
@@ -5823,7 +5847,7 @@
                 <p:spPr>
                   <a:xfrm>
                     <a:off x="2375860" y="545028"/>
-                    <a:ext cx="545149" cy="430887"/>
+                    <a:ext cx="562783" cy="430887"/>
                   </a:xfrm>
                   <a:prstGeom prst="rect">
                     <a:avLst/>
@@ -5871,7 +5895,9 @@
                         </m:oMath>
                       </m:oMathPara>
                     </a14:m>
-                    <a:endParaRPr lang="en-US" sz="2800" dirty="0"/>
+                    <a:endParaRPr lang="en-US" sz="2800" dirty="0">
+                      <a:latin typeface="Helvetica" pitchFamily="2" charset="0"/>
+                    </a:endParaRPr>
                   </a:p>
                 </p:txBody>
               </p:sp>
@@ -5894,7 +5920,7 @@
                 <p:spPr>
                   <a:xfrm>
                     <a:off x="2375860" y="545028"/>
-                    <a:ext cx="545149" cy="430887"/>
+                    <a:ext cx="562783" cy="430887"/>
                   </a:xfrm>
                   <a:prstGeom prst="rect">
                     <a:avLst/>
@@ -5902,7 +5928,7 @@
                   <a:blipFill>
                     <a:blip r:embed="rId13"/>
                     <a:stretch>
-                      <a:fillRect l="-15909" b="-8571"/>
+                      <a:fillRect l="-15556" b="-8571"/>
                     </a:stretch>
                   </a:blipFill>
                 </p:spPr>
@@ -5938,7 +5964,7 @@
                 <p:spPr>
                   <a:xfrm>
                     <a:off x="2375860" y="1256408"/>
-                    <a:ext cx="545149" cy="430887"/>
+                    <a:ext cx="562783" cy="430887"/>
                   </a:xfrm>
                   <a:prstGeom prst="rect">
                     <a:avLst/>
@@ -5986,7 +6012,9 @@
                         </m:oMath>
                       </m:oMathPara>
                     </a14:m>
-                    <a:endParaRPr lang="en-US" sz="2800" dirty="0"/>
+                    <a:endParaRPr lang="en-US" sz="2800" dirty="0">
+                      <a:latin typeface="Helvetica" pitchFamily="2" charset="0"/>
+                    </a:endParaRPr>
                   </a:p>
                 </p:txBody>
               </p:sp>
@@ -6009,7 +6037,7 @@
                 <p:spPr>
                   <a:xfrm>
                     <a:off x="2375860" y="1256408"/>
-                    <a:ext cx="545149" cy="430887"/>
+                    <a:ext cx="562783" cy="430887"/>
                   </a:xfrm>
                   <a:prstGeom prst="rect">
                     <a:avLst/>
@@ -6017,7 +6045,7 @@
                   <a:blipFill>
                     <a:blip r:embed="rId13"/>
                     <a:stretch>
-                      <a:fillRect l="-15909" b="-8571"/>
+                      <a:fillRect l="-15556" b="-8571"/>
                     </a:stretch>
                   </a:blipFill>
                 </p:spPr>
@@ -6162,7 +6190,7 @@
                 <p:spPr>
                   <a:xfrm>
                     <a:off x="2375860" y="545028"/>
-                    <a:ext cx="545149" cy="430887"/>
+                    <a:ext cx="562783" cy="430887"/>
                   </a:xfrm>
                   <a:prstGeom prst="rect">
                     <a:avLst/>
@@ -6210,7 +6238,9 @@
                         </m:oMath>
                       </m:oMathPara>
                     </a14:m>
-                    <a:endParaRPr lang="en-US" sz="2800" dirty="0"/>
+                    <a:endParaRPr lang="en-US" sz="2800" dirty="0">
+                      <a:latin typeface="Helvetica" pitchFamily="2" charset="0"/>
+                    </a:endParaRPr>
                   </a:p>
                 </p:txBody>
               </p:sp>
@@ -6233,7 +6263,7 @@
                 <p:spPr>
                   <a:xfrm>
                     <a:off x="2375860" y="545028"/>
-                    <a:ext cx="545149" cy="430887"/>
+                    <a:ext cx="562783" cy="430887"/>
                   </a:xfrm>
                   <a:prstGeom prst="rect">
                     <a:avLst/>
@@ -6241,7 +6271,7 @@
                   <a:blipFill>
                     <a:blip r:embed="rId14"/>
                     <a:stretch>
-                      <a:fillRect l="-15909" b="-11765"/>
+                      <a:fillRect l="-13333" b="-11765"/>
                     </a:stretch>
                   </a:blipFill>
                 </p:spPr>
@@ -6277,7 +6307,7 @@
                 <p:spPr>
                   <a:xfrm>
                     <a:off x="2375860" y="1256408"/>
-                    <a:ext cx="545149" cy="430887"/>
+                    <a:ext cx="562783" cy="430887"/>
                   </a:xfrm>
                   <a:prstGeom prst="rect">
                     <a:avLst/>
@@ -6325,7 +6355,9 @@
                         </m:oMath>
                       </m:oMathPara>
                     </a14:m>
-                    <a:endParaRPr lang="en-US" sz="2800" dirty="0"/>
+                    <a:endParaRPr lang="en-US" sz="2800" dirty="0">
+                      <a:latin typeface="Helvetica" pitchFamily="2" charset="0"/>
+                    </a:endParaRPr>
                   </a:p>
                 </p:txBody>
               </p:sp>
@@ -6348,7 +6380,7 @@
                 <p:spPr>
                   <a:xfrm>
                     <a:off x="2375860" y="1256408"/>
-                    <a:ext cx="545149" cy="430887"/>
+                    <a:ext cx="562783" cy="430887"/>
                   </a:xfrm>
                   <a:prstGeom prst="rect">
                     <a:avLst/>
@@ -6356,7 +6388,7 @@
                   <a:blipFill>
                     <a:blip r:embed="rId15"/>
                     <a:stretch>
-                      <a:fillRect l="-15909" b="-5556"/>
+                      <a:fillRect l="-13333" b="-5556"/>
                     </a:stretch>
                   </a:blipFill>
                 </p:spPr>
@@ -6501,7 +6533,7 @@
                 <p:spPr>
                   <a:xfrm>
                     <a:off x="2375860" y="545028"/>
-                    <a:ext cx="545149" cy="430887"/>
+                    <a:ext cx="562783" cy="430887"/>
                   </a:xfrm>
                   <a:prstGeom prst="rect">
                     <a:avLst/>
@@ -6549,7 +6581,9 @@
                         </m:oMath>
                       </m:oMathPara>
                     </a14:m>
-                    <a:endParaRPr lang="en-US" sz="2800" dirty="0"/>
+                    <a:endParaRPr lang="en-US" sz="2800" dirty="0">
+                      <a:latin typeface="Helvetica" pitchFamily="2" charset="0"/>
+                    </a:endParaRPr>
                   </a:p>
                 </p:txBody>
               </p:sp>
@@ -6572,7 +6606,7 @@
                 <p:spPr>
                   <a:xfrm>
                     <a:off x="2375860" y="545028"/>
-                    <a:ext cx="545149" cy="430887"/>
+                    <a:ext cx="562783" cy="430887"/>
                   </a:xfrm>
                   <a:prstGeom prst="rect">
                     <a:avLst/>
@@ -6580,7 +6614,7 @@
                   <a:blipFill>
                     <a:blip r:embed="rId16"/>
                     <a:stretch>
-                      <a:fillRect l="-15909" b="-8571"/>
+                      <a:fillRect l="-13333" b="-8571"/>
                     </a:stretch>
                   </a:blipFill>
                 </p:spPr>
@@ -6616,7 +6650,7 @@
                 <p:spPr>
                   <a:xfrm>
                     <a:off x="2375860" y="1256408"/>
-                    <a:ext cx="545149" cy="430887"/>
+                    <a:ext cx="562783" cy="430887"/>
                   </a:xfrm>
                   <a:prstGeom prst="rect">
                     <a:avLst/>
@@ -6664,7 +6698,9 @@
                         </m:oMath>
                       </m:oMathPara>
                     </a14:m>
-                    <a:endParaRPr lang="en-US" sz="2800" dirty="0"/>
+                    <a:endParaRPr lang="en-US" sz="2800" dirty="0">
+                      <a:latin typeface="Helvetica" pitchFamily="2" charset="0"/>
+                    </a:endParaRPr>
                   </a:p>
                 </p:txBody>
               </p:sp>
@@ -6687,7 +6723,7 @@
                 <p:spPr>
                   <a:xfrm>
                     <a:off x="2375860" y="1256408"/>
-                    <a:ext cx="545149" cy="430887"/>
+                    <a:ext cx="562783" cy="430887"/>
                   </a:xfrm>
                   <a:prstGeom prst="rect">
                     <a:avLst/>
@@ -6695,7 +6731,7 @@
                   <a:blipFill>
                     <a:blip r:embed="rId16"/>
                     <a:stretch>
-                      <a:fillRect l="-15909" b="-8571"/>
+                      <a:fillRect l="-13333" b="-8571"/>
                     </a:stretch>
                   </a:blipFill>
                 </p:spPr>
@@ -6840,7 +6876,7 @@
                 <p:spPr>
                   <a:xfrm>
                     <a:off x="2375860" y="545028"/>
-                    <a:ext cx="545149" cy="430887"/>
+                    <a:ext cx="562783" cy="430887"/>
                   </a:xfrm>
                   <a:prstGeom prst="rect">
                     <a:avLst/>
@@ -6888,7 +6924,9 @@
                         </m:oMath>
                       </m:oMathPara>
                     </a14:m>
-                    <a:endParaRPr lang="en-US" sz="2800" dirty="0"/>
+                    <a:endParaRPr lang="en-US" sz="2800" dirty="0">
+                      <a:latin typeface="Helvetica" pitchFamily="2" charset="0"/>
+                    </a:endParaRPr>
                   </a:p>
                 </p:txBody>
               </p:sp>
@@ -6911,7 +6949,7 @@
                 <p:spPr>
                   <a:xfrm>
                     <a:off x="2375860" y="545028"/>
-                    <a:ext cx="545149" cy="430887"/>
+                    <a:ext cx="562783" cy="430887"/>
                   </a:xfrm>
                   <a:prstGeom prst="rect">
                     <a:avLst/>
@@ -6919,7 +6957,7 @@
                   <a:blipFill>
                     <a:blip r:embed="rId17"/>
                     <a:stretch>
-                      <a:fillRect l="-15909" b="-8571"/>
+                      <a:fillRect l="-13333" b="-8571"/>
                     </a:stretch>
                   </a:blipFill>
                 </p:spPr>
@@ -6955,7 +6993,7 @@
                 <p:spPr>
                   <a:xfrm>
                     <a:off x="2375860" y="1256408"/>
-                    <a:ext cx="545149" cy="430887"/>
+                    <a:ext cx="562783" cy="430887"/>
                   </a:xfrm>
                   <a:prstGeom prst="rect">
                     <a:avLst/>
@@ -7003,7 +7041,9 @@
                         </m:oMath>
                       </m:oMathPara>
                     </a14:m>
-                    <a:endParaRPr lang="en-US" sz="2800" dirty="0"/>
+                    <a:endParaRPr lang="en-US" sz="2800" dirty="0">
+                      <a:latin typeface="Helvetica" pitchFamily="2" charset="0"/>
+                    </a:endParaRPr>
                   </a:p>
                 </p:txBody>
               </p:sp>
@@ -7026,7 +7066,7 @@
                 <p:spPr>
                   <a:xfrm>
                     <a:off x="2375860" y="1256408"/>
-                    <a:ext cx="545149" cy="430887"/>
+                    <a:ext cx="562783" cy="430887"/>
                   </a:xfrm>
                   <a:prstGeom prst="rect">
                     <a:avLst/>
@@ -7034,7 +7074,7 @@
                   <a:blipFill>
                     <a:blip r:embed="rId18"/>
                     <a:stretch>
-                      <a:fillRect l="-15909" b="-5714"/>
+                      <a:fillRect l="-13333" b="-5714"/>
                     </a:stretch>
                   </a:blipFill>
                 </p:spPr>
@@ -7069,9 +7109,9 @@
           <p:grpSpPr>
             <a:xfrm>
               <a:off x="9155353" y="842170"/>
-              <a:ext cx="824733" cy="1142267"/>
+              <a:ext cx="842365" cy="1142267"/>
               <a:chOff x="2223812" y="545028"/>
-              <a:chExt cx="824733" cy="1142267"/>
+              <a:chExt cx="842365" cy="1142267"/>
             </a:xfrm>
           </p:grpSpPr>
           <p:cxnSp>
@@ -7162,8 +7202,8 @@
               </a:fontRef>
             </p:style>
           </p:cxnSp>
-          <mc:AlternateContent xmlns:mc="http://schemas.openxmlformats.org/markup-compatibility/2006" xmlns:a14="http://schemas.microsoft.com/office/drawing/2010/main">
-            <mc:Choice Requires="a14">
+          <mc:AlternateContent xmlns:mc="http://schemas.openxmlformats.org/markup-compatibility/2006">
+            <mc:Choice xmlns:a14="http://schemas.microsoft.com/office/drawing/2010/main" Requires="a14">
               <p:sp>
                 <p:nvSpPr>
                   <p:cNvPr id="86" name="TextBox 85">
@@ -7179,7 +7219,7 @@
                 <p:spPr>
                   <a:xfrm>
                     <a:off x="2375860" y="545028"/>
-                    <a:ext cx="672685" cy="430887"/>
+                    <a:ext cx="690317" cy="430887"/>
                   </a:xfrm>
                   <a:prstGeom prst="rect">
                     <a:avLst/>
@@ -7227,12 +7267,14 @@
                         </m:oMath>
                       </m:oMathPara>
                     </a14:m>
-                    <a:endParaRPr lang="en-US" sz="2800" dirty="0"/>
+                    <a:endParaRPr lang="en-US" sz="2800" dirty="0">
+                      <a:latin typeface="Helvetica" pitchFamily="2" charset="0"/>
+                    </a:endParaRPr>
                   </a:p>
                 </p:txBody>
               </p:sp>
             </mc:Choice>
-            <mc:Fallback xmlns="">
+            <mc:Fallback>
               <p:sp>
                 <p:nvSpPr>
                   <p:cNvPr id="86" name="TextBox 85">
@@ -7250,15 +7292,15 @@
                 <p:spPr>
                   <a:xfrm>
                     <a:off x="2375860" y="545028"/>
-                    <a:ext cx="672685" cy="430887"/>
+                    <a:ext cx="690317" cy="430887"/>
                   </a:xfrm>
                   <a:prstGeom prst="rect">
                     <a:avLst/>
                   </a:prstGeom>
                   <a:blipFill>
-                    <a:blip r:embed="rId20"/>
+                    <a:blip r:embed="rId19"/>
                     <a:stretch>
-                      <a:fillRect l="-11111" r="-1852" b="-8571"/>
+                      <a:fillRect l="-10714" b="-8571"/>
                     </a:stretch>
                   </a:blipFill>
                 </p:spPr>
@@ -7277,8 +7319,8 @@
               </p:sp>
             </mc:Fallback>
           </mc:AlternateContent>
-          <mc:AlternateContent xmlns:mc="http://schemas.openxmlformats.org/markup-compatibility/2006" xmlns:a14="http://schemas.microsoft.com/office/drawing/2010/main">
-            <mc:Choice Requires="a14">
+          <mc:AlternateContent xmlns:mc="http://schemas.openxmlformats.org/markup-compatibility/2006">
+            <mc:Choice xmlns:a14="http://schemas.microsoft.com/office/drawing/2010/main" Requires="a14">
               <p:sp>
                 <p:nvSpPr>
                   <p:cNvPr id="87" name="TextBox 86">
@@ -7294,7 +7336,7 @@
                 <p:spPr>
                   <a:xfrm>
                     <a:off x="2375860" y="1256408"/>
-                    <a:ext cx="672685" cy="430887"/>
+                    <a:ext cx="690317" cy="430887"/>
                   </a:xfrm>
                   <a:prstGeom prst="rect">
                     <a:avLst/>
@@ -7342,12 +7384,14 @@
                         </m:oMath>
                       </m:oMathPara>
                     </a14:m>
-                    <a:endParaRPr lang="en-US" sz="2800" dirty="0"/>
+                    <a:endParaRPr lang="en-US" sz="2800" dirty="0">
+                      <a:latin typeface="Helvetica" pitchFamily="2" charset="0"/>
+                    </a:endParaRPr>
                   </a:p>
                 </p:txBody>
               </p:sp>
             </mc:Choice>
-            <mc:Fallback xmlns="">
+            <mc:Fallback>
               <p:sp>
                 <p:nvSpPr>
                   <p:cNvPr id="87" name="TextBox 86">
@@ -7365,15 +7409,15 @@
                 <p:spPr>
                   <a:xfrm>
                     <a:off x="2375860" y="1256408"/>
-                    <a:ext cx="672685" cy="430887"/>
+                    <a:ext cx="690317" cy="430887"/>
                   </a:xfrm>
                   <a:prstGeom prst="rect">
                     <a:avLst/>
                   </a:prstGeom>
                   <a:blipFill>
-                    <a:blip r:embed="rId20"/>
+                    <a:blip r:embed="rId19"/>
                     <a:stretch>
-                      <a:fillRect l="-11111" r="-1852" b="-8571"/>
+                      <a:fillRect l="-10714" b="-8571"/>
                     </a:stretch>
                   </a:blipFill>
                 </p:spPr>
@@ -7408,9 +7452,9 @@
           <p:grpSpPr>
             <a:xfrm>
               <a:off x="10113792" y="2176865"/>
-              <a:ext cx="1345240" cy="1637777"/>
+              <a:ext cx="1425390" cy="1637777"/>
               <a:chOff x="10113792" y="2204574"/>
-              <a:chExt cx="1345240" cy="1637777"/>
+              <a:chExt cx="1425390" cy="1637777"/>
             </a:xfrm>
           </p:grpSpPr>
           <p:sp>
@@ -7428,7 +7472,7 @@
             <p:spPr>
               <a:xfrm>
                 <a:off x="10113792" y="3319131"/>
-                <a:ext cx="1345240" cy="523220"/>
+                <a:ext cx="1425390" cy="523220"/>
               </a:xfrm>
               <a:prstGeom prst="rect">
                 <a:avLst/>
@@ -7442,7 +7486,9 @@
               <a:lstStyle/>
               <a:p>
                 <a:r>
-                  <a:rPr lang="en-US" sz="2800" i="1" dirty="0"/>
+                  <a:rPr lang="en-US" sz="2800" i="1" dirty="0">
+                    <a:latin typeface="Helvetica" pitchFamily="2" charset="0"/>
+                  </a:rPr>
                   <a:t>solution</a:t>
                 </a:r>
               </a:p>
@@ -7556,8 +7602,8 @@
                 </a:fontRef>
               </p:style>
             </p:cxnSp>
-            <mc:AlternateContent xmlns:mc="http://schemas.openxmlformats.org/markup-compatibility/2006" xmlns:a14="http://schemas.microsoft.com/office/drawing/2010/main">
-              <mc:Choice Requires="a14">
+            <mc:AlternateContent xmlns:mc="http://schemas.openxmlformats.org/markup-compatibility/2006">
+              <mc:Choice xmlns:a14="http://schemas.microsoft.com/office/drawing/2010/main" Requires="a14">
                 <p:sp>
                   <p:nvSpPr>
                     <p:cNvPr id="91" name="TextBox 90">
@@ -7573,7 +7619,7 @@
                   <p:spPr>
                     <a:xfrm>
                       <a:off x="2375860" y="545028"/>
-                      <a:ext cx="427425" cy="430887"/>
+                      <a:ext cx="445057" cy="430887"/>
                     </a:xfrm>
                     <a:prstGeom prst="rect">
                       <a:avLst/>
@@ -7621,12 +7667,14 @@
                           </m:oMath>
                         </m:oMathPara>
                       </a14:m>
-                      <a:endParaRPr lang="en-US" sz="2800" dirty="0"/>
+                      <a:endParaRPr lang="en-US" sz="2800" dirty="0">
+                        <a:latin typeface="Helvetica" pitchFamily="2" charset="0"/>
+                      </a:endParaRPr>
                     </a:p>
                   </p:txBody>
                 </p:sp>
               </mc:Choice>
-              <mc:Fallback xmlns="">
+              <mc:Fallback>
                 <p:sp>
                   <p:nvSpPr>
                     <p:cNvPr id="91" name="TextBox 90">
@@ -7644,15 +7692,15 @@
                   <p:spPr>
                     <a:xfrm>
                       <a:off x="2375860" y="545028"/>
-                      <a:ext cx="427425" cy="430887"/>
+                      <a:ext cx="445057" cy="430887"/>
                     </a:xfrm>
                     <a:prstGeom prst="rect">
                       <a:avLst/>
                     </a:prstGeom>
                     <a:blipFill>
-                      <a:blip r:embed="rId8"/>
+                      <a:blip r:embed="rId20"/>
                       <a:stretch>
-                        <a:fillRect l="-20588" r="-2941" b="-8571"/>
+                        <a:fillRect l="-16667" b="-8571"/>
                       </a:stretch>
                     </a:blipFill>
                   </p:spPr>
@@ -7671,8 +7719,8 @@
                 </p:sp>
               </mc:Fallback>
             </mc:AlternateContent>
-            <mc:AlternateContent xmlns:mc="http://schemas.openxmlformats.org/markup-compatibility/2006" xmlns:a14="http://schemas.microsoft.com/office/drawing/2010/main">
-              <mc:Choice Requires="a14">
+            <mc:AlternateContent xmlns:mc="http://schemas.openxmlformats.org/markup-compatibility/2006">
+              <mc:Choice xmlns:a14="http://schemas.microsoft.com/office/drawing/2010/main" Requires="a14">
                 <p:sp>
                   <p:nvSpPr>
                     <p:cNvPr id="92" name="TextBox 91">
@@ -7688,7 +7736,7 @@
                   <p:spPr>
                     <a:xfrm>
                       <a:off x="2375860" y="1256408"/>
-                      <a:ext cx="427425" cy="430887"/>
+                      <a:ext cx="445057" cy="430887"/>
                     </a:xfrm>
                     <a:prstGeom prst="rect">
                       <a:avLst/>
@@ -7736,12 +7784,14 @@
                           </m:oMath>
                         </m:oMathPara>
                       </a14:m>
-                      <a:endParaRPr lang="en-US" sz="2800" dirty="0"/>
+                      <a:endParaRPr lang="en-US" sz="2800" dirty="0">
+                        <a:latin typeface="Helvetica" pitchFamily="2" charset="0"/>
+                      </a:endParaRPr>
                     </a:p>
                   </p:txBody>
                 </p:sp>
               </mc:Choice>
-              <mc:Fallback xmlns="">
+              <mc:Fallback>
                 <p:sp>
                   <p:nvSpPr>
                     <p:cNvPr id="92" name="TextBox 91">
@@ -7759,15 +7809,15 @@
                   <p:spPr>
                     <a:xfrm>
                       <a:off x="2375860" y="1256408"/>
-                      <a:ext cx="427425" cy="430887"/>
+                      <a:ext cx="445057" cy="430887"/>
                     </a:xfrm>
                     <a:prstGeom prst="rect">
                       <a:avLst/>
                     </a:prstGeom>
                     <a:blipFill>
-                      <a:blip r:embed="rId8"/>
+                      <a:blip r:embed="rId20"/>
                       <a:stretch>
-                        <a:fillRect l="-20588" r="-2941" b="-8571"/>
+                        <a:fillRect l="-16667" b="-8571"/>
                       </a:stretch>
                     </a:blipFill>
                   </p:spPr>

</xml_diff>

<commit_message>
test kT-cutoff, update Fig 3, make graphical abstract
</commit_message>
<xml_diff>
--- a/figs/labeled_realistic_membrane.pptx
+++ b/figs/labeled_realistic_membrane.pptx
@@ -6,6 +6,7 @@
   </p:sldMasterIdLst>
   <p:sldIdLst>
     <p:sldId id="256" r:id="rId2"/>
+    <p:sldId id="257" r:id="rId3"/>
   </p:sldIdLst>
   <p:sldSz cx="12192000" cy="6858000"/>
   <p:notesSz cx="6858000" cy="9144000"/>
@@ -259,7 +260,7 @@
           <a:p>
             <a:fld id="{3FE4A416-97FA-944C-BA97-257286476C07}" type="datetimeFigureOut">
               <a:rPr lang="en-US" smtClean="0"/>
-              <a:t>5/21/24</a:t>
+              <a:t>5/24/24</a:t>
             </a:fld>
             <a:endParaRPr lang="en-US"/>
           </a:p>
@@ -457,7 +458,7 @@
           <a:p>
             <a:fld id="{3FE4A416-97FA-944C-BA97-257286476C07}" type="datetimeFigureOut">
               <a:rPr lang="en-US" smtClean="0"/>
-              <a:t>5/21/24</a:t>
+              <a:t>5/24/24</a:t>
             </a:fld>
             <a:endParaRPr lang="en-US"/>
           </a:p>
@@ -665,7 +666,7 @@
           <a:p>
             <a:fld id="{3FE4A416-97FA-944C-BA97-257286476C07}" type="datetimeFigureOut">
               <a:rPr lang="en-US" smtClean="0"/>
-              <a:t>5/21/24</a:t>
+              <a:t>5/24/24</a:t>
             </a:fld>
             <a:endParaRPr lang="en-US"/>
           </a:p>
@@ -863,7 +864,7 @@
           <a:p>
             <a:fld id="{3FE4A416-97FA-944C-BA97-257286476C07}" type="datetimeFigureOut">
               <a:rPr lang="en-US" smtClean="0"/>
-              <a:t>5/21/24</a:t>
+              <a:t>5/24/24</a:t>
             </a:fld>
             <a:endParaRPr lang="en-US"/>
           </a:p>
@@ -1138,7 +1139,7 @@
           <a:p>
             <a:fld id="{3FE4A416-97FA-944C-BA97-257286476C07}" type="datetimeFigureOut">
               <a:rPr lang="en-US" smtClean="0"/>
-              <a:t>5/21/24</a:t>
+              <a:t>5/24/24</a:t>
             </a:fld>
             <a:endParaRPr lang="en-US"/>
           </a:p>
@@ -1403,7 +1404,7 @@
           <a:p>
             <a:fld id="{3FE4A416-97FA-944C-BA97-257286476C07}" type="datetimeFigureOut">
               <a:rPr lang="en-US" smtClean="0"/>
-              <a:t>5/21/24</a:t>
+              <a:t>5/24/24</a:t>
             </a:fld>
             <a:endParaRPr lang="en-US"/>
           </a:p>
@@ -1815,7 +1816,7 @@
           <a:p>
             <a:fld id="{3FE4A416-97FA-944C-BA97-257286476C07}" type="datetimeFigureOut">
               <a:rPr lang="en-US" smtClean="0"/>
-              <a:t>5/21/24</a:t>
+              <a:t>5/24/24</a:t>
             </a:fld>
             <a:endParaRPr lang="en-US"/>
           </a:p>
@@ -1956,7 +1957,7 @@
           <a:p>
             <a:fld id="{3FE4A416-97FA-944C-BA97-257286476C07}" type="datetimeFigureOut">
               <a:rPr lang="en-US" smtClean="0"/>
-              <a:t>5/21/24</a:t>
+              <a:t>5/24/24</a:t>
             </a:fld>
             <a:endParaRPr lang="en-US"/>
           </a:p>
@@ -2069,7 +2070,7 @@
           <a:p>
             <a:fld id="{3FE4A416-97FA-944C-BA97-257286476C07}" type="datetimeFigureOut">
               <a:rPr lang="en-US" smtClean="0"/>
-              <a:t>5/21/24</a:t>
+              <a:t>5/24/24</a:t>
             </a:fld>
             <a:endParaRPr lang="en-US"/>
           </a:p>
@@ -2380,7 +2381,7 @@
           <a:p>
             <a:fld id="{3FE4A416-97FA-944C-BA97-257286476C07}" type="datetimeFigureOut">
               <a:rPr lang="en-US" smtClean="0"/>
-              <a:t>5/21/24</a:t>
+              <a:t>5/24/24</a:t>
             </a:fld>
             <a:endParaRPr lang="en-US"/>
           </a:p>
@@ -2668,7 +2669,7 @@
           <a:p>
             <a:fld id="{3FE4A416-97FA-944C-BA97-257286476C07}" type="datetimeFigureOut">
               <a:rPr lang="en-US" smtClean="0"/>
-              <a:t>5/21/24</a:t>
+              <a:t>5/24/24</a:t>
             </a:fld>
             <a:endParaRPr lang="en-US"/>
           </a:p>
@@ -2909,7 +2910,7 @@
           <a:p>
             <a:fld id="{3FE4A416-97FA-944C-BA97-257286476C07}" type="datetimeFigureOut">
               <a:rPr lang="en-US" smtClean="0"/>
-              <a:t>5/21/24</a:t>
+              <a:t>5/24/24</a:t>
             </a:fld>
             <a:endParaRPr lang="en-US"/>
           </a:p>
@@ -3484,8 +3485,8 @@
               </a:fontRef>
             </p:style>
           </p:cxnSp>
-          <mc:AlternateContent xmlns:mc="http://schemas.openxmlformats.org/markup-compatibility/2006">
-            <mc:Choice xmlns:a14="http://schemas.microsoft.com/office/drawing/2010/main" Requires="a14">
+          <mc:AlternateContent xmlns:mc="http://schemas.openxmlformats.org/markup-compatibility/2006" xmlns:a14="http://schemas.microsoft.com/office/drawing/2010/main">
+            <mc:Choice Requires="a14">
               <p:sp>
                 <p:nvSpPr>
                   <p:cNvPr id="18" name="TextBox 17">
@@ -3556,7 +3557,7 @@
                 </p:txBody>
               </p:sp>
             </mc:Choice>
-            <mc:Fallback>
+            <mc:Fallback xmlns="">
               <p:sp>
                 <p:nvSpPr>
                   <p:cNvPr id="18" name="TextBox 17">
@@ -3601,8 +3602,8 @@
               </p:sp>
             </mc:Fallback>
           </mc:AlternateContent>
-          <mc:AlternateContent xmlns:mc="http://schemas.openxmlformats.org/markup-compatibility/2006">
-            <mc:Choice xmlns:a14="http://schemas.microsoft.com/office/drawing/2010/main" Requires="a14">
+          <mc:AlternateContent xmlns:mc="http://schemas.openxmlformats.org/markup-compatibility/2006" xmlns:a14="http://schemas.microsoft.com/office/drawing/2010/main">
+            <mc:Choice Requires="a14">
               <p:sp>
                 <p:nvSpPr>
                   <p:cNvPr id="19" name="TextBox 18">
@@ -3673,7 +3674,7 @@
                 </p:txBody>
               </p:sp>
             </mc:Choice>
-            <mc:Fallback>
+            <mc:Fallback xmlns="">
               <p:sp>
                 <p:nvSpPr>
                   <p:cNvPr id="19" name="TextBox 18">
@@ -4414,8 +4415,8 @@
             </p:txBody>
           </p:sp>
         </p:grpSp>
-        <mc:AlternateContent xmlns:mc="http://schemas.openxmlformats.org/markup-compatibility/2006">
-          <mc:Choice xmlns:a14="http://schemas.microsoft.com/office/drawing/2010/main" Requires="a14">
+        <mc:AlternateContent xmlns:mc="http://schemas.openxmlformats.org/markup-compatibility/2006" xmlns:a14="http://schemas.microsoft.com/office/drawing/2010/main">
+          <mc:Choice Requires="a14">
             <p:sp>
               <p:nvSpPr>
                 <p:cNvPr id="33" name="TextBox 32">
@@ -4507,7 +4508,7 @@
               </p:txBody>
             </p:sp>
           </mc:Choice>
-          <mc:Fallback>
+          <mc:Fallback xmlns="">
             <p:sp>
               <p:nvSpPr>
                 <p:cNvPr id="33" name="TextBox 32">
@@ -4572,8 +4573,8 @@
               <a:chExt cx="1302327" cy="430887"/>
             </a:xfrm>
           </p:grpSpPr>
-          <mc:AlternateContent xmlns:mc="http://schemas.openxmlformats.org/markup-compatibility/2006">
-            <mc:Choice xmlns:a14="http://schemas.microsoft.com/office/drawing/2010/main" Requires="a14">
+          <mc:AlternateContent xmlns:mc="http://schemas.openxmlformats.org/markup-compatibility/2006" xmlns:a14="http://schemas.microsoft.com/office/drawing/2010/main">
+            <mc:Choice Requires="a14">
               <p:sp>
                 <p:nvSpPr>
                   <p:cNvPr id="32" name="TextBox 31">
@@ -4644,7 +4645,7 @@
                 </p:txBody>
               </p:sp>
             </mc:Choice>
-            <mc:Fallback>
+            <mc:Fallback xmlns="">
               <p:sp>
                 <p:nvSpPr>
                   <p:cNvPr id="32" name="TextBox 31">
@@ -4736,8 +4737,8 @@
             </p:style>
           </p:cxnSp>
         </p:grpSp>
-        <mc:AlternateContent xmlns:mc="http://schemas.openxmlformats.org/markup-compatibility/2006">
-          <mc:Choice xmlns:a14="http://schemas.microsoft.com/office/drawing/2010/main" Requires="a14">
+        <mc:AlternateContent xmlns:mc="http://schemas.openxmlformats.org/markup-compatibility/2006" xmlns:a14="http://schemas.microsoft.com/office/drawing/2010/main">
+          <mc:Choice Requires="a14">
             <p:sp>
               <p:nvSpPr>
                 <p:cNvPr id="41" name="TextBox 40">
@@ -4808,7 +4809,7 @@
               </p:txBody>
             </p:sp>
           </mc:Choice>
-          <mc:Fallback>
+          <mc:Fallback xmlns="">
             <p:sp>
               <p:nvSpPr>
                 <p:cNvPr id="41" name="TextBox 40">
@@ -5018,8 +5019,8 @@
                 </a:fontRef>
               </p:style>
             </p:cxnSp>
-            <mc:AlternateContent xmlns:mc="http://schemas.openxmlformats.org/markup-compatibility/2006">
-              <mc:Choice xmlns:a14="http://schemas.microsoft.com/office/drawing/2010/main" Requires="a14">
+            <mc:AlternateContent xmlns:mc="http://schemas.openxmlformats.org/markup-compatibility/2006" xmlns:a14="http://schemas.microsoft.com/office/drawing/2010/main">
+              <mc:Choice Requires="a14">
                 <p:sp>
                   <p:nvSpPr>
                     <p:cNvPr id="57" name="TextBox 56">
@@ -5090,7 +5091,7 @@
                   </p:txBody>
                 </p:sp>
               </mc:Choice>
-              <mc:Fallback>
+              <mc:Fallback xmlns="">
                 <p:sp>
                   <p:nvSpPr>
                     <p:cNvPr id="57" name="TextBox 56">
@@ -5135,8 +5136,8 @@
                 </p:sp>
               </mc:Fallback>
             </mc:AlternateContent>
-            <mc:AlternateContent xmlns:mc="http://schemas.openxmlformats.org/markup-compatibility/2006">
-              <mc:Choice xmlns:a14="http://schemas.microsoft.com/office/drawing/2010/main" Requires="a14">
+            <mc:AlternateContent xmlns:mc="http://schemas.openxmlformats.org/markup-compatibility/2006" xmlns:a14="http://schemas.microsoft.com/office/drawing/2010/main">
+              <mc:Choice Requires="a14">
                 <p:sp>
                   <p:nvSpPr>
                     <p:cNvPr id="58" name="TextBox 57">
@@ -5207,7 +5208,7 @@
                   </p:txBody>
                 </p:sp>
               </mc:Choice>
-              <mc:Fallback>
+              <mc:Fallback xmlns="">
                 <p:sp>
                   <p:nvSpPr>
                     <p:cNvPr id="58" name="TextBox 57">
@@ -5254,8 +5255,8 @@
             </mc:AlternateContent>
           </p:grpSp>
         </p:grpSp>
-        <mc:AlternateContent xmlns:mc="http://schemas.openxmlformats.org/markup-compatibility/2006">
-          <mc:Choice xmlns:a14="http://schemas.microsoft.com/office/drawing/2010/main" Requires="a14">
+        <mc:AlternateContent xmlns:mc="http://schemas.openxmlformats.org/markup-compatibility/2006" xmlns:a14="http://schemas.microsoft.com/office/drawing/2010/main">
+          <mc:Choice Requires="a14">
             <p:sp>
               <p:nvSpPr>
                 <p:cNvPr id="59" name="TextBox 58">
@@ -5326,7 +5327,7 @@
               </p:txBody>
             </p:sp>
           </mc:Choice>
-          <mc:Fallback>
+          <mc:Fallback xmlns="">
             <p:sp>
               <p:nvSpPr>
                 <p:cNvPr id="59" name="TextBox 58">
@@ -5371,8 +5372,8 @@
             </p:sp>
           </mc:Fallback>
         </mc:AlternateContent>
-        <mc:AlternateContent xmlns:mc="http://schemas.openxmlformats.org/markup-compatibility/2006">
-          <mc:Choice xmlns:a14="http://schemas.microsoft.com/office/drawing/2010/main" Requires="a14">
+        <mc:AlternateContent xmlns:mc="http://schemas.openxmlformats.org/markup-compatibility/2006" xmlns:a14="http://schemas.microsoft.com/office/drawing/2010/main">
+          <mc:Choice Requires="a14">
             <p:sp>
               <p:nvSpPr>
                 <p:cNvPr id="60" name="TextBox 59">
@@ -5443,7 +5444,7 @@
               </p:txBody>
             </p:sp>
           </mc:Choice>
-          <mc:Fallback>
+          <mc:Fallback xmlns="">
             <p:sp>
               <p:nvSpPr>
                 <p:cNvPr id="60" name="TextBox 59">
@@ -5488,8 +5489,8 @@
             </p:sp>
           </mc:Fallback>
         </mc:AlternateContent>
-        <mc:AlternateContent xmlns:mc="http://schemas.openxmlformats.org/markup-compatibility/2006">
-          <mc:Choice xmlns:a14="http://schemas.microsoft.com/office/drawing/2010/main" Requires="a14">
+        <mc:AlternateContent xmlns:mc="http://schemas.openxmlformats.org/markup-compatibility/2006" xmlns:a14="http://schemas.microsoft.com/office/drawing/2010/main">
+          <mc:Choice Requires="a14">
             <p:sp>
               <p:nvSpPr>
                 <p:cNvPr id="61" name="TextBox 60">
@@ -5560,7 +5561,7 @@
               </p:txBody>
             </p:sp>
           </mc:Choice>
-          <mc:Fallback>
+          <mc:Fallback xmlns="">
             <p:sp>
               <p:nvSpPr>
                 <p:cNvPr id="61" name="TextBox 60">
@@ -5605,8 +5606,8 @@
             </p:sp>
           </mc:Fallback>
         </mc:AlternateContent>
-        <mc:AlternateContent xmlns:mc="http://schemas.openxmlformats.org/markup-compatibility/2006">
-          <mc:Choice xmlns:a14="http://schemas.microsoft.com/office/drawing/2010/main" Requires="a14">
+        <mc:AlternateContent xmlns:mc="http://schemas.openxmlformats.org/markup-compatibility/2006" xmlns:a14="http://schemas.microsoft.com/office/drawing/2010/main">
+          <mc:Choice Requires="a14">
             <p:sp>
               <p:nvSpPr>
                 <p:cNvPr id="62" name="TextBox 61">
@@ -5677,7 +5678,7 @@
               </p:txBody>
             </p:sp>
           </mc:Choice>
-          <mc:Fallback>
+          <mc:Fallback xmlns="">
             <p:sp>
               <p:nvSpPr>
                 <p:cNvPr id="62" name="TextBox 61">
@@ -5830,8 +5831,8 @@
               </a:fontRef>
             </p:style>
           </p:cxnSp>
-          <mc:AlternateContent xmlns:mc="http://schemas.openxmlformats.org/markup-compatibility/2006">
-            <mc:Choice xmlns:a14="http://schemas.microsoft.com/office/drawing/2010/main" Requires="a14">
+          <mc:AlternateContent xmlns:mc="http://schemas.openxmlformats.org/markup-compatibility/2006" xmlns:a14="http://schemas.microsoft.com/office/drawing/2010/main">
+            <mc:Choice Requires="a14">
               <p:sp>
                 <p:nvSpPr>
                   <p:cNvPr id="66" name="TextBox 65">
@@ -5902,7 +5903,7 @@
                 </p:txBody>
               </p:sp>
             </mc:Choice>
-            <mc:Fallback>
+            <mc:Fallback xmlns="">
               <p:sp>
                 <p:nvSpPr>
                   <p:cNvPr id="66" name="TextBox 65">
@@ -5947,8 +5948,8 @@
               </p:sp>
             </mc:Fallback>
           </mc:AlternateContent>
-          <mc:AlternateContent xmlns:mc="http://schemas.openxmlformats.org/markup-compatibility/2006">
-            <mc:Choice xmlns:a14="http://schemas.microsoft.com/office/drawing/2010/main" Requires="a14">
+          <mc:AlternateContent xmlns:mc="http://schemas.openxmlformats.org/markup-compatibility/2006" xmlns:a14="http://schemas.microsoft.com/office/drawing/2010/main">
+            <mc:Choice Requires="a14">
               <p:sp>
                 <p:nvSpPr>
                   <p:cNvPr id="67" name="TextBox 66">
@@ -6019,7 +6020,7 @@
                 </p:txBody>
               </p:sp>
             </mc:Choice>
-            <mc:Fallback>
+            <mc:Fallback xmlns="">
               <p:sp>
                 <p:nvSpPr>
                   <p:cNvPr id="67" name="TextBox 66">
@@ -6173,8 +6174,8 @@
               </a:fontRef>
             </p:style>
           </p:cxnSp>
-          <mc:AlternateContent xmlns:mc="http://schemas.openxmlformats.org/markup-compatibility/2006">
-            <mc:Choice xmlns:a14="http://schemas.microsoft.com/office/drawing/2010/main" Requires="a14">
+          <mc:AlternateContent xmlns:mc="http://schemas.openxmlformats.org/markup-compatibility/2006" xmlns:a14="http://schemas.microsoft.com/office/drawing/2010/main">
+            <mc:Choice Requires="a14">
               <p:sp>
                 <p:nvSpPr>
                   <p:cNvPr id="71" name="TextBox 70">
@@ -6245,7 +6246,7 @@
                 </p:txBody>
               </p:sp>
             </mc:Choice>
-            <mc:Fallback>
+            <mc:Fallback xmlns="">
               <p:sp>
                 <p:nvSpPr>
                   <p:cNvPr id="71" name="TextBox 70">
@@ -6290,8 +6291,8 @@
               </p:sp>
             </mc:Fallback>
           </mc:AlternateContent>
-          <mc:AlternateContent xmlns:mc="http://schemas.openxmlformats.org/markup-compatibility/2006">
-            <mc:Choice xmlns:a14="http://schemas.microsoft.com/office/drawing/2010/main" Requires="a14">
+          <mc:AlternateContent xmlns:mc="http://schemas.openxmlformats.org/markup-compatibility/2006" xmlns:a14="http://schemas.microsoft.com/office/drawing/2010/main">
+            <mc:Choice Requires="a14">
               <p:sp>
                 <p:nvSpPr>
                   <p:cNvPr id="72" name="TextBox 71">
@@ -6362,7 +6363,7 @@
                 </p:txBody>
               </p:sp>
             </mc:Choice>
-            <mc:Fallback>
+            <mc:Fallback xmlns="">
               <p:sp>
                 <p:nvSpPr>
                   <p:cNvPr id="72" name="TextBox 71">
@@ -6516,8 +6517,8 @@
               </a:fontRef>
             </p:style>
           </p:cxnSp>
-          <mc:AlternateContent xmlns:mc="http://schemas.openxmlformats.org/markup-compatibility/2006">
-            <mc:Choice xmlns:a14="http://schemas.microsoft.com/office/drawing/2010/main" Requires="a14">
+          <mc:AlternateContent xmlns:mc="http://schemas.openxmlformats.org/markup-compatibility/2006" xmlns:a14="http://schemas.microsoft.com/office/drawing/2010/main">
+            <mc:Choice Requires="a14">
               <p:sp>
                 <p:nvSpPr>
                   <p:cNvPr id="76" name="TextBox 75">
@@ -6588,7 +6589,7 @@
                 </p:txBody>
               </p:sp>
             </mc:Choice>
-            <mc:Fallback>
+            <mc:Fallback xmlns="">
               <p:sp>
                 <p:nvSpPr>
                   <p:cNvPr id="76" name="TextBox 75">
@@ -6633,8 +6634,8 @@
               </p:sp>
             </mc:Fallback>
           </mc:AlternateContent>
-          <mc:AlternateContent xmlns:mc="http://schemas.openxmlformats.org/markup-compatibility/2006">
-            <mc:Choice xmlns:a14="http://schemas.microsoft.com/office/drawing/2010/main" Requires="a14">
+          <mc:AlternateContent xmlns:mc="http://schemas.openxmlformats.org/markup-compatibility/2006" xmlns:a14="http://schemas.microsoft.com/office/drawing/2010/main">
+            <mc:Choice Requires="a14">
               <p:sp>
                 <p:nvSpPr>
                   <p:cNvPr id="77" name="TextBox 76">
@@ -6705,7 +6706,7 @@
                 </p:txBody>
               </p:sp>
             </mc:Choice>
-            <mc:Fallback>
+            <mc:Fallback xmlns="">
               <p:sp>
                 <p:nvSpPr>
                   <p:cNvPr id="77" name="TextBox 76">
@@ -6859,8 +6860,8 @@
               </a:fontRef>
             </p:style>
           </p:cxnSp>
-          <mc:AlternateContent xmlns:mc="http://schemas.openxmlformats.org/markup-compatibility/2006">
-            <mc:Choice xmlns:a14="http://schemas.microsoft.com/office/drawing/2010/main" Requires="a14">
+          <mc:AlternateContent xmlns:mc="http://schemas.openxmlformats.org/markup-compatibility/2006" xmlns:a14="http://schemas.microsoft.com/office/drawing/2010/main">
+            <mc:Choice Requires="a14">
               <p:sp>
                 <p:nvSpPr>
                   <p:cNvPr id="81" name="TextBox 80">
@@ -6931,7 +6932,7 @@
                 </p:txBody>
               </p:sp>
             </mc:Choice>
-            <mc:Fallback>
+            <mc:Fallback xmlns="">
               <p:sp>
                 <p:nvSpPr>
                   <p:cNvPr id="81" name="TextBox 80">
@@ -6976,8 +6977,8 @@
               </p:sp>
             </mc:Fallback>
           </mc:AlternateContent>
-          <mc:AlternateContent xmlns:mc="http://schemas.openxmlformats.org/markup-compatibility/2006">
-            <mc:Choice xmlns:a14="http://schemas.microsoft.com/office/drawing/2010/main" Requires="a14">
+          <mc:AlternateContent xmlns:mc="http://schemas.openxmlformats.org/markup-compatibility/2006" xmlns:a14="http://schemas.microsoft.com/office/drawing/2010/main">
+            <mc:Choice Requires="a14">
               <p:sp>
                 <p:nvSpPr>
                   <p:cNvPr id="82" name="TextBox 81">
@@ -7048,7 +7049,7 @@
                 </p:txBody>
               </p:sp>
             </mc:Choice>
-            <mc:Fallback>
+            <mc:Fallback xmlns="">
               <p:sp>
                 <p:nvSpPr>
                   <p:cNvPr id="82" name="TextBox 81">
@@ -7202,8 +7203,8 @@
               </a:fontRef>
             </p:style>
           </p:cxnSp>
-          <mc:AlternateContent xmlns:mc="http://schemas.openxmlformats.org/markup-compatibility/2006">
-            <mc:Choice xmlns:a14="http://schemas.microsoft.com/office/drawing/2010/main" Requires="a14">
+          <mc:AlternateContent xmlns:mc="http://schemas.openxmlformats.org/markup-compatibility/2006" xmlns:a14="http://schemas.microsoft.com/office/drawing/2010/main">
+            <mc:Choice Requires="a14">
               <p:sp>
                 <p:nvSpPr>
                   <p:cNvPr id="86" name="TextBox 85">
@@ -7274,7 +7275,7 @@
                 </p:txBody>
               </p:sp>
             </mc:Choice>
-            <mc:Fallback>
+            <mc:Fallback xmlns="">
               <p:sp>
                 <p:nvSpPr>
                   <p:cNvPr id="86" name="TextBox 85">
@@ -7319,8 +7320,8 @@
               </p:sp>
             </mc:Fallback>
           </mc:AlternateContent>
-          <mc:AlternateContent xmlns:mc="http://schemas.openxmlformats.org/markup-compatibility/2006">
-            <mc:Choice xmlns:a14="http://schemas.microsoft.com/office/drawing/2010/main" Requires="a14">
+          <mc:AlternateContent xmlns:mc="http://schemas.openxmlformats.org/markup-compatibility/2006" xmlns:a14="http://schemas.microsoft.com/office/drawing/2010/main">
+            <mc:Choice Requires="a14">
               <p:sp>
                 <p:nvSpPr>
                   <p:cNvPr id="87" name="TextBox 86">
@@ -7391,7 +7392,7 @@
                 </p:txBody>
               </p:sp>
             </mc:Choice>
-            <mc:Fallback>
+            <mc:Fallback xmlns="">
               <p:sp>
                 <p:nvSpPr>
                   <p:cNvPr id="87" name="TextBox 86">
@@ -7602,8 +7603,8 @@
                 </a:fontRef>
               </p:style>
             </p:cxnSp>
-            <mc:AlternateContent xmlns:mc="http://schemas.openxmlformats.org/markup-compatibility/2006">
-              <mc:Choice xmlns:a14="http://schemas.microsoft.com/office/drawing/2010/main" Requires="a14">
+            <mc:AlternateContent xmlns:mc="http://schemas.openxmlformats.org/markup-compatibility/2006" xmlns:a14="http://schemas.microsoft.com/office/drawing/2010/main">
+              <mc:Choice Requires="a14">
                 <p:sp>
                   <p:nvSpPr>
                     <p:cNvPr id="91" name="TextBox 90">
@@ -7674,7 +7675,7 @@
                   </p:txBody>
                 </p:sp>
               </mc:Choice>
-              <mc:Fallback>
+              <mc:Fallback xmlns="">
                 <p:sp>
                   <p:nvSpPr>
                     <p:cNvPr id="91" name="TextBox 90">
@@ -7719,8 +7720,8 @@
                 </p:sp>
               </mc:Fallback>
             </mc:AlternateContent>
-            <mc:AlternateContent xmlns:mc="http://schemas.openxmlformats.org/markup-compatibility/2006">
-              <mc:Choice xmlns:a14="http://schemas.microsoft.com/office/drawing/2010/main" Requires="a14">
+            <mc:AlternateContent xmlns:mc="http://schemas.openxmlformats.org/markup-compatibility/2006" xmlns:a14="http://schemas.microsoft.com/office/drawing/2010/main">
+              <mc:Choice Requires="a14">
                 <p:sp>
                   <p:nvSpPr>
                     <p:cNvPr id="92" name="TextBox 91">
@@ -7791,7 +7792,7 @@
                   </p:txBody>
                 </p:sp>
               </mc:Choice>
-              <mc:Fallback>
+              <mc:Fallback xmlns="">
                 <p:sp>
                   <p:nvSpPr>
                     <p:cNvPr id="92" name="TextBox 91">
@@ -7843,6 +7844,360 @@
     <p:extLst>
       <p:ext uri="{BB962C8B-B14F-4D97-AF65-F5344CB8AC3E}">
         <p14:creationId xmlns:p14="http://schemas.microsoft.com/office/powerpoint/2010/main" val="690115939"/>
+      </p:ext>
+    </p:extLst>
+  </p:cSld>
+  <p:clrMapOvr>
+    <a:masterClrMapping/>
+  </p:clrMapOvr>
+</p:sld>
+</file>
+
+<file path=ppt/slides/slide2.xml><?xml version="1.0" encoding="utf-8"?>
+<p:sld xmlns:a="http://schemas.openxmlformats.org/drawingml/2006/main" xmlns:r="http://schemas.openxmlformats.org/officeDocument/2006/relationships" xmlns:p="http://schemas.openxmlformats.org/presentationml/2006/main">
+  <p:cSld>
+    <p:spTree>
+      <p:nvGrpSpPr>
+        <p:cNvPr id="1" name=""/>
+        <p:cNvGrpSpPr/>
+        <p:nvPr/>
+      </p:nvGrpSpPr>
+      <p:grpSpPr>
+        <a:xfrm>
+          <a:off x="0" y="0"/>
+          <a:ext cx="0" cy="0"/>
+          <a:chOff x="0" y="0"/>
+          <a:chExt cx="0" cy="0"/>
+        </a:xfrm>
+      </p:grpSpPr>
+      <p:grpSp>
+        <p:nvGrpSpPr>
+          <p:cNvPr id="98" name="Group 97">
+            <a:extLst>
+              <a:ext uri="{FF2B5EF4-FFF2-40B4-BE49-F238E27FC236}">
+                <a16:creationId xmlns:a16="http://schemas.microsoft.com/office/drawing/2014/main" id="{6D10865E-9C54-C6B5-8D89-B894D1A0C51D}"/>
+              </a:ext>
+            </a:extLst>
+          </p:cNvPr>
+          <p:cNvGrpSpPr/>
+          <p:nvPr/>
+        </p:nvGrpSpPr>
+        <p:grpSpPr>
+          <a:xfrm>
+            <a:off x="-221209" y="1054160"/>
+            <a:ext cx="11871730" cy="4904243"/>
+            <a:chOff x="-221209" y="1054160"/>
+            <a:chExt cx="11871730" cy="4904243"/>
+          </a:xfrm>
+        </p:grpSpPr>
+        <p:pic>
+          <p:nvPicPr>
+            <p:cNvPr id="25" name="Picture 24" descr="A white rectangular object with holes&#10;&#10;Description automatically generated">
+              <a:extLst>
+                <a:ext uri="{FF2B5EF4-FFF2-40B4-BE49-F238E27FC236}">
+                  <a16:creationId xmlns:a16="http://schemas.microsoft.com/office/drawing/2014/main" id="{2D9BC8EB-40E5-6AA8-8B2A-80D6CDEA5820}"/>
+                </a:ext>
+              </a:extLst>
+            </p:cNvPr>
+            <p:cNvPicPr>
+              <a:picLocks noChangeAspect="1"/>
+            </p:cNvPicPr>
+            <p:nvPr/>
+          </p:nvPicPr>
+          <p:blipFill>
+            <a:blip r:embed="rId2"/>
+            <a:stretch>
+              <a:fillRect/>
+            </a:stretch>
+          </p:blipFill>
+          <p:spPr>
+            <a:xfrm>
+              <a:off x="954202" y="1586428"/>
+              <a:ext cx="7772400" cy="4371975"/>
+            </a:xfrm>
+            <a:prstGeom prst="rect">
+              <a:avLst/>
+            </a:prstGeom>
+          </p:spPr>
+        </p:pic>
+        <p:pic>
+          <p:nvPicPr>
+            <p:cNvPr id="38" name="Picture 37">
+              <a:extLst>
+                <a:ext uri="{FF2B5EF4-FFF2-40B4-BE49-F238E27FC236}">
+                  <a16:creationId xmlns:a16="http://schemas.microsoft.com/office/drawing/2014/main" id="{85C2701C-37F5-0A0B-E59D-3B4322C0BA15}"/>
+                </a:ext>
+              </a:extLst>
+            </p:cNvPr>
+            <p:cNvPicPr>
+              <a:picLocks noChangeAspect="1"/>
+            </p:cNvPicPr>
+            <p:nvPr/>
+          </p:nvPicPr>
+          <p:blipFill>
+            <a:blip r:embed="rId3"/>
+            <a:stretch>
+              <a:fillRect/>
+            </a:stretch>
+          </p:blipFill>
+          <p:spPr>
+            <a:xfrm rot="21440853">
+              <a:off x="-213814" y="1054160"/>
+              <a:ext cx="10287000" cy="1824162"/>
+            </a:xfrm>
+            <a:prstGeom prst="rect">
+              <a:avLst/>
+            </a:prstGeom>
+          </p:spPr>
+        </p:pic>
+        <p:pic>
+          <p:nvPicPr>
+            <p:cNvPr id="50" name="Picture 49">
+              <a:extLst>
+                <a:ext uri="{FF2B5EF4-FFF2-40B4-BE49-F238E27FC236}">
+                  <a16:creationId xmlns:a16="http://schemas.microsoft.com/office/drawing/2014/main" id="{E62967B4-6E6D-B7E8-8FCB-13850A2E8B4B}"/>
+                </a:ext>
+              </a:extLst>
+            </p:cNvPr>
+            <p:cNvPicPr>
+              <a:picLocks noChangeAspect="1"/>
+            </p:cNvPicPr>
+            <p:nvPr/>
+          </p:nvPicPr>
+          <p:blipFill>
+            <a:blip r:embed="rId4"/>
+            <a:stretch>
+              <a:fillRect/>
+            </a:stretch>
+          </p:blipFill>
+          <p:spPr>
+            <a:xfrm>
+              <a:off x="-221209" y="2168633"/>
+              <a:ext cx="10287000" cy="1828800"/>
+            </a:xfrm>
+            <a:prstGeom prst="rect">
+              <a:avLst/>
+            </a:prstGeom>
+          </p:spPr>
+        </p:pic>
+        <p:pic>
+          <p:nvPicPr>
+            <p:cNvPr id="52" name="Picture 51">
+              <a:extLst>
+                <a:ext uri="{FF2B5EF4-FFF2-40B4-BE49-F238E27FC236}">
+                  <a16:creationId xmlns:a16="http://schemas.microsoft.com/office/drawing/2014/main" id="{D73A6E5A-0449-064D-38CA-3CBCFBA4990D}"/>
+                </a:ext>
+              </a:extLst>
+            </p:cNvPr>
+            <p:cNvPicPr>
+              <a:picLocks/>
+            </p:cNvPicPr>
+            <p:nvPr/>
+          </p:nvPicPr>
+          <p:blipFill>
+            <a:blip r:embed="rId5"/>
+            <a:stretch>
+              <a:fillRect/>
+            </a:stretch>
+          </p:blipFill>
+          <p:spPr>
+            <a:xfrm rot="21370177">
+              <a:off x="-201311" y="3511615"/>
+              <a:ext cx="10287000" cy="1828800"/>
+            </a:xfrm>
+            <a:prstGeom prst="rect">
+              <a:avLst/>
+            </a:prstGeom>
+          </p:spPr>
+        </p:pic>
+        <p:sp>
+          <p:nvSpPr>
+            <p:cNvPr id="53" name="Right Arrow 52">
+              <a:extLst>
+                <a:ext uri="{FF2B5EF4-FFF2-40B4-BE49-F238E27FC236}">
+                  <a16:creationId xmlns:a16="http://schemas.microsoft.com/office/drawing/2014/main" id="{E3E0622D-AAA4-284A-AC79-368C5B0C17B6}"/>
+                </a:ext>
+              </a:extLst>
+            </p:cNvPr>
+            <p:cNvSpPr/>
+            <p:nvPr/>
+          </p:nvSpPr>
+          <p:spPr>
+            <a:xfrm>
+              <a:off x="8914130" y="3125850"/>
+              <a:ext cx="736979" cy="914400"/>
+            </a:xfrm>
+            <a:prstGeom prst="rightArrow">
+              <a:avLst/>
+            </a:prstGeom>
+            <a:solidFill>
+              <a:schemeClr val="tx1"/>
+            </a:solidFill>
+            <a:ln>
+              <a:noFill/>
+            </a:ln>
+          </p:spPr>
+          <p:style>
+            <a:lnRef idx="2">
+              <a:schemeClr val="accent1">
+                <a:shade val="15000"/>
+              </a:schemeClr>
+            </a:lnRef>
+            <a:fillRef idx="1">
+              <a:schemeClr val="accent1"/>
+            </a:fillRef>
+            <a:effectRef idx="0">
+              <a:schemeClr val="accent1"/>
+            </a:effectRef>
+            <a:fontRef idx="minor">
+              <a:schemeClr val="lt1"/>
+            </a:fontRef>
+          </p:style>
+          <p:txBody>
+            <a:bodyPr rtlCol="0" anchor="ctr"/>
+            <a:lstStyle/>
+            <a:p>
+              <a:pPr algn="ctr"/>
+              <a:endParaRPr lang="en-US"/>
+            </a:p>
+          </p:txBody>
+        </p:sp>
+        <mc:AlternateContent xmlns:mc="http://schemas.openxmlformats.org/markup-compatibility/2006">
+          <mc:Choice xmlns:a14="http://schemas.microsoft.com/office/drawing/2010/main" Requires="a14">
+            <p:sp>
+              <p:nvSpPr>
+                <p:cNvPr id="96" name="TextBox 95">
+                  <a:extLst>
+                    <a:ext uri="{FF2B5EF4-FFF2-40B4-BE49-F238E27FC236}">
+                      <a16:creationId xmlns:a16="http://schemas.microsoft.com/office/drawing/2014/main" id="{4A6A9771-030F-7D14-3CF1-31913C3E6F8B}"/>
+                    </a:ext>
+                  </a:extLst>
+                </p:cNvPr>
+                <p:cNvSpPr txBox="1"/>
+                <p:nvPr/>
+              </p:nvSpPr>
+              <p:spPr>
+                <a:xfrm>
+                  <a:off x="9688509" y="3047134"/>
+                  <a:ext cx="1962012" cy="1071832"/>
+                </a:xfrm>
+                <a:prstGeom prst="rect">
+                  <a:avLst/>
+                </a:prstGeom>
+                <a:noFill/>
+              </p:spPr>
+              <p:txBody>
+                <a:bodyPr wrap="none" lIns="0" tIns="0" rIns="0" bIns="0" rtlCol="0">
+                  <a:spAutoFit/>
+                </a:bodyPr>
+                <a:lstStyle/>
+                <a:p>
+                  <a14:m>
+                    <m:oMathPara xmlns:m="http://schemas.openxmlformats.org/officeDocument/2006/math">
+                      <m:oMathParaPr>
+                        <m:jc m:val="centerGroup"/>
+                      </m:oMathParaPr>
+                      <m:oMath xmlns:m="http://schemas.openxmlformats.org/officeDocument/2006/math">
+                        <m:r>
+                          <a:rPr lang="en-US" sz="5400" b="0" i="1" baseline="0" smtClean="0">
+                            <a:latin typeface="Cambria Math" panose="02040503050406030204" pitchFamily="18" charset="0"/>
+                          </a:rPr>
+                          <m:t>𝛥</m:t>
+                        </m:r>
+                        <m:sSubSup>
+                          <m:sSubSupPr>
+                            <m:ctrlPr>
+                              <a:rPr lang="en-US" sz="5400" i="1" smtClean="0">
+                                <a:latin typeface="Cambria Math" panose="02040503050406030204" pitchFamily="18" charset="0"/>
+                              </a:rPr>
+                            </m:ctrlPr>
+                          </m:sSubSupPr>
+                          <m:e>
+                            <m:r>
+                              <a:rPr lang="en-US" sz="5400" b="0" i="1" baseline="0" smtClean="0">
+                                <a:latin typeface="Cambria Math" panose="02040503050406030204" pitchFamily="18" charset="0"/>
+                              </a:rPr>
+                              <m:t>𝐺</m:t>
+                            </m:r>
+                          </m:e>
+                          <m:sub>
+                            <m:r>
+                              <a:rPr lang="en-US" sz="5400" b="0" i="1" baseline="0" smtClean="0">
+                                <a:latin typeface="Cambria Math" panose="02040503050406030204" pitchFamily="18" charset="0"/>
+                              </a:rPr>
+                              <m:t>𝑒𝑓𝑓</m:t>
+                            </m:r>
+                          </m:sub>
+                          <m:sup>
+                            <m:r>
+                              <a:rPr lang="en-US" sz="5400" b="0" i="1" baseline="0" smtClean="0">
+                                <a:latin typeface="Cambria Math" panose="02040503050406030204" pitchFamily="18" charset="0"/>
+                                <a:ea typeface="Cambria Math" panose="02040503050406030204" pitchFamily="18" charset="0"/>
+                              </a:rPr>
+                              <m:t>‡</m:t>
+                            </m:r>
+                          </m:sup>
+                        </m:sSubSup>
+                      </m:oMath>
+                    </m:oMathPara>
+                  </a14:m>
+                  <a:endParaRPr lang="en-US" sz="5400" i="1" dirty="0">
+                    <a:latin typeface="Helvetica" pitchFamily="2" charset="0"/>
+                  </a:endParaRPr>
+                </a:p>
+              </p:txBody>
+            </p:sp>
+          </mc:Choice>
+          <mc:Fallback>
+            <p:sp>
+              <p:nvSpPr>
+                <p:cNvPr id="96" name="TextBox 95">
+                  <a:extLst>
+                    <a:ext uri="{FF2B5EF4-FFF2-40B4-BE49-F238E27FC236}">
+                      <a16:creationId xmlns:a16="http://schemas.microsoft.com/office/drawing/2014/main" id="{4A6A9771-030F-7D14-3CF1-31913C3E6F8B}"/>
+                    </a:ext>
+                  </a:extLst>
+                </p:cNvPr>
+                <p:cNvSpPr txBox="1">
+                  <a:spLocks noRot="1" noChangeAspect="1" noMove="1" noResize="1" noEditPoints="1" noAdjustHandles="1" noChangeArrowheads="1" noChangeShapeType="1" noTextEdit="1"/>
+                </p:cNvSpPr>
+                <p:nvPr/>
+              </p:nvSpPr>
+              <p:spPr>
+                <a:xfrm>
+                  <a:off x="9688509" y="3047134"/>
+                  <a:ext cx="1962012" cy="1071832"/>
+                </a:xfrm>
+                <a:prstGeom prst="rect">
+                  <a:avLst/>
+                </a:prstGeom>
+                <a:blipFill>
+                  <a:blip r:embed="rId6"/>
+                  <a:stretch>
+                    <a:fillRect l="-6410" t="-1176" r="-3846" b="-20000"/>
+                  </a:stretch>
+                </a:blipFill>
+              </p:spPr>
+              <p:txBody>
+                <a:bodyPr/>
+                <a:lstStyle/>
+                <a:p>
+                  <a:r>
+                    <a:rPr lang="en-US">
+                      <a:noFill/>
+                    </a:rPr>
+                    <a:t> </a:t>
+                  </a:r>
+                </a:p>
+              </p:txBody>
+            </p:sp>
+          </mc:Fallback>
+        </mc:AlternateContent>
+      </p:grpSp>
+    </p:spTree>
+    <p:extLst>
+      <p:ext uri="{BB962C8B-B14F-4D97-AF65-F5344CB8AC3E}">
+        <p14:creationId xmlns:p14="http://schemas.microsoft.com/office/powerpoint/2010/main" val="985779647"/>
       </p:ext>
     </p:extLst>
   </p:cSld>

</xml_diff>

<commit_message>
update realistic membrane images
</commit_message>
<xml_diff>
--- a/figs/labeled_realistic_membrane.pptx
+++ b/figs/labeled_realistic_membrane.pptx
@@ -5,8 +5,9 @@
     <p:sldMasterId id="2147483648" r:id="rId1"/>
   </p:sldMasterIdLst>
   <p:sldIdLst>
-    <p:sldId id="256" r:id="rId2"/>
-    <p:sldId id="257" r:id="rId3"/>
+    <p:sldId id="257" r:id="rId2"/>
+    <p:sldId id="258" r:id="rId3"/>
+    <p:sldId id="256" r:id="rId4"/>
   </p:sldIdLst>
   <p:sldSz cx="12192000" cy="6858000"/>
   <p:notesSz cx="6858000" cy="9144000"/>
@@ -260,7 +261,7 @@
           <a:p>
             <a:fld id="{3FE4A416-97FA-944C-BA97-257286476C07}" type="datetimeFigureOut">
               <a:rPr lang="en-US" smtClean="0"/>
-              <a:t>5/24/24</a:t>
+              <a:t>7/25/24</a:t>
             </a:fld>
             <a:endParaRPr lang="en-US"/>
           </a:p>
@@ -458,7 +459,7 @@
           <a:p>
             <a:fld id="{3FE4A416-97FA-944C-BA97-257286476C07}" type="datetimeFigureOut">
               <a:rPr lang="en-US" smtClean="0"/>
-              <a:t>5/24/24</a:t>
+              <a:t>7/25/24</a:t>
             </a:fld>
             <a:endParaRPr lang="en-US"/>
           </a:p>
@@ -666,7 +667,7 @@
           <a:p>
             <a:fld id="{3FE4A416-97FA-944C-BA97-257286476C07}" type="datetimeFigureOut">
               <a:rPr lang="en-US" smtClean="0"/>
-              <a:t>5/24/24</a:t>
+              <a:t>7/25/24</a:t>
             </a:fld>
             <a:endParaRPr lang="en-US"/>
           </a:p>
@@ -864,7 +865,7 @@
           <a:p>
             <a:fld id="{3FE4A416-97FA-944C-BA97-257286476C07}" type="datetimeFigureOut">
               <a:rPr lang="en-US" smtClean="0"/>
-              <a:t>5/24/24</a:t>
+              <a:t>7/25/24</a:t>
             </a:fld>
             <a:endParaRPr lang="en-US"/>
           </a:p>
@@ -1139,7 +1140,7 @@
           <a:p>
             <a:fld id="{3FE4A416-97FA-944C-BA97-257286476C07}" type="datetimeFigureOut">
               <a:rPr lang="en-US" smtClean="0"/>
-              <a:t>5/24/24</a:t>
+              <a:t>7/25/24</a:t>
             </a:fld>
             <a:endParaRPr lang="en-US"/>
           </a:p>
@@ -1404,7 +1405,7 @@
           <a:p>
             <a:fld id="{3FE4A416-97FA-944C-BA97-257286476C07}" type="datetimeFigureOut">
               <a:rPr lang="en-US" smtClean="0"/>
-              <a:t>5/24/24</a:t>
+              <a:t>7/25/24</a:t>
             </a:fld>
             <a:endParaRPr lang="en-US"/>
           </a:p>
@@ -1816,7 +1817,7 @@
           <a:p>
             <a:fld id="{3FE4A416-97FA-944C-BA97-257286476C07}" type="datetimeFigureOut">
               <a:rPr lang="en-US" smtClean="0"/>
-              <a:t>5/24/24</a:t>
+              <a:t>7/25/24</a:t>
             </a:fld>
             <a:endParaRPr lang="en-US"/>
           </a:p>
@@ -1957,7 +1958,7 @@
           <a:p>
             <a:fld id="{3FE4A416-97FA-944C-BA97-257286476C07}" type="datetimeFigureOut">
               <a:rPr lang="en-US" smtClean="0"/>
-              <a:t>5/24/24</a:t>
+              <a:t>7/25/24</a:t>
             </a:fld>
             <a:endParaRPr lang="en-US"/>
           </a:p>
@@ -2070,7 +2071,7 @@
           <a:p>
             <a:fld id="{3FE4A416-97FA-944C-BA97-257286476C07}" type="datetimeFigureOut">
               <a:rPr lang="en-US" smtClean="0"/>
-              <a:t>5/24/24</a:t>
+              <a:t>7/25/24</a:t>
             </a:fld>
             <a:endParaRPr lang="en-US"/>
           </a:p>
@@ -2381,7 +2382,7 @@
           <a:p>
             <a:fld id="{3FE4A416-97FA-944C-BA97-257286476C07}" type="datetimeFigureOut">
               <a:rPr lang="en-US" smtClean="0"/>
-              <a:t>5/24/24</a:t>
+              <a:t>7/25/24</a:t>
             </a:fld>
             <a:endParaRPr lang="en-US"/>
           </a:p>
@@ -2669,7 +2670,7 @@
           <a:p>
             <a:fld id="{3FE4A416-97FA-944C-BA97-257286476C07}" type="datetimeFigureOut">
               <a:rPr lang="en-US" smtClean="0"/>
-              <a:t>5/24/24</a:t>
+              <a:t>7/25/24</a:t>
             </a:fld>
             <a:endParaRPr lang="en-US"/>
           </a:p>
@@ -2910,7 +2911,7 @@
           <a:p>
             <a:fld id="{3FE4A416-97FA-944C-BA97-257286476C07}" type="datetimeFigureOut">
               <a:rPr lang="en-US" smtClean="0"/>
-              <a:t>5/24/24</a:t>
+              <a:t>7/25/24</a:t>
             </a:fld>
             <a:endParaRPr lang="en-US"/>
           </a:p>
@@ -3329,10 +3330,2952 @@
       </p:grpSpPr>
       <p:grpSp>
         <p:nvGrpSpPr>
-          <p:cNvPr id="95" name="Group 94">
+          <p:cNvPr id="98" name="Group 97">
             <a:extLst>
               <a:ext uri="{FF2B5EF4-FFF2-40B4-BE49-F238E27FC236}">
-                <a16:creationId xmlns:a16="http://schemas.microsoft.com/office/drawing/2014/main" id="{C87C6529-094F-BDFD-2E88-7400B93861EA}"/>
+                <a16:creationId xmlns:a16="http://schemas.microsoft.com/office/drawing/2014/main" id="{6D10865E-9C54-C6B5-8D89-B894D1A0C51D}"/>
+              </a:ext>
+            </a:extLst>
+          </p:cNvPr>
+          <p:cNvGrpSpPr/>
+          <p:nvPr/>
+        </p:nvGrpSpPr>
+        <p:grpSpPr>
+          <a:xfrm>
+            <a:off x="-221209" y="1054160"/>
+            <a:ext cx="11871730" cy="4904243"/>
+            <a:chOff x="-221209" y="1054160"/>
+            <a:chExt cx="11871730" cy="4904243"/>
+          </a:xfrm>
+        </p:grpSpPr>
+        <p:pic>
+          <p:nvPicPr>
+            <p:cNvPr id="25" name="Picture 24" descr="A white rectangular object with holes&#10;&#10;Description automatically generated">
+              <a:extLst>
+                <a:ext uri="{FF2B5EF4-FFF2-40B4-BE49-F238E27FC236}">
+                  <a16:creationId xmlns:a16="http://schemas.microsoft.com/office/drawing/2014/main" id="{2D9BC8EB-40E5-6AA8-8B2A-80D6CDEA5820}"/>
+                </a:ext>
+              </a:extLst>
+            </p:cNvPr>
+            <p:cNvPicPr>
+              <a:picLocks noChangeAspect="1"/>
+            </p:cNvPicPr>
+            <p:nvPr/>
+          </p:nvPicPr>
+          <p:blipFill>
+            <a:blip r:embed="rId2"/>
+            <a:stretch>
+              <a:fillRect/>
+            </a:stretch>
+          </p:blipFill>
+          <p:spPr>
+            <a:xfrm>
+              <a:off x="954202" y="1586428"/>
+              <a:ext cx="7772400" cy="4371975"/>
+            </a:xfrm>
+            <a:prstGeom prst="rect">
+              <a:avLst/>
+            </a:prstGeom>
+          </p:spPr>
+        </p:pic>
+        <p:pic>
+          <p:nvPicPr>
+            <p:cNvPr id="38" name="Picture 37">
+              <a:extLst>
+                <a:ext uri="{FF2B5EF4-FFF2-40B4-BE49-F238E27FC236}">
+                  <a16:creationId xmlns:a16="http://schemas.microsoft.com/office/drawing/2014/main" id="{85C2701C-37F5-0A0B-E59D-3B4322C0BA15}"/>
+                </a:ext>
+              </a:extLst>
+            </p:cNvPr>
+            <p:cNvPicPr>
+              <a:picLocks noChangeAspect="1"/>
+            </p:cNvPicPr>
+            <p:nvPr/>
+          </p:nvPicPr>
+          <p:blipFill>
+            <a:blip r:embed="rId3"/>
+            <a:stretch>
+              <a:fillRect/>
+            </a:stretch>
+          </p:blipFill>
+          <p:spPr>
+            <a:xfrm rot="21440853">
+              <a:off x="-213814" y="1054160"/>
+              <a:ext cx="10287000" cy="1824162"/>
+            </a:xfrm>
+            <a:prstGeom prst="rect">
+              <a:avLst/>
+            </a:prstGeom>
+          </p:spPr>
+        </p:pic>
+        <p:pic>
+          <p:nvPicPr>
+            <p:cNvPr id="50" name="Picture 49">
+              <a:extLst>
+                <a:ext uri="{FF2B5EF4-FFF2-40B4-BE49-F238E27FC236}">
+                  <a16:creationId xmlns:a16="http://schemas.microsoft.com/office/drawing/2014/main" id="{E62967B4-6E6D-B7E8-8FCB-13850A2E8B4B}"/>
+                </a:ext>
+              </a:extLst>
+            </p:cNvPr>
+            <p:cNvPicPr>
+              <a:picLocks noChangeAspect="1"/>
+            </p:cNvPicPr>
+            <p:nvPr/>
+          </p:nvPicPr>
+          <p:blipFill>
+            <a:blip r:embed="rId4"/>
+            <a:stretch>
+              <a:fillRect/>
+            </a:stretch>
+          </p:blipFill>
+          <p:spPr>
+            <a:xfrm>
+              <a:off x="-221209" y="2168633"/>
+              <a:ext cx="10287000" cy="1828800"/>
+            </a:xfrm>
+            <a:prstGeom prst="rect">
+              <a:avLst/>
+            </a:prstGeom>
+          </p:spPr>
+        </p:pic>
+        <p:pic>
+          <p:nvPicPr>
+            <p:cNvPr id="52" name="Picture 51">
+              <a:extLst>
+                <a:ext uri="{FF2B5EF4-FFF2-40B4-BE49-F238E27FC236}">
+                  <a16:creationId xmlns:a16="http://schemas.microsoft.com/office/drawing/2014/main" id="{D73A6E5A-0449-064D-38CA-3CBCFBA4990D}"/>
+                </a:ext>
+              </a:extLst>
+            </p:cNvPr>
+            <p:cNvPicPr>
+              <a:picLocks/>
+            </p:cNvPicPr>
+            <p:nvPr/>
+          </p:nvPicPr>
+          <p:blipFill>
+            <a:blip r:embed="rId5"/>
+            <a:stretch>
+              <a:fillRect/>
+            </a:stretch>
+          </p:blipFill>
+          <p:spPr>
+            <a:xfrm rot="21370177">
+              <a:off x="-201311" y="3511615"/>
+              <a:ext cx="10287000" cy="1828800"/>
+            </a:xfrm>
+            <a:prstGeom prst="rect">
+              <a:avLst/>
+            </a:prstGeom>
+          </p:spPr>
+        </p:pic>
+        <p:sp>
+          <p:nvSpPr>
+            <p:cNvPr id="53" name="Right Arrow 52">
+              <a:extLst>
+                <a:ext uri="{FF2B5EF4-FFF2-40B4-BE49-F238E27FC236}">
+                  <a16:creationId xmlns:a16="http://schemas.microsoft.com/office/drawing/2014/main" id="{E3E0622D-AAA4-284A-AC79-368C5B0C17B6}"/>
+                </a:ext>
+              </a:extLst>
+            </p:cNvPr>
+            <p:cNvSpPr/>
+            <p:nvPr/>
+          </p:nvSpPr>
+          <p:spPr>
+            <a:xfrm>
+              <a:off x="8914130" y="3125850"/>
+              <a:ext cx="736979" cy="914400"/>
+            </a:xfrm>
+            <a:prstGeom prst="rightArrow">
+              <a:avLst/>
+            </a:prstGeom>
+            <a:solidFill>
+              <a:schemeClr val="tx1"/>
+            </a:solidFill>
+            <a:ln>
+              <a:noFill/>
+            </a:ln>
+          </p:spPr>
+          <p:style>
+            <a:lnRef idx="2">
+              <a:schemeClr val="accent1">
+                <a:shade val="15000"/>
+              </a:schemeClr>
+            </a:lnRef>
+            <a:fillRef idx="1">
+              <a:schemeClr val="accent1"/>
+            </a:fillRef>
+            <a:effectRef idx="0">
+              <a:schemeClr val="accent1"/>
+            </a:effectRef>
+            <a:fontRef idx="minor">
+              <a:schemeClr val="lt1"/>
+            </a:fontRef>
+          </p:style>
+          <p:txBody>
+            <a:bodyPr rtlCol="0" anchor="ctr"/>
+            <a:lstStyle/>
+            <a:p>
+              <a:pPr algn="ctr"/>
+              <a:endParaRPr lang="en-US"/>
+            </a:p>
+          </p:txBody>
+        </p:sp>
+        <mc:AlternateContent xmlns:mc="http://schemas.openxmlformats.org/markup-compatibility/2006" xmlns:a14="http://schemas.microsoft.com/office/drawing/2010/main">
+          <mc:Choice Requires="a14">
+            <p:sp>
+              <p:nvSpPr>
+                <p:cNvPr id="96" name="TextBox 95">
+                  <a:extLst>
+                    <a:ext uri="{FF2B5EF4-FFF2-40B4-BE49-F238E27FC236}">
+                      <a16:creationId xmlns:a16="http://schemas.microsoft.com/office/drawing/2014/main" id="{4A6A9771-030F-7D14-3CF1-31913C3E6F8B}"/>
+                    </a:ext>
+                  </a:extLst>
+                </p:cNvPr>
+                <p:cNvSpPr txBox="1"/>
+                <p:nvPr/>
+              </p:nvSpPr>
+              <p:spPr>
+                <a:xfrm>
+                  <a:off x="9688509" y="3047134"/>
+                  <a:ext cx="1962012" cy="1071832"/>
+                </a:xfrm>
+                <a:prstGeom prst="rect">
+                  <a:avLst/>
+                </a:prstGeom>
+                <a:noFill/>
+              </p:spPr>
+              <p:txBody>
+                <a:bodyPr wrap="none" lIns="0" tIns="0" rIns="0" bIns="0" rtlCol="0">
+                  <a:spAutoFit/>
+                </a:bodyPr>
+                <a:lstStyle/>
+                <a:p>
+                  <a:pPr/>
+                  <a14:m>
+                    <m:oMathPara xmlns:m="http://schemas.openxmlformats.org/officeDocument/2006/math">
+                      <m:oMathParaPr>
+                        <m:jc m:val="centerGroup"/>
+                      </m:oMathParaPr>
+                      <m:oMath xmlns:m="http://schemas.openxmlformats.org/officeDocument/2006/math">
+                        <m:r>
+                          <a:rPr lang="en-US" sz="5400" b="0" i="1" baseline="0" smtClean="0">
+                            <a:latin typeface="Cambria Math" panose="02040503050406030204" pitchFamily="18" charset="0"/>
+                          </a:rPr>
+                          <m:t>𝛥</m:t>
+                        </m:r>
+                        <m:sSubSup>
+                          <m:sSubSupPr>
+                            <m:ctrlPr>
+                              <a:rPr lang="en-US" sz="5400" i="1" smtClean="0">
+                                <a:latin typeface="Cambria Math" panose="02040503050406030204" pitchFamily="18" charset="0"/>
+                              </a:rPr>
+                            </m:ctrlPr>
+                          </m:sSubSupPr>
+                          <m:e>
+                            <m:r>
+                              <a:rPr lang="en-US" sz="5400" b="0" i="1" baseline="0" smtClean="0">
+                                <a:latin typeface="Cambria Math" panose="02040503050406030204" pitchFamily="18" charset="0"/>
+                              </a:rPr>
+                              <m:t>𝐺</m:t>
+                            </m:r>
+                          </m:e>
+                          <m:sub>
+                            <m:r>
+                              <a:rPr lang="en-US" sz="5400" b="0" i="1" baseline="0" smtClean="0">
+                                <a:latin typeface="Cambria Math" panose="02040503050406030204" pitchFamily="18" charset="0"/>
+                              </a:rPr>
+                              <m:t>𝑒𝑓𝑓</m:t>
+                            </m:r>
+                          </m:sub>
+                          <m:sup>
+                            <m:r>
+                              <a:rPr lang="en-US" sz="5400" b="0" i="1" baseline="0" smtClean="0">
+                                <a:latin typeface="Cambria Math" panose="02040503050406030204" pitchFamily="18" charset="0"/>
+                                <a:ea typeface="Cambria Math" panose="02040503050406030204" pitchFamily="18" charset="0"/>
+                              </a:rPr>
+                              <m:t>‡</m:t>
+                            </m:r>
+                          </m:sup>
+                        </m:sSubSup>
+                      </m:oMath>
+                    </m:oMathPara>
+                  </a14:m>
+                  <a:endParaRPr lang="en-US" sz="5400" i="1" dirty="0">
+                    <a:latin typeface="Helvetica" pitchFamily="2" charset="0"/>
+                  </a:endParaRPr>
+                </a:p>
+              </p:txBody>
+            </p:sp>
+          </mc:Choice>
+          <mc:Fallback xmlns="">
+            <p:sp>
+              <p:nvSpPr>
+                <p:cNvPr id="96" name="TextBox 95">
+                  <a:extLst>
+                    <a:ext uri="{FF2B5EF4-FFF2-40B4-BE49-F238E27FC236}">
+                      <a16:creationId xmlns:a16="http://schemas.microsoft.com/office/drawing/2014/main" id="{4A6A9771-030F-7D14-3CF1-31913C3E6F8B}"/>
+                    </a:ext>
+                  </a:extLst>
+                </p:cNvPr>
+                <p:cNvSpPr txBox="1">
+                  <a:spLocks noRot="1" noChangeAspect="1" noMove="1" noResize="1" noEditPoints="1" noAdjustHandles="1" noChangeArrowheads="1" noChangeShapeType="1" noTextEdit="1"/>
+                </p:cNvSpPr>
+                <p:nvPr/>
+              </p:nvSpPr>
+              <p:spPr>
+                <a:xfrm>
+                  <a:off x="9688509" y="3047134"/>
+                  <a:ext cx="1962012" cy="1071832"/>
+                </a:xfrm>
+                <a:prstGeom prst="rect">
+                  <a:avLst/>
+                </a:prstGeom>
+                <a:blipFill>
+                  <a:blip r:embed="rId6"/>
+                  <a:stretch>
+                    <a:fillRect l="-6410" t="-1176" r="-3846" b="-20000"/>
+                  </a:stretch>
+                </a:blipFill>
+              </p:spPr>
+              <p:txBody>
+                <a:bodyPr/>
+                <a:lstStyle/>
+                <a:p>
+                  <a:r>
+                    <a:rPr lang="en-US">
+                      <a:noFill/>
+                    </a:rPr>
+                    <a:t> </a:t>
+                  </a:r>
+                </a:p>
+              </p:txBody>
+            </p:sp>
+          </mc:Fallback>
+        </mc:AlternateContent>
+      </p:grpSp>
+      <p:sp>
+        <p:nvSpPr>
+          <p:cNvPr id="2" name="TextBox 1">
+            <a:extLst>
+              <a:ext uri="{FF2B5EF4-FFF2-40B4-BE49-F238E27FC236}">
+                <a16:creationId xmlns:a16="http://schemas.microsoft.com/office/drawing/2014/main" id="{915BE8D3-6D21-B372-B38B-3CD6AFC8EF6B}"/>
+              </a:ext>
+            </a:extLst>
+          </p:cNvPr>
+          <p:cNvSpPr txBox="1"/>
+          <p:nvPr/>
+        </p:nvSpPr>
+        <p:spPr>
+          <a:xfrm>
+            <a:off x="1109133" y="389467"/>
+            <a:ext cx="566052" cy="369332"/>
+          </a:xfrm>
+          <a:prstGeom prst="rect">
+            <a:avLst/>
+          </a:prstGeom>
+          <a:noFill/>
+        </p:spPr>
+        <p:txBody>
+          <a:bodyPr wrap="none" rtlCol="0">
+            <a:spAutoFit/>
+          </a:bodyPr>
+          <a:lstStyle/>
+          <a:p>
+            <a:r>
+              <a:rPr lang="en-US" dirty="0"/>
+              <a:t>TOC</a:t>
+            </a:r>
+          </a:p>
+        </p:txBody>
+      </p:sp>
+    </p:spTree>
+    <p:extLst>
+      <p:ext uri="{BB962C8B-B14F-4D97-AF65-F5344CB8AC3E}">
+        <p14:creationId xmlns:p14="http://schemas.microsoft.com/office/powerpoint/2010/main" val="985779647"/>
+      </p:ext>
+    </p:extLst>
+  </p:cSld>
+  <p:clrMapOvr>
+    <a:masterClrMapping/>
+  </p:clrMapOvr>
+</p:sld>
+</file>
+
+<file path=ppt/slides/slide2.xml><?xml version="1.0" encoding="utf-8"?>
+<p:sld xmlns:a="http://schemas.openxmlformats.org/drawingml/2006/main" xmlns:r="http://schemas.openxmlformats.org/officeDocument/2006/relationships" xmlns:p="http://schemas.openxmlformats.org/presentationml/2006/main">
+  <p:cSld>
+    <p:spTree>
+      <p:nvGrpSpPr>
+        <p:cNvPr id="1" name=""/>
+        <p:cNvGrpSpPr/>
+        <p:nvPr/>
+      </p:nvGrpSpPr>
+      <p:grpSpPr>
+        <a:xfrm>
+          <a:off x="0" y="0"/>
+          <a:ext cx="0" cy="0"/>
+          <a:chOff x="0" y="0"/>
+          <a:chExt cx="0" cy="0"/>
+        </a:xfrm>
+      </p:grpSpPr>
+      <p:sp>
+        <p:nvSpPr>
+          <p:cNvPr id="2" name="TextBox 1">
+            <a:extLst>
+              <a:ext uri="{FF2B5EF4-FFF2-40B4-BE49-F238E27FC236}">
+                <a16:creationId xmlns:a16="http://schemas.microsoft.com/office/drawing/2014/main" id="{915BE8D3-6D21-B372-B38B-3CD6AFC8EF6B}"/>
+              </a:ext>
+            </a:extLst>
+          </p:cNvPr>
+          <p:cNvSpPr txBox="1"/>
+          <p:nvPr/>
+        </p:nvSpPr>
+        <p:spPr>
+          <a:xfrm>
+            <a:off x="1109133" y="389467"/>
+            <a:ext cx="679994" cy="369332"/>
+          </a:xfrm>
+          <a:prstGeom prst="rect">
+            <a:avLst/>
+          </a:prstGeom>
+          <a:noFill/>
+        </p:spPr>
+        <p:txBody>
+          <a:bodyPr wrap="none" rtlCol="0">
+            <a:spAutoFit/>
+          </a:bodyPr>
+          <a:lstStyle/>
+          <a:p>
+            <a:r>
+              <a:rPr lang="en-US" dirty="0"/>
+              <a:t>Fig. 1</a:t>
+            </a:r>
+          </a:p>
+        </p:txBody>
+      </p:sp>
+      <p:grpSp>
+        <p:nvGrpSpPr>
+          <p:cNvPr id="62" name="Group 61">
+            <a:extLst>
+              <a:ext uri="{FF2B5EF4-FFF2-40B4-BE49-F238E27FC236}">
+                <a16:creationId xmlns:a16="http://schemas.microsoft.com/office/drawing/2014/main" id="{48AC998C-2F4A-2E95-FABA-9EBCDCA8E549}"/>
+              </a:ext>
+            </a:extLst>
+          </p:cNvPr>
+          <p:cNvGrpSpPr/>
+          <p:nvPr/>
+        </p:nvGrpSpPr>
+        <p:grpSpPr>
+          <a:xfrm>
+            <a:off x="1109133" y="544821"/>
+            <a:ext cx="10306898" cy="5611096"/>
+            <a:chOff x="1109133" y="544821"/>
+            <a:chExt cx="10306898" cy="5611096"/>
+          </a:xfrm>
+        </p:grpSpPr>
+        <p:grpSp>
+          <p:nvGrpSpPr>
+            <p:cNvPr id="3" name="Group 2">
+              <a:extLst>
+                <a:ext uri="{FF2B5EF4-FFF2-40B4-BE49-F238E27FC236}">
+                  <a16:creationId xmlns:a16="http://schemas.microsoft.com/office/drawing/2014/main" id="{98BA51F2-2BF8-FCAC-DF7B-89E4E37A389D}"/>
+                </a:ext>
+              </a:extLst>
+            </p:cNvPr>
+            <p:cNvGrpSpPr/>
+            <p:nvPr/>
+          </p:nvGrpSpPr>
+          <p:grpSpPr>
+            <a:xfrm>
+              <a:off x="1109133" y="1206560"/>
+              <a:ext cx="10306898" cy="4904243"/>
+              <a:chOff x="0" y="1062627"/>
+              <a:chExt cx="10306898" cy="4904243"/>
+            </a:xfrm>
+          </p:grpSpPr>
+          <p:pic>
+            <p:nvPicPr>
+              <p:cNvPr id="25" name="Picture 24" descr="A white rectangular object with holes&#10;&#10;Description automatically generated">
+                <a:extLst>
+                  <a:ext uri="{FF2B5EF4-FFF2-40B4-BE49-F238E27FC236}">
+                    <a16:creationId xmlns:a16="http://schemas.microsoft.com/office/drawing/2014/main" id="{2D9BC8EB-40E5-6AA8-8B2A-80D6CDEA5820}"/>
+                  </a:ext>
+                </a:extLst>
+              </p:cNvPr>
+              <p:cNvPicPr>
+                <a:picLocks noChangeAspect="1"/>
+              </p:cNvPicPr>
+              <p:nvPr/>
+            </p:nvPicPr>
+            <p:blipFill>
+              <a:blip r:embed="rId2"/>
+              <a:stretch>
+                <a:fillRect/>
+              </a:stretch>
+            </p:blipFill>
+            <p:spPr>
+              <a:xfrm>
+                <a:off x="1175411" y="1594895"/>
+                <a:ext cx="7772400" cy="4371975"/>
+              </a:xfrm>
+              <a:prstGeom prst="rect">
+                <a:avLst/>
+              </a:prstGeom>
+            </p:spPr>
+          </p:pic>
+          <p:pic>
+            <p:nvPicPr>
+              <p:cNvPr id="38" name="Picture 37">
+                <a:extLst>
+                  <a:ext uri="{FF2B5EF4-FFF2-40B4-BE49-F238E27FC236}">
+                    <a16:creationId xmlns:a16="http://schemas.microsoft.com/office/drawing/2014/main" id="{85C2701C-37F5-0A0B-E59D-3B4322C0BA15}"/>
+                  </a:ext>
+                </a:extLst>
+              </p:cNvPr>
+              <p:cNvPicPr>
+                <a:picLocks noChangeAspect="1"/>
+              </p:cNvPicPr>
+              <p:nvPr/>
+            </p:nvPicPr>
+            <p:blipFill>
+              <a:blip r:embed="rId3"/>
+              <a:stretch>
+                <a:fillRect/>
+              </a:stretch>
+            </p:blipFill>
+            <p:spPr>
+              <a:xfrm rot="21440853">
+                <a:off x="7395" y="1062627"/>
+                <a:ext cx="10287000" cy="1824162"/>
+              </a:xfrm>
+              <a:prstGeom prst="rect">
+                <a:avLst/>
+              </a:prstGeom>
+            </p:spPr>
+          </p:pic>
+          <p:pic>
+            <p:nvPicPr>
+              <p:cNvPr id="50" name="Picture 49">
+                <a:extLst>
+                  <a:ext uri="{FF2B5EF4-FFF2-40B4-BE49-F238E27FC236}">
+                    <a16:creationId xmlns:a16="http://schemas.microsoft.com/office/drawing/2014/main" id="{E62967B4-6E6D-B7E8-8FCB-13850A2E8B4B}"/>
+                  </a:ext>
+                </a:extLst>
+              </p:cNvPr>
+              <p:cNvPicPr>
+                <a:picLocks noChangeAspect="1"/>
+              </p:cNvPicPr>
+              <p:nvPr/>
+            </p:nvPicPr>
+            <p:blipFill>
+              <a:blip r:embed="rId4"/>
+              <a:stretch>
+                <a:fillRect/>
+              </a:stretch>
+            </p:blipFill>
+            <p:spPr>
+              <a:xfrm>
+                <a:off x="0" y="2177100"/>
+                <a:ext cx="10287000" cy="1828800"/>
+              </a:xfrm>
+              <a:prstGeom prst="rect">
+                <a:avLst/>
+              </a:prstGeom>
+            </p:spPr>
+          </p:pic>
+          <p:pic>
+            <p:nvPicPr>
+              <p:cNvPr id="52" name="Picture 51">
+                <a:extLst>
+                  <a:ext uri="{FF2B5EF4-FFF2-40B4-BE49-F238E27FC236}">
+                    <a16:creationId xmlns:a16="http://schemas.microsoft.com/office/drawing/2014/main" id="{D73A6E5A-0449-064D-38CA-3CBCFBA4990D}"/>
+                  </a:ext>
+                </a:extLst>
+              </p:cNvPr>
+              <p:cNvPicPr>
+                <a:picLocks/>
+              </p:cNvPicPr>
+              <p:nvPr/>
+            </p:nvPicPr>
+            <p:blipFill>
+              <a:blip r:embed="rId5"/>
+              <a:stretch>
+                <a:fillRect/>
+              </a:stretch>
+            </p:blipFill>
+            <p:spPr>
+              <a:xfrm rot="21370177">
+                <a:off x="19898" y="3520082"/>
+                <a:ext cx="10287000" cy="1828800"/>
+              </a:xfrm>
+              <a:prstGeom prst="rect">
+                <a:avLst/>
+              </a:prstGeom>
+            </p:spPr>
+          </p:pic>
+        </p:grpSp>
+        <p:grpSp>
+          <p:nvGrpSpPr>
+            <p:cNvPr id="4" name="Group 3">
+              <a:extLst>
+                <a:ext uri="{FF2B5EF4-FFF2-40B4-BE49-F238E27FC236}">
+                  <a16:creationId xmlns:a16="http://schemas.microsoft.com/office/drawing/2014/main" id="{AA0EE531-7BD1-F7E9-E659-7CA1A56DAF99}"/>
+                </a:ext>
+              </a:extLst>
+            </p:cNvPr>
+            <p:cNvGrpSpPr/>
+            <p:nvPr/>
+          </p:nvGrpSpPr>
+          <p:grpSpPr>
+            <a:xfrm>
+              <a:off x="2744013" y="636492"/>
+              <a:ext cx="731520" cy="1142267"/>
+              <a:chOff x="2223812" y="545028"/>
+              <a:chExt cx="731520" cy="1142267"/>
+            </a:xfrm>
+          </p:grpSpPr>
+          <p:cxnSp>
+            <p:nvCxnSpPr>
+              <p:cNvPr id="5" name="Straight Arrow Connector 4">
+                <a:extLst>
+                  <a:ext uri="{FF2B5EF4-FFF2-40B4-BE49-F238E27FC236}">
+                    <a16:creationId xmlns:a16="http://schemas.microsoft.com/office/drawing/2014/main" id="{4190DB2C-640F-0DC7-41EF-ACC3DB28D6E5}"/>
+                  </a:ext>
+                </a:extLst>
+              </p:cNvPr>
+              <p:cNvCxnSpPr>
+                <a:cxnSpLocks noChangeAspect="1"/>
+              </p:cNvCxnSpPr>
+              <p:nvPr/>
+            </p:nvCxnSpPr>
+            <p:spPr>
+              <a:xfrm>
+                <a:off x="2223812" y="1063277"/>
+                <a:ext cx="731520" cy="0"/>
+              </a:xfrm>
+              <a:prstGeom prst="straightConnector1">
+                <a:avLst/>
+              </a:prstGeom>
+              <a:ln w="38100">
+                <a:solidFill>
+                  <a:schemeClr val="tx1"/>
+                </a:solidFill>
+                <a:tailEnd type="triangle"/>
+              </a:ln>
+            </p:spPr>
+            <p:style>
+              <a:lnRef idx="1">
+                <a:schemeClr val="accent1"/>
+              </a:lnRef>
+              <a:fillRef idx="0">
+                <a:schemeClr val="accent1"/>
+              </a:fillRef>
+              <a:effectRef idx="0">
+                <a:schemeClr val="accent1"/>
+              </a:effectRef>
+              <a:fontRef idx="minor">
+                <a:schemeClr val="tx1"/>
+              </a:fontRef>
+            </p:style>
+          </p:cxnSp>
+          <p:cxnSp>
+            <p:nvCxnSpPr>
+              <p:cNvPr id="6" name="Straight Arrow Connector 5">
+                <a:extLst>
+                  <a:ext uri="{FF2B5EF4-FFF2-40B4-BE49-F238E27FC236}">
+                    <a16:creationId xmlns:a16="http://schemas.microsoft.com/office/drawing/2014/main" id="{0FED647B-4B9E-DE2B-4CEC-397D476FE3B3}"/>
+                  </a:ext>
+                </a:extLst>
+              </p:cNvPr>
+              <p:cNvCxnSpPr>
+                <a:cxnSpLocks noChangeAspect="1"/>
+              </p:cNvCxnSpPr>
+              <p:nvPr/>
+            </p:nvCxnSpPr>
+            <p:spPr>
+              <a:xfrm flipH="1">
+                <a:off x="2223812" y="1210712"/>
+                <a:ext cx="731520" cy="0"/>
+              </a:xfrm>
+              <a:prstGeom prst="straightConnector1">
+                <a:avLst/>
+              </a:prstGeom>
+              <a:ln w="38100">
+                <a:solidFill>
+                  <a:schemeClr val="tx1"/>
+                </a:solidFill>
+                <a:tailEnd type="triangle"/>
+              </a:ln>
+            </p:spPr>
+            <p:style>
+              <a:lnRef idx="1">
+                <a:schemeClr val="accent1"/>
+              </a:lnRef>
+              <a:fillRef idx="0">
+                <a:schemeClr val="accent1"/>
+              </a:fillRef>
+              <a:effectRef idx="0">
+                <a:schemeClr val="accent1"/>
+              </a:effectRef>
+              <a:fontRef idx="minor">
+                <a:schemeClr val="tx1"/>
+              </a:fontRef>
+            </p:style>
+          </p:cxnSp>
+          <mc:AlternateContent xmlns:mc="http://schemas.openxmlformats.org/markup-compatibility/2006" xmlns:a14="http://schemas.microsoft.com/office/drawing/2010/main">
+            <mc:Choice Requires="a14">
+              <p:sp>
+                <p:nvSpPr>
+                  <p:cNvPr id="7" name="TextBox 6">
+                    <a:extLst>
+                      <a:ext uri="{FF2B5EF4-FFF2-40B4-BE49-F238E27FC236}">
+                        <a16:creationId xmlns:a16="http://schemas.microsoft.com/office/drawing/2014/main" id="{87EAEBF2-4375-F22F-A49C-A29C18886984}"/>
+                      </a:ext>
+                    </a:extLst>
+                  </p:cNvPr>
+                  <p:cNvSpPr txBox="1"/>
+                  <p:nvPr/>
+                </p:nvSpPr>
+                <p:spPr>
+                  <a:xfrm>
+                    <a:off x="2253679" y="545028"/>
+                    <a:ext cx="691343" cy="430887"/>
+                  </a:xfrm>
+                  <a:prstGeom prst="rect">
+                    <a:avLst/>
+                  </a:prstGeom>
+                  <a:noFill/>
+                </p:spPr>
+                <p:txBody>
+                  <a:bodyPr wrap="none" lIns="0" tIns="0" rIns="0" bIns="0" rtlCol="0">
+                    <a:spAutoFit/>
+                  </a:bodyPr>
+                  <a:lstStyle/>
+                  <a:p>
+                    <a:pPr/>
+                    <a14:m>
+                      <m:oMathPara xmlns:m="http://schemas.openxmlformats.org/officeDocument/2006/math">
+                        <m:oMathParaPr>
+                          <m:jc m:val="centerGroup"/>
+                        </m:oMathParaPr>
+                        <m:oMath xmlns:m="http://schemas.openxmlformats.org/officeDocument/2006/math">
+                          <m:sSub>
+                            <m:sSubPr>
+                              <m:ctrlPr>
+                                <a:rPr lang="en-US" sz="2800" i="1" smtClean="0">
+                                  <a:latin typeface="Cambria Math" panose="02040503050406030204" pitchFamily="18" charset="0"/>
+                                </a:rPr>
+                              </m:ctrlPr>
+                            </m:sSubPr>
+                            <m:e>
+                              <m:r>
+                                <a:rPr lang="en-US" sz="2800" b="0" i="1" smtClean="0">
+                                  <a:latin typeface="Cambria Math" panose="02040503050406030204" pitchFamily="18" charset="0"/>
+                                </a:rPr>
+                                <m:t>𝑘</m:t>
+                              </m:r>
+                            </m:e>
+                            <m:sub>
+                              <m:r>
+                                <a:rPr lang="en-US" sz="2800" b="0" i="1" smtClean="0">
+                                  <a:latin typeface="Cambria Math" panose="02040503050406030204" pitchFamily="18" charset="0"/>
+                                </a:rPr>
+                                <m:t>𝑠𝑚</m:t>
+                              </m:r>
+                            </m:sub>
+                          </m:sSub>
+                        </m:oMath>
+                      </m:oMathPara>
+                    </a14:m>
+                    <a:endParaRPr lang="en-US" sz="2800" dirty="0">
+                      <a:latin typeface="Helvetica" pitchFamily="2" charset="0"/>
+                    </a:endParaRPr>
+                  </a:p>
+                </p:txBody>
+              </p:sp>
+            </mc:Choice>
+            <mc:Fallback xmlns="">
+              <p:sp>
+                <p:nvSpPr>
+                  <p:cNvPr id="18" name="TextBox 17">
+                    <a:extLst>
+                      <a:ext uri="{FF2B5EF4-FFF2-40B4-BE49-F238E27FC236}">
+                        <a16:creationId xmlns:a16="http://schemas.microsoft.com/office/drawing/2014/main" id="{527C1B99-25F3-C75F-ED02-1B341F756030}"/>
+                      </a:ext>
+                    </a:extLst>
+                  </p:cNvPr>
+                  <p:cNvSpPr txBox="1">
+                    <a:spLocks noRot="1" noChangeAspect="1" noMove="1" noResize="1" noEditPoints="1" noAdjustHandles="1" noChangeArrowheads="1" noChangeShapeType="1" noTextEdit="1"/>
+                  </p:cNvSpPr>
+                  <p:nvPr/>
+                </p:nvSpPr>
+                <p:spPr>
+                  <a:xfrm>
+                    <a:off x="2253679" y="545028"/>
+                    <a:ext cx="691343" cy="430887"/>
+                  </a:xfrm>
+                  <a:prstGeom prst="rect">
+                    <a:avLst/>
+                  </a:prstGeom>
+                  <a:blipFill>
+                    <a:blip r:embed="rId6"/>
+                    <a:stretch>
+                      <a:fillRect l="-8929" b="-8571"/>
+                    </a:stretch>
+                  </a:blipFill>
+                </p:spPr>
+                <p:txBody>
+                  <a:bodyPr/>
+                  <a:lstStyle/>
+                  <a:p>
+                    <a:r>
+                      <a:rPr lang="en-US">
+                        <a:noFill/>
+                      </a:rPr>
+                      <a:t> </a:t>
+                    </a:r>
+                  </a:p>
+                </p:txBody>
+              </p:sp>
+            </mc:Fallback>
+          </mc:AlternateContent>
+          <mc:AlternateContent xmlns:mc="http://schemas.openxmlformats.org/markup-compatibility/2006" xmlns:a14="http://schemas.microsoft.com/office/drawing/2010/main">
+            <mc:Choice Requires="a14">
+              <p:sp>
+                <p:nvSpPr>
+                  <p:cNvPr id="8" name="TextBox 7">
+                    <a:extLst>
+                      <a:ext uri="{FF2B5EF4-FFF2-40B4-BE49-F238E27FC236}">
+                        <a16:creationId xmlns:a16="http://schemas.microsoft.com/office/drawing/2014/main" id="{4F913758-0782-BCF8-70BA-4C300F900E5C}"/>
+                      </a:ext>
+                    </a:extLst>
+                  </p:cNvPr>
+                  <p:cNvSpPr txBox="1"/>
+                  <p:nvPr/>
+                </p:nvSpPr>
+                <p:spPr>
+                  <a:xfrm>
+                    <a:off x="2253230" y="1256408"/>
+                    <a:ext cx="691343" cy="430887"/>
+                  </a:xfrm>
+                  <a:prstGeom prst="rect">
+                    <a:avLst/>
+                  </a:prstGeom>
+                  <a:noFill/>
+                </p:spPr>
+                <p:txBody>
+                  <a:bodyPr wrap="none" lIns="0" tIns="0" rIns="0" bIns="0" rtlCol="0">
+                    <a:spAutoFit/>
+                  </a:bodyPr>
+                  <a:lstStyle/>
+                  <a:p>
+                    <a:pPr/>
+                    <a14:m>
+                      <m:oMathPara xmlns:m="http://schemas.openxmlformats.org/officeDocument/2006/math">
+                        <m:oMathParaPr>
+                          <m:jc m:val="centerGroup"/>
+                        </m:oMathParaPr>
+                        <m:oMath xmlns:m="http://schemas.openxmlformats.org/officeDocument/2006/math">
+                          <m:sSub>
+                            <m:sSubPr>
+                              <m:ctrlPr>
+                                <a:rPr lang="en-US" sz="2800" i="1" smtClean="0">
+                                  <a:latin typeface="Cambria Math" panose="02040503050406030204" pitchFamily="18" charset="0"/>
+                                </a:rPr>
+                              </m:ctrlPr>
+                            </m:sSubPr>
+                            <m:e>
+                              <m:r>
+                                <a:rPr lang="en-US" sz="2800" b="0" i="1" smtClean="0">
+                                  <a:latin typeface="Cambria Math" panose="02040503050406030204" pitchFamily="18" charset="0"/>
+                                </a:rPr>
+                                <m:t>𝑘</m:t>
+                              </m:r>
+                            </m:e>
+                            <m:sub>
+                              <m:r>
+                                <a:rPr lang="en-US" sz="2800" b="0" i="1" smtClean="0">
+                                  <a:latin typeface="Cambria Math" panose="02040503050406030204" pitchFamily="18" charset="0"/>
+                                </a:rPr>
+                                <m:t>𝑚𝑠</m:t>
+                              </m:r>
+                            </m:sub>
+                          </m:sSub>
+                        </m:oMath>
+                      </m:oMathPara>
+                    </a14:m>
+                    <a:endParaRPr lang="en-US" sz="2800" dirty="0">
+                      <a:latin typeface="Helvetica" pitchFamily="2" charset="0"/>
+                    </a:endParaRPr>
+                  </a:p>
+                </p:txBody>
+              </p:sp>
+            </mc:Choice>
+            <mc:Fallback xmlns="">
+              <p:sp>
+                <p:nvSpPr>
+                  <p:cNvPr id="19" name="TextBox 18">
+                    <a:extLst>
+                      <a:ext uri="{FF2B5EF4-FFF2-40B4-BE49-F238E27FC236}">
+                        <a16:creationId xmlns:a16="http://schemas.microsoft.com/office/drawing/2014/main" id="{373ACEAA-EAF4-B03A-D7BD-D4F753D11541}"/>
+                      </a:ext>
+                    </a:extLst>
+                  </p:cNvPr>
+                  <p:cNvSpPr txBox="1">
+                    <a:spLocks noRot="1" noChangeAspect="1" noMove="1" noResize="1" noEditPoints="1" noAdjustHandles="1" noChangeArrowheads="1" noChangeShapeType="1" noTextEdit="1"/>
+                  </p:cNvSpPr>
+                  <p:nvPr/>
+                </p:nvSpPr>
+                <p:spPr>
+                  <a:xfrm>
+                    <a:off x="2253230" y="1256408"/>
+                    <a:ext cx="691343" cy="430887"/>
+                  </a:xfrm>
+                  <a:prstGeom prst="rect">
+                    <a:avLst/>
+                  </a:prstGeom>
+                  <a:blipFill>
+                    <a:blip r:embed="rId7"/>
+                    <a:stretch>
+                      <a:fillRect l="-10714" b="-5556"/>
+                    </a:stretch>
+                  </a:blipFill>
+                </p:spPr>
+                <p:txBody>
+                  <a:bodyPr/>
+                  <a:lstStyle/>
+                  <a:p>
+                    <a:r>
+                      <a:rPr lang="en-US">
+                        <a:noFill/>
+                      </a:rPr>
+                      <a:t> </a:t>
+                    </a:r>
+                  </a:p>
+                </p:txBody>
+              </p:sp>
+            </mc:Fallback>
+          </mc:AlternateContent>
+        </p:grpSp>
+        <p:grpSp>
+          <p:nvGrpSpPr>
+            <p:cNvPr id="9" name="Group 8">
+              <a:extLst>
+                <a:ext uri="{FF2B5EF4-FFF2-40B4-BE49-F238E27FC236}">
+                  <a16:creationId xmlns:a16="http://schemas.microsoft.com/office/drawing/2014/main" id="{C9BDEB9A-ACA3-DE7C-4F62-AF62E6C5AE2F}"/>
+                </a:ext>
+              </a:extLst>
+            </p:cNvPr>
+            <p:cNvGrpSpPr/>
+            <p:nvPr/>
+          </p:nvGrpSpPr>
+          <p:grpSpPr>
+            <a:xfrm>
+              <a:off x="5928149" y="544821"/>
+              <a:ext cx="904415" cy="1176957"/>
+              <a:chOff x="2299836" y="545028"/>
+              <a:chExt cx="904415" cy="1176957"/>
+            </a:xfrm>
+          </p:grpSpPr>
+          <p:cxnSp>
+            <p:nvCxnSpPr>
+              <p:cNvPr id="10" name="Straight Arrow Connector 9">
+                <a:extLst>
+                  <a:ext uri="{FF2B5EF4-FFF2-40B4-BE49-F238E27FC236}">
+                    <a16:creationId xmlns:a16="http://schemas.microsoft.com/office/drawing/2014/main" id="{D9B8C528-D104-F86F-8D53-5942895A37B8}"/>
+                  </a:ext>
+                </a:extLst>
+              </p:cNvPr>
+              <p:cNvCxnSpPr>
+                <a:cxnSpLocks noChangeAspect="1"/>
+              </p:cNvCxnSpPr>
+              <p:nvPr/>
+            </p:nvCxnSpPr>
+            <p:spPr>
+              <a:xfrm>
+                <a:off x="2386283" y="1063277"/>
+                <a:ext cx="731520" cy="0"/>
+              </a:xfrm>
+              <a:prstGeom prst="straightConnector1">
+                <a:avLst/>
+              </a:prstGeom>
+              <a:ln w="38100">
+                <a:solidFill>
+                  <a:schemeClr val="tx1"/>
+                </a:solidFill>
+                <a:tailEnd type="triangle"/>
+              </a:ln>
+            </p:spPr>
+            <p:style>
+              <a:lnRef idx="1">
+                <a:schemeClr val="accent1"/>
+              </a:lnRef>
+              <a:fillRef idx="0">
+                <a:schemeClr val="accent1"/>
+              </a:fillRef>
+              <a:effectRef idx="0">
+                <a:schemeClr val="accent1"/>
+              </a:effectRef>
+              <a:fontRef idx="minor">
+                <a:schemeClr val="tx1"/>
+              </a:fontRef>
+            </p:style>
+          </p:cxnSp>
+          <p:cxnSp>
+            <p:nvCxnSpPr>
+              <p:cNvPr id="11" name="Straight Arrow Connector 10">
+                <a:extLst>
+                  <a:ext uri="{FF2B5EF4-FFF2-40B4-BE49-F238E27FC236}">
+                    <a16:creationId xmlns:a16="http://schemas.microsoft.com/office/drawing/2014/main" id="{69D21AFE-312F-2A78-8EB0-5FC9C66C168C}"/>
+                  </a:ext>
+                </a:extLst>
+              </p:cNvPr>
+              <p:cNvCxnSpPr>
+                <a:cxnSpLocks noChangeAspect="1"/>
+              </p:cNvCxnSpPr>
+              <p:nvPr/>
+            </p:nvCxnSpPr>
+            <p:spPr>
+              <a:xfrm flipH="1">
+                <a:off x="2386283" y="1210712"/>
+                <a:ext cx="731520" cy="0"/>
+              </a:xfrm>
+              <a:prstGeom prst="straightConnector1">
+                <a:avLst/>
+              </a:prstGeom>
+              <a:ln w="38100">
+                <a:solidFill>
+                  <a:schemeClr val="tx1"/>
+                </a:solidFill>
+                <a:tailEnd type="triangle"/>
+              </a:ln>
+            </p:spPr>
+            <p:style>
+              <a:lnRef idx="1">
+                <a:schemeClr val="accent1"/>
+              </a:lnRef>
+              <a:fillRef idx="0">
+                <a:schemeClr val="accent1"/>
+              </a:fillRef>
+              <a:effectRef idx="0">
+                <a:schemeClr val="accent1"/>
+              </a:effectRef>
+              <a:fontRef idx="minor">
+                <a:schemeClr val="tx1"/>
+              </a:fontRef>
+            </p:style>
+          </p:cxnSp>
+          <mc:AlternateContent xmlns:mc="http://schemas.openxmlformats.org/markup-compatibility/2006">
+            <mc:Choice xmlns:a14="http://schemas.microsoft.com/office/drawing/2010/main" Requires="a14">
+              <p:sp>
+                <p:nvSpPr>
+                  <p:cNvPr id="12" name="TextBox 11">
+                    <a:extLst>
+                      <a:ext uri="{FF2B5EF4-FFF2-40B4-BE49-F238E27FC236}">
+                        <a16:creationId xmlns:a16="http://schemas.microsoft.com/office/drawing/2014/main" id="{88D5C2BE-E25C-B1DE-2249-16E824207082}"/>
+                      </a:ext>
+                    </a:extLst>
+                  </p:cNvPr>
+                  <p:cNvSpPr txBox="1"/>
+                  <p:nvPr/>
+                </p:nvSpPr>
+                <p:spPr>
+                  <a:xfrm>
+                    <a:off x="2299836" y="545028"/>
+                    <a:ext cx="904415" cy="465577"/>
+                  </a:xfrm>
+                  <a:prstGeom prst="rect">
+                    <a:avLst/>
+                  </a:prstGeom>
+                  <a:noFill/>
+                </p:spPr>
+                <p:txBody>
+                  <a:bodyPr wrap="none" lIns="0" tIns="0" rIns="0" bIns="0" rtlCol="0">
+                    <a:spAutoFit/>
+                  </a:bodyPr>
+                  <a:lstStyle/>
+                  <a:p>
+                    <a:pPr/>
+                    <a14:m>
+                      <m:oMathPara xmlns:m="http://schemas.openxmlformats.org/officeDocument/2006/math">
+                        <m:oMathParaPr>
+                          <m:jc m:val="centerGroup"/>
+                        </m:oMathParaPr>
+                        <m:oMath xmlns:m="http://schemas.openxmlformats.org/officeDocument/2006/math">
+                          <m:sSub>
+                            <m:sSubPr>
+                              <m:ctrlPr>
+                                <a:rPr lang="en-US" sz="2800" i="1" smtClean="0">
+                                  <a:latin typeface="Cambria Math" panose="02040503050406030204" pitchFamily="18" charset="0"/>
+                                </a:rPr>
+                              </m:ctrlPr>
+                            </m:sSubPr>
+                            <m:e>
+                              <m:r>
+                                <a:rPr lang="en-US" sz="2800" b="0" i="1" smtClean="0">
+                                  <a:latin typeface="Cambria Math" panose="02040503050406030204" pitchFamily="18" charset="0"/>
+                                </a:rPr>
+                                <m:t>𝑘</m:t>
+                              </m:r>
+                            </m:e>
+                            <m:sub>
+                              <m:r>
+                                <a:rPr lang="en-US" sz="2800" b="0" i="1" smtClean="0">
+                                  <a:latin typeface="Cambria Math" panose="02040503050406030204" pitchFamily="18" charset="0"/>
+                                </a:rPr>
+                                <m:t>𝑚</m:t>
+                              </m:r>
+                              <m:r>
+                                <a:rPr lang="en-US" sz="2800" b="0" i="1" smtClean="0">
+                                  <a:latin typeface="Cambria Math" panose="02040503050406030204" pitchFamily="18" charset="0"/>
+                                </a:rPr>
+                                <m:t>,</m:t>
+                              </m:r>
+                              <m:r>
+                                <a:rPr lang="en-US" sz="2800" b="0" i="1" smtClean="0">
+                                  <a:latin typeface="Cambria Math" panose="02040503050406030204" pitchFamily="18" charset="0"/>
+                                </a:rPr>
+                                <m:t>𝑖</m:t>
+                              </m:r>
+                              <m:r>
+                                <a:rPr lang="en-US" sz="2800" b="0" i="1" smtClean="0">
+                                  <a:latin typeface="Cambria Math" panose="02040503050406030204" pitchFamily="18" charset="0"/>
+                                </a:rPr>
+                                <m:t>,</m:t>
+                              </m:r>
+                              <m:r>
+                                <a:rPr lang="en-US" sz="2800" b="0" i="1" smtClean="0">
+                                  <a:latin typeface="Cambria Math" panose="02040503050406030204" pitchFamily="18" charset="0"/>
+                                </a:rPr>
+                                <m:t>𝑗</m:t>
+                              </m:r>
+                            </m:sub>
+                          </m:sSub>
+                        </m:oMath>
+                      </m:oMathPara>
+                    </a14:m>
+                    <a:endParaRPr lang="en-US" sz="2800" dirty="0">
+                      <a:latin typeface="Helvetica" pitchFamily="2" charset="0"/>
+                    </a:endParaRPr>
+                  </a:p>
+                </p:txBody>
+              </p:sp>
+            </mc:Choice>
+            <mc:Fallback>
+              <p:sp>
+                <p:nvSpPr>
+                  <p:cNvPr id="12" name="TextBox 11">
+                    <a:extLst>
+                      <a:ext uri="{FF2B5EF4-FFF2-40B4-BE49-F238E27FC236}">
+                        <a16:creationId xmlns:a16="http://schemas.microsoft.com/office/drawing/2014/main" id="{88D5C2BE-E25C-B1DE-2249-16E824207082}"/>
+                      </a:ext>
+                    </a:extLst>
+                  </p:cNvPr>
+                  <p:cNvSpPr txBox="1">
+                    <a:spLocks noRot="1" noChangeAspect="1" noMove="1" noResize="1" noEditPoints="1" noAdjustHandles="1" noChangeArrowheads="1" noChangeShapeType="1" noTextEdit="1"/>
+                  </p:cNvSpPr>
+                  <p:nvPr/>
+                </p:nvSpPr>
+                <p:spPr>
+                  <a:xfrm>
+                    <a:off x="2299836" y="545028"/>
+                    <a:ext cx="904415" cy="465577"/>
+                  </a:xfrm>
+                  <a:prstGeom prst="rect">
+                    <a:avLst/>
+                  </a:prstGeom>
+                  <a:blipFill>
+                    <a:blip r:embed="rId8"/>
+                    <a:stretch>
+                      <a:fillRect l="-8219" r="-2740" b="-23684"/>
+                    </a:stretch>
+                  </a:blipFill>
+                </p:spPr>
+                <p:txBody>
+                  <a:bodyPr/>
+                  <a:lstStyle/>
+                  <a:p>
+                    <a:r>
+                      <a:rPr lang="en-US">
+                        <a:noFill/>
+                      </a:rPr>
+                      <a:t> </a:t>
+                    </a:r>
+                  </a:p>
+                </p:txBody>
+              </p:sp>
+            </mc:Fallback>
+          </mc:AlternateContent>
+          <mc:AlternateContent xmlns:mc="http://schemas.openxmlformats.org/markup-compatibility/2006">
+            <mc:Choice xmlns:a14="http://schemas.microsoft.com/office/drawing/2010/main" Requires="a14">
+              <p:sp>
+                <p:nvSpPr>
+                  <p:cNvPr id="13" name="TextBox 12">
+                    <a:extLst>
+                      <a:ext uri="{FF2B5EF4-FFF2-40B4-BE49-F238E27FC236}">
+                        <a16:creationId xmlns:a16="http://schemas.microsoft.com/office/drawing/2014/main" id="{922546F1-3080-87C5-3B20-F06B85DA15BC}"/>
+                      </a:ext>
+                    </a:extLst>
+                  </p:cNvPr>
+                  <p:cNvSpPr txBox="1"/>
+                  <p:nvPr/>
+                </p:nvSpPr>
+                <p:spPr>
+                  <a:xfrm>
+                    <a:off x="2299836" y="1256408"/>
+                    <a:ext cx="904415" cy="465577"/>
+                  </a:xfrm>
+                  <a:prstGeom prst="rect">
+                    <a:avLst/>
+                  </a:prstGeom>
+                  <a:noFill/>
+                </p:spPr>
+                <p:txBody>
+                  <a:bodyPr wrap="none" lIns="0" tIns="0" rIns="0" bIns="0" rtlCol="0">
+                    <a:spAutoFit/>
+                  </a:bodyPr>
+                  <a:lstStyle/>
+                  <a:p>
+                    <a:pPr/>
+                    <a14:m>
+                      <m:oMathPara xmlns:m="http://schemas.openxmlformats.org/officeDocument/2006/math">
+                        <m:oMathParaPr>
+                          <m:jc m:val="centerGroup"/>
+                        </m:oMathParaPr>
+                        <m:oMath xmlns:m="http://schemas.openxmlformats.org/officeDocument/2006/math">
+                          <m:sSub>
+                            <m:sSubPr>
+                              <m:ctrlPr>
+                                <a:rPr lang="en-US" sz="2800" i="1" smtClean="0">
+                                  <a:latin typeface="Cambria Math" panose="02040503050406030204" pitchFamily="18" charset="0"/>
+                                </a:rPr>
+                              </m:ctrlPr>
+                            </m:sSubPr>
+                            <m:e>
+                              <m:r>
+                                <a:rPr lang="en-US" sz="2800" b="0" i="1" smtClean="0">
+                                  <a:latin typeface="Cambria Math" panose="02040503050406030204" pitchFamily="18" charset="0"/>
+                                </a:rPr>
+                                <m:t>𝑘</m:t>
+                              </m:r>
+                            </m:e>
+                            <m:sub>
+                              <m:r>
+                                <a:rPr lang="en-US" sz="2800" b="0" i="1" smtClean="0">
+                                  <a:latin typeface="Cambria Math" panose="02040503050406030204" pitchFamily="18" charset="0"/>
+                                </a:rPr>
+                                <m:t>𝑚</m:t>
+                              </m:r>
+                              <m:r>
+                                <a:rPr lang="en-US" sz="2800" b="0" i="1" smtClean="0">
+                                  <a:latin typeface="Cambria Math" panose="02040503050406030204" pitchFamily="18" charset="0"/>
+                                </a:rPr>
+                                <m:t>,</m:t>
+                              </m:r>
+                              <m:r>
+                                <a:rPr lang="en-US" sz="2800" b="0" i="1" smtClean="0">
+                                  <a:latin typeface="Cambria Math" panose="02040503050406030204" pitchFamily="18" charset="0"/>
+                                </a:rPr>
+                                <m:t>𝑖</m:t>
+                              </m:r>
+                              <m:r>
+                                <a:rPr lang="en-US" sz="2800" b="0" i="1" smtClean="0">
+                                  <a:latin typeface="Cambria Math" panose="02040503050406030204" pitchFamily="18" charset="0"/>
+                                </a:rPr>
+                                <m:t>,</m:t>
+                              </m:r>
+                              <m:r>
+                                <a:rPr lang="en-US" sz="2800" b="0" i="1" smtClean="0">
+                                  <a:latin typeface="Cambria Math" panose="02040503050406030204" pitchFamily="18" charset="0"/>
+                                </a:rPr>
+                                <m:t>𝑗</m:t>
+                              </m:r>
+                            </m:sub>
+                          </m:sSub>
+                        </m:oMath>
+                      </m:oMathPara>
+                    </a14:m>
+                    <a:endParaRPr lang="en-US" sz="2800" dirty="0">
+                      <a:latin typeface="Helvetica" pitchFamily="2" charset="0"/>
+                    </a:endParaRPr>
+                  </a:p>
+                </p:txBody>
+              </p:sp>
+            </mc:Choice>
+            <mc:Fallback>
+              <p:sp>
+                <p:nvSpPr>
+                  <p:cNvPr id="13" name="TextBox 12">
+                    <a:extLst>
+                      <a:ext uri="{FF2B5EF4-FFF2-40B4-BE49-F238E27FC236}">
+                        <a16:creationId xmlns:a16="http://schemas.microsoft.com/office/drawing/2014/main" id="{922546F1-3080-87C5-3B20-F06B85DA15BC}"/>
+                      </a:ext>
+                    </a:extLst>
+                  </p:cNvPr>
+                  <p:cNvSpPr txBox="1">
+                    <a:spLocks noRot="1" noChangeAspect="1" noMove="1" noResize="1" noEditPoints="1" noAdjustHandles="1" noChangeArrowheads="1" noChangeShapeType="1" noTextEdit="1"/>
+                  </p:cNvSpPr>
+                  <p:nvPr/>
+                </p:nvSpPr>
+                <p:spPr>
+                  <a:xfrm>
+                    <a:off x="2299836" y="1256408"/>
+                    <a:ext cx="904415" cy="465577"/>
+                  </a:xfrm>
+                  <a:prstGeom prst="rect">
+                    <a:avLst/>
+                  </a:prstGeom>
+                  <a:blipFill>
+                    <a:blip r:embed="rId8"/>
+                    <a:stretch>
+                      <a:fillRect l="-8219" r="-2740" b="-23684"/>
+                    </a:stretch>
+                  </a:blipFill>
+                </p:spPr>
+                <p:txBody>
+                  <a:bodyPr/>
+                  <a:lstStyle/>
+                  <a:p>
+                    <a:r>
+                      <a:rPr lang="en-US">
+                        <a:noFill/>
+                      </a:rPr>
+                      <a:t> </a:t>
+                    </a:r>
+                  </a:p>
+                </p:txBody>
+              </p:sp>
+            </mc:Fallback>
+          </mc:AlternateContent>
+        </p:grpSp>
+        <p:grpSp>
+          <p:nvGrpSpPr>
+            <p:cNvPr id="30" name="Group 29">
+              <a:extLst>
+                <a:ext uri="{FF2B5EF4-FFF2-40B4-BE49-F238E27FC236}">
+                  <a16:creationId xmlns:a16="http://schemas.microsoft.com/office/drawing/2014/main" id="{ECCC5067-799C-6AEE-1760-733DFA834F4D}"/>
+                </a:ext>
+              </a:extLst>
+            </p:cNvPr>
+            <p:cNvGrpSpPr/>
+            <p:nvPr/>
+          </p:nvGrpSpPr>
+          <p:grpSpPr>
+            <a:xfrm>
+              <a:off x="9214579" y="983288"/>
+              <a:ext cx="842365" cy="1142267"/>
+              <a:chOff x="2223812" y="545028"/>
+              <a:chExt cx="842365" cy="1142267"/>
+            </a:xfrm>
+          </p:grpSpPr>
+          <p:cxnSp>
+            <p:nvCxnSpPr>
+              <p:cNvPr id="31" name="Straight Arrow Connector 30">
+                <a:extLst>
+                  <a:ext uri="{FF2B5EF4-FFF2-40B4-BE49-F238E27FC236}">
+                    <a16:creationId xmlns:a16="http://schemas.microsoft.com/office/drawing/2014/main" id="{8AE7AD40-5F0E-8380-4364-AD88175B84B1}"/>
+                  </a:ext>
+                </a:extLst>
+              </p:cNvPr>
+              <p:cNvCxnSpPr>
+                <a:cxnSpLocks noChangeAspect="1"/>
+              </p:cNvCxnSpPr>
+              <p:nvPr/>
+            </p:nvCxnSpPr>
+            <p:spPr>
+              <a:xfrm>
+                <a:off x="2223812" y="1063277"/>
+                <a:ext cx="731520" cy="0"/>
+              </a:xfrm>
+              <a:prstGeom prst="straightConnector1">
+                <a:avLst/>
+              </a:prstGeom>
+              <a:ln w="38100">
+                <a:solidFill>
+                  <a:schemeClr val="tx1"/>
+                </a:solidFill>
+                <a:tailEnd type="triangle"/>
+              </a:ln>
+            </p:spPr>
+            <p:style>
+              <a:lnRef idx="1">
+                <a:schemeClr val="accent1"/>
+              </a:lnRef>
+              <a:fillRef idx="0">
+                <a:schemeClr val="accent1"/>
+              </a:fillRef>
+              <a:effectRef idx="0">
+                <a:schemeClr val="accent1"/>
+              </a:effectRef>
+              <a:fontRef idx="minor">
+                <a:schemeClr val="tx1"/>
+              </a:fontRef>
+            </p:style>
+          </p:cxnSp>
+          <p:cxnSp>
+            <p:nvCxnSpPr>
+              <p:cNvPr id="32" name="Straight Arrow Connector 31">
+                <a:extLst>
+                  <a:ext uri="{FF2B5EF4-FFF2-40B4-BE49-F238E27FC236}">
+                    <a16:creationId xmlns:a16="http://schemas.microsoft.com/office/drawing/2014/main" id="{4BAAE407-EB0D-8C72-C4EE-74ABEE561DA6}"/>
+                  </a:ext>
+                </a:extLst>
+              </p:cNvPr>
+              <p:cNvCxnSpPr>
+                <a:cxnSpLocks noChangeAspect="1"/>
+              </p:cNvCxnSpPr>
+              <p:nvPr/>
+            </p:nvCxnSpPr>
+            <p:spPr>
+              <a:xfrm flipH="1">
+                <a:off x="2223812" y="1210712"/>
+                <a:ext cx="731520" cy="0"/>
+              </a:xfrm>
+              <a:prstGeom prst="straightConnector1">
+                <a:avLst/>
+              </a:prstGeom>
+              <a:ln w="38100">
+                <a:solidFill>
+                  <a:schemeClr val="tx1"/>
+                </a:solidFill>
+                <a:tailEnd type="triangle"/>
+              </a:ln>
+            </p:spPr>
+            <p:style>
+              <a:lnRef idx="1">
+                <a:schemeClr val="accent1"/>
+              </a:lnRef>
+              <a:fillRef idx="0">
+                <a:schemeClr val="accent1"/>
+              </a:fillRef>
+              <a:effectRef idx="0">
+                <a:schemeClr val="accent1"/>
+              </a:effectRef>
+              <a:fontRef idx="minor">
+                <a:schemeClr val="tx1"/>
+              </a:fontRef>
+            </p:style>
+          </p:cxnSp>
+          <mc:AlternateContent xmlns:mc="http://schemas.openxmlformats.org/markup-compatibility/2006" xmlns:a14="http://schemas.microsoft.com/office/drawing/2010/main">
+            <mc:Choice Requires="a14">
+              <p:sp>
+                <p:nvSpPr>
+                  <p:cNvPr id="33" name="TextBox 32">
+                    <a:extLst>
+                      <a:ext uri="{FF2B5EF4-FFF2-40B4-BE49-F238E27FC236}">
+                        <a16:creationId xmlns:a16="http://schemas.microsoft.com/office/drawing/2014/main" id="{9D020D2A-B07A-3694-1545-6AD214E30B80}"/>
+                      </a:ext>
+                    </a:extLst>
+                  </p:cNvPr>
+                  <p:cNvSpPr txBox="1"/>
+                  <p:nvPr/>
+                </p:nvSpPr>
+                <p:spPr>
+                  <a:xfrm>
+                    <a:off x="2375860" y="545028"/>
+                    <a:ext cx="690317" cy="430887"/>
+                  </a:xfrm>
+                  <a:prstGeom prst="rect">
+                    <a:avLst/>
+                  </a:prstGeom>
+                  <a:noFill/>
+                </p:spPr>
+                <p:txBody>
+                  <a:bodyPr wrap="none" lIns="0" tIns="0" rIns="0" bIns="0" rtlCol="0">
+                    <a:spAutoFit/>
+                  </a:bodyPr>
+                  <a:lstStyle/>
+                  <a:p>
+                    <a:pPr/>
+                    <a14:m>
+                      <m:oMathPara xmlns:m="http://schemas.openxmlformats.org/officeDocument/2006/math">
+                        <m:oMathParaPr>
+                          <m:jc m:val="centerGroup"/>
+                        </m:oMathParaPr>
+                        <m:oMath xmlns:m="http://schemas.openxmlformats.org/officeDocument/2006/math">
+                          <m:sSub>
+                            <m:sSubPr>
+                              <m:ctrlPr>
+                                <a:rPr lang="en-US" sz="2800" i="1" smtClean="0">
+                                  <a:latin typeface="Cambria Math" panose="02040503050406030204" pitchFamily="18" charset="0"/>
+                                </a:rPr>
+                              </m:ctrlPr>
+                            </m:sSubPr>
+                            <m:e>
+                              <m:r>
+                                <a:rPr lang="en-US" sz="2800" b="0" i="1" smtClean="0">
+                                  <a:latin typeface="Cambria Math" panose="02040503050406030204" pitchFamily="18" charset="0"/>
+                                </a:rPr>
+                                <m:t>𝑘</m:t>
+                              </m:r>
+                            </m:e>
+                            <m:sub>
+                              <m:r>
+                                <a:rPr lang="en-US" sz="2800" b="0" i="1" smtClean="0">
+                                  <a:latin typeface="Cambria Math" panose="02040503050406030204" pitchFamily="18" charset="0"/>
+                                </a:rPr>
+                                <m:t>𝑚𝑠</m:t>
+                              </m:r>
+                            </m:sub>
+                          </m:sSub>
+                        </m:oMath>
+                      </m:oMathPara>
+                    </a14:m>
+                    <a:endParaRPr lang="en-US" sz="2800" dirty="0">
+                      <a:latin typeface="Helvetica" pitchFamily="2" charset="0"/>
+                    </a:endParaRPr>
+                  </a:p>
+                </p:txBody>
+              </p:sp>
+            </mc:Choice>
+            <mc:Fallback xmlns="">
+              <p:sp>
+                <p:nvSpPr>
+                  <p:cNvPr id="86" name="TextBox 85">
+                    <a:extLst>
+                      <a:ext uri="{FF2B5EF4-FFF2-40B4-BE49-F238E27FC236}">
+                        <a16:creationId xmlns:a16="http://schemas.microsoft.com/office/drawing/2014/main" id="{9E5196EC-55F0-3E05-A08F-3CEDB07E488B}"/>
+                      </a:ext>
+                    </a:extLst>
+                  </p:cNvPr>
+                  <p:cNvSpPr txBox="1">
+                    <a:spLocks noRot="1" noChangeAspect="1" noMove="1" noResize="1" noEditPoints="1" noAdjustHandles="1" noChangeArrowheads="1" noChangeShapeType="1" noTextEdit="1"/>
+                  </p:cNvSpPr>
+                  <p:nvPr/>
+                </p:nvSpPr>
+                <p:spPr>
+                  <a:xfrm>
+                    <a:off x="2375860" y="545028"/>
+                    <a:ext cx="690317" cy="430887"/>
+                  </a:xfrm>
+                  <a:prstGeom prst="rect">
+                    <a:avLst/>
+                  </a:prstGeom>
+                  <a:blipFill>
+                    <a:blip r:embed="rId19"/>
+                    <a:stretch>
+                      <a:fillRect l="-10714" b="-8571"/>
+                    </a:stretch>
+                  </a:blipFill>
+                </p:spPr>
+                <p:txBody>
+                  <a:bodyPr/>
+                  <a:lstStyle/>
+                  <a:p>
+                    <a:r>
+                      <a:rPr lang="en-US">
+                        <a:noFill/>
+                      </a:rPr>
+                      <a:t> </a:t>
+                    </a:r>
+                  </a:p>
+                </p:txBody>
+              </p:sp>
+            </mc:Fallback>
+          </mc:AlternateContent>
+          <mc:AlternateContent xmlns:mc="http://schemas.openxmlformats.org/markup-compatibility/2006" xmlns:a14="http://schemas.microsoft.com/office/drawing/2010/main">
+            <mc:Choice Requires="a14">
+              <p:sp>
+                <p:nvSpPr>
+                  <p:cNvPr id="34" name="TextBox 33">
+                    <a:extLst>
+                      <a:ext uri="{FF2B5EF4-FFF2-40B4-BE49-F238E27FC236}">
+                        <a16:creationId xmlns:a16="http://schemas.microsoft.com/office/drawing/2014/main" id="{40317032-EC47-7B00-E674-59951113F1A1}"/>
+                      </a:ext>
+                    </a:extLst>
+                  </p:cNvPr>
+                  <p:cNvSpPr txBox="1"/>
+                  <p:nvPr/>
+                </p:nvSpPr>
+                <p:spPr>
+                  <a:xfrm>
+                    <a:off x="2375860" y="1256408"/>
+                    <a:ext cx="690317" cy="430887"/>
+                  </a:xfrm>
+                  <a:prstGeom prst="rect">
+                    <a:avLst/>
+                  </a:prstGeom>
+                  <a:noFill/>
+                </p:spPr>
+                <p:txBody>
+                  <a:bodyPr wrap="none" lIns="0" tIns="0" rIns="0" bIns="0" rtlCol="0">
+                    <a:spAutoFit/>
+                  </a:bodyPr>
+                  <a:lstStyle/>
+                  <a:p>
+                    <a:pPr/>
+                    <a14:m>
+                      <m:oMathPara xmlns:m="http://schemas.openxmlformats.org/officeDocument/2006/math">
+                        <m:oMathParaPr>
+                          <m:jc m:val="centerGroup"/>
+                        </m:oMathParaPr>
+                        <m:oMath xmlns:m="http://schemas.openxmlformats.org/officeDocument/2006/math">
+                          <m:sSub>
+                            <m:sSubPr>
+                              <m:ctrlPr>
+                                <a:rPr lang="en-US" sz="2800" i="1" smtClean="0">
+                                  <a:latin typeface="Cambria Math" panose="02040503050406030204" pitchFamily="18" charset="0"/>
+                                </a:rPr>
+                              </m:ctrlPr>
+                            </m:sSubPr>
+                            <m:e>
+                              <m:r>
+                                <a:rPr lang="en-US" sz="2800" b="0" i="1" smtClean="0">
+                                  <a:latin typeface="Cambria Math" panose="02040503050406030204" pitchFamily="18" charset="0"/>
+                                </a:rPr>
+                                <m:t>𝑘</m:t>
+                              </m:r>
+                            </m:e>
+                            <m:sub>
+                              <m:r>
+                                <a:rPr lang="en-US" sz="2800" b="0" i="1" smtClean="0">
+                                  <a:latin typeface="Cambria Math" panose="02040503050406030204" pitchFamily="18" charset="0"/>
+                                </a:rPr>
+                                <m:t>𝑚𝑠</m:t>
+                              </m:r>
+                            </m:sub>
+                          </m:sSub>
+                        </m:oMath>
+                      </m:oMathPara>
+                    </a14:m>
+                    <a:endParaRPr lang="en-US" sz="2800" dirty="0">
+                      <a:latin typeface="Helvetica" pitchFamily="2" charset="0"/>
+                    </a:endParaRPr>
+                  </a:p>
+                </p:txBody>
+              </p:sp>
+            </mc:Choice>
+            <mc:Fallback xmlns="">
+              <p:sp>
+                <p:nvSpPr>
+                  <p:cNvPr id="87" name="TextBox 86">
+                    <a:extLst>
+                      <a:ext uri="{FF2B5EF4-FFF2-40B4-BE49-F238E27FC236}">
+                        <a16:creationId xmlns:a16="http://schemas.microsoft.com/office/drawing/2014/main" id="{B271A065-0440-A7BE-0288-8EE2A7A9A0BA}"/>
+                      </a:ext>
+                    </a:extLst>
+                  </p:cNvPr>
+                  <p:cNvSpPr txBox="1">
+                    <a:spLocks noRot="1" noChangeAspect="1" noMove="1" noResize="1" noEditPoints="1" noAdjustHandles="1" noChangeArrowheads="1" noChangeShapeType="1" noTextEdit="1"/>
+                  </p:cNvSpPr>
+                  <p:nvPr/>
+                </p:nvSpPr>
+                <p:spPr>
+                  <a:xfrm>
+                    <a:off x="2375860" y="1256408"/>
+                    <a:ext cx="690317" cy="430887"/>
+                  </a:xfrm>
+                  <a:prstGeom prst="rect">
+                    <a:avLst/>
+                  </a:prstGeom>
+                  <a:blipFill>
+                    <a:blip r:embed="rId19"/>
+                    <a:stretch>
+                      <a:fillRect l="-10714" b="-8571"/>
+                    </a:stretch>
+                  </a:blipFill>
+                </p:spPr>
+                <p:txBody>
+                  <a:bodyPr/>
+                  <a:lstStyle/>
+                  <a:p>
+                    <a:r>
+                      <a:rPr lang="en-US">
+                        <a:noFill/>
+                      </a:rPr>
+                      <a:t> </a:t>
+                    </a:r>
+                  </a:p>
+                </p:txBody>
+              </p:sp>
+            </mc:Fallback>
+          </mc:AlternateContent>
+        </p:grpSp>
+        <p:cxnSp>
+          <p:nvCxnSpPr>
+            <p:cNvPr id="36" name="Straight Arrow Connector 35">
+              <a:extLst>
+                <a:ext uri="{FF2B5EF4-FFF2-40B4-BE49-F238E27FC236}">
+                  <a16:creationId xmlns:a16="http://schemas.microsoft.com/office/drawing/2014/main" id="{FE467411-C6E5-0CB5-C78F-3427CEA067F4}"/>
+                </a:ext>
+              </a:extLst>
+            </p:cNvPr>
+            <p:cNvCxnSpPr>
+              <a:cxnSpLocks/>
+            </p:cNvCxnSpPr>
+            <p:nvPr/>
+          </p:nvCxnSpPr>
+          <p:spPr>
+            <a:xfrm flipH="1">
+              <a:off x="5317067" y="1862667"/>
+              <a:ext cx="1075266" cy="1278466"/>
+            </a:xfrm>
+            <a:prstGeom prst="straightConnector1">
+              <a:avLst/>
+            </a:prstGeom>
+            <a:ln w="57150">
+              <a:solidFill>
+                <a:schemeClr val="tx1"/>
+              </a:solidFill>
+              <a:prstDash val="sysDot"/>
+              <a:tailEnd type="triangle"/>
+            </a:ln>
+          </p:spPr>
+          <p:style>
+            <a:lnRef idx="1">
+              <a:schemeClr val="accent1"/>
+            </a:lnRef>
+            <a:fillRef idx="0">
+              <a:schemeClr val="accent1"/>
+            </a:fillRef>
+            <a:effectRef idx="0">
+              <a:schemeClr val="accent1"/>
+            </a:effectRef>
+            <a:fontRef idx="minor">
+              <a:schemeClr val="tx1"/>
+            </a:fontRef>
+          </p:style>
+        </p:cxnSp>
+        <mc:AlternateContent xmlns:mc="http://schemas.openxmlformats.org/markup-compatibility/2006">
+          <mc:Choice xmlns:a14="http://schemas.microsoft.com/office/drawing/2010/main" Requires="a14">
+            <p:sp>
+              <p:nvSpPr>
+                <p:cNvPr id="39" name="TextBox 38">
+                  <a:extLst>
+                    <a:ext uri="{FF2B5EF4-FFF2-40B4-BE49-F238E27FC236}">
+                      <a16:creationId xmlns:a16="http://schemas.microsoft.com/office/drawing/2014/main" id="{5DBE9AF7-5CAD-9732-0442-F8D6085BD403}"/>
+                    </a:ext>
+                  </a:extLst>
+                </p:cNvPr>
+                <p:cNvSpPr txBox="1"/>
+                <p:nvPr/>
+              </p:nvSpPr>
+              <p:spPr>
+                <a:xfrm>
+                  <a:off x="1640773" y="2603422"/>
+                  <a:ext cx="890628" cy="430887"/>
+                </a:xfrm>
+                <a:prstGeom prst="rect">
+                  <a:avLst/>
+                </a:prstGeom>
+                <a:noFill/>
+              </p:spPr>
+              <p:txBody>
+                <a:bodyPr wrap="none" lIns="0" tIns="0" rIns="0" bIns="0" rtlCol="0">
+                  <a:spAutoFit/>
+                </a:bodyPr>
+                <a:lstStyle/>
+                <a:p>
+                  <a:pPr/>
+                  <a14:m>
+                    <m:oMathPara xmlns:m="http://schemas.openxmlformats.org/officeDocument/2006/math">
+                      <m:oMathParaPr>
+                        <m:jc m:val="centerGroup"/>
+                      </m:oMathParaPr>
+                      <m:oMath xmlns:m="http://schemas.openxmlformats.org/officeDocument/2006/math">
+                        <m:r>
+                          <a:rPr lang="en-US" sz="2800" i="1" smtClean="0">
+                            <a:latin typeface="Cambria Math" panose="02040503050406030204" pitchFamily="18" charset="0"/>
+                          </a:rPr>
+                          <m:t>𝑖</m:t>
+                        </m:r>
+                        <m:r>
+                          <a:rPr lang="en-US" sz="2800" b="0" i="1" smtClean="0">
+                            <a:latin typeface="Cambria Math" panose="02040503050406030204" pitchFamily="18" charset="0"/>
+                          </a:rPr>
+                          <m:t>=1</m:t>
+                        </m:r>
+                      </m:oMath>
+                    </m:oMathPara>
+                  </a14:m>
+                  <a:endParaRPr lang="en-US" sz="2800" dirty="0">
+                    <a:latin typeface="Helvetica" pitchFamily="2" charset="0"/>
+                  </a:endParaRPr>
+                </a:p>
+              </p:txBody>
+            </p:sp>
+          </mc:Choice>
+          <mc:Fallback>
+            <p:sp>
+              <p:nvSpPr>
+                <p:cNvPr id="39" name="TextBox 38">
+                  <a:extLst>
+                    <a:ext uri="{FF2B5EF4-FFF2-40B4-BE49-F238E27FC236}">
+                      <a16:creationId xmlns:a16="http://schemas.microsoft.com/office/drawing/2014/main" id="{5DBE9AF7-5CAD-9732-0442-F8D6085BD403}"/>
+                    </a:ext>
+                  </a:extLst>
+                </p:cNvPr>
+                <p:cNvSpPr txBox="1">
+                  <a:spLocks noRot="1" noChangeAspect="1" noMove="1" noResize="1" noEditPoints="1" noAdjustHandles="1" noChangeArrowheads="1" noChangeShapeType="1" noTextEdit="1"/>
+                </p:cNvSpPr>
+                <p:nvPr/>
+              </p:nvSpPr>
+              <p:spPr>
+                <a:xfrm>
+                  <a:off x="1640773" y="2603422"/>
+                  <a:ext cx="890628" cy="430887"/>
+                </a:xfrm>
+                <a:prstGeom prst="rect">
+                  <a:avLst/>
+                </a:prstGeom>
+                <a:blipFill>
+                  <a:blip r:embed="rId20"/>
+                  <a:stretch>
+                    <a:fillRect l="-7042" r="-7042" b="-2778"/>
+                  </a:stretch>
+                </a:blipFill>
+              </p:spPr>
+              <p:txBody>
+                <a:bodyPr/>
+                <a:lstStyle/>
+                <a:p>
+                  <a:r>
+                    <a:rPr lang="en-US">
+                      <a:noFill/>
+                    </a:rPr>
+                    <a:t> </a:t>
+                  </a:r>
+                </a:p>
+              </p:txBody>
+            </p:sp>
+          </mc:Fallback>
+        </mc:AlternateContent>
+        <mc:AlternateContent xmlns:mc="http://schemas.openxmlformats.org/markup-compatibility/2006">
+          <mc:Choice xmlns:a14="http://schemas.microsoft.com/office/drawing/2010/main" Requires="a14">
+            <p:sp>
+              <p:nvSpPr>
+                <p:cNvPr id="40" name="TextBox 39">
+                  <a:extLst>
+                    <a:ext uri="{FF2B5EF4-FFF2-40B4-BE49-F238E27FC236}">
+                      <a16:creationId xmlns:a16="http://schemas.microsoft.com/office/drawing/2014/main" id="{073FC5E2-0454-6D6D-E025-C9BAD111B477}"/>
+                    </a:ext>
+                  </a:extLst>
+                </p:cNvPr>
+                <p:cNvSpPr txBox="1"/>
+                <p:nvPr/>
+              </p:nvSpPr>
+              <p:spPr>
+                <a:xfrm>
+                  <a:off x="1640773" y="3620235"/>
+                  <a:ext cx="890628" cy="430887"/>
+                </a:xfrm>
+                <a:prstGeom prst="rect">
+                  <a:avLst/>
+                </a:prstGeom>
+                <a:noFill/>
+              </p:spPr>
+              <p:txBody>
+                <a:bodyPr wrap="none" lIns="0" tIns="0" rIns="0" bIns="0" rtlCol="0">
+                  <a:spAutoFit/>
+                </a:bodyPr>
+                <a:lstStyle/>
+                <a:p>
+                  <a:pPr/>
+                  <a14:m>
+                    <m:oMathPara xmlns:m="http://schemas.openxmlformats.org/officeDocument/2006/math">
+                      <m:oMathParaPr>
+                        <m:jc m:val="centerGroup"/>
+                      </m:oMathParaPr>
+                      <m:oMath xmlns:m="http://schemas.openxmlformats.org/officeDocument/2006/math">
+                        <m:r>
+                          <a:rPr lang="en-US" sz="2800" i="1" smtClean="0">
+                            <a:latin typeface="Cambria Math" panose="02040503050406030204" pitchFamily="18" charset="0"/>
+                          </a:rPr>
+                          <m:t>𝑖</m:t>
+                        </m:r>
+                        <m:r>
+                          <a:rPr lang="en-US" sz="2800" b="0" i="1" smtClean="0">
+                            <a:latin typeface="Cambria Math" panose="02040503050406030204" pitchFamily="18" charset="0"/>
+                          </a:rPr>
+                          <m:t>=2</m:t>
+                        </m:r>
+                      </m:oMath>
+                    </m:oMathPara>
+                  </a14:m>
+                  <a:endParaRPr lang="en-US" sz="2800" dirty="0">
+                    <a:latin typeface="Helvetica" pitchFamily="2" charset="0"/>
+                  </a:endParaRPr>
+                </a:p>
+              </p:txBody>
+            </p:sp>
+          </mc:Choice>
+          <mc:Fallback>
+            <p:sp>
+              <p:nvSpPr>
+                <p:cNvPr id="40" name="TextBox 39">
+                  <a:extLst>
+                    <a:ext uri="{FF2B5EF4-FFF2-40B4-BE49-F238E27FC236}">
+                      <a16:creationId xmlns:a16="http://schemas.microsoft.com/office/drawing/2014/main" id="{073FC5E2-0454-6D6D-E025-C9BAD111B477}"/>
+                    </a:ext>
+                  </a:extLst>
+                </p:cNvPr>
+                <p:cNvSpPr txBox="1">
+                  <a:spLocks noRot="1" noChangeAspect="1" noMove="1" noResize="1" noEditPoints="1" noAdjustHandles="1" noChangeArrowheads="1" noChangeShapeType="1" noTextEdit="1"/>
+                </p:cNvSpPr>
+                <p:nvPr/>
+              </p:nvSpPr>
+              <p:spPr>
+                <a:xfrm>
+                  <a:off x="1640773" y="3620235"/>
+                  <a:ext cx="890628" cy="430887"/>
+                </a:xfrm>
+                <a:prstGeom prst="rect">
+                  <a:avLst/>
+                </a:prstGeom>
+                <a:blipFill>
+                  <a:blip r:embed="rId21"/>
+                  <a:stretch>
+                    <a:fillRect l="-7042" r="-7042" b="-2857"/>
+                  </a:stretch>
+                </a:blipFill>
+              </p:spPr>
+              <p:txBody>
+                <a:bodyPr/>
+                <a:lstStyle/>
+                <a:p>
+                  <a:r>
+                    <a:rPr lang="en-US">
+                      <a:noFill/>
+                    </a:rPr>
+                    <a:t> </a:t>
+                  </a:r>
+                </a:p>
+              </p:txBody>
+            </p:sp>
+          </mc:Fallback>
+        </mc:AlternateContent>
+        <mc:AlternateContent xmlns:mc="http://schemas.openxmlformats.org/markup-compatibility/2006">
+          <mc:Choice xmlns:a14="http://schemas.microsoft.com/office/drawing/2010/main" Requires="a14">
+            <p:sp>
+              <p:nvSpPr>
+                <p:cNvPr id="41" name="TextBox 40">
+                  <a:extLst>
+                    <a:ext uri="{FF2B5EF4-FFF2-40B4-BE49-F238E27FC236}">
+                      <a16:creationId xmlns:a16="http://schemas.microsoft.com/office/drawing/2014/main" id="{A33F834D-02F5-E4F5-6FF2-EFC7BA3D286D}"/>
+                    </a:ext>
+                  </a:extLst>
+                </p:cNvPr>
+                <p:cNvSpPr txBox="1"/>
+                <p:nvPr/>
+              </p:nvSpPr>
+              <p:spPr>
+                <a:xfrm>
+                  <a:off x="1640773" y="5143422"/>
+                  <a:ext cx="890628" cy="430887"/>
+                </a:xfrm>
+                <a:prstGeom prst="rect">
+                  <a:avLst/>
+                </a:prstGeom>
+                <a:noFill/>
+              </p:spPr>
+              <p:txBody>
+                <a:bodyPr wrap="none" lIns="0" tIns="0" rIns="0" bIns="0" rtlCol="0">
+                  <a:spAutoFit/>
+                </a:bodyPr>
+                <a:lstStyle/>
+                <a:p>
+                  <a:pPr/>
+                  <a14:m>
+                    <m:oMathPara xmlns:m="http://schemas.openxmlformats.org/officeDocument/2006/math">
+                      <m:oMathParaPr>
+                        <m:jc m:val="centerGroup"/>
+                      </m:oMathParaPr>
+                      <m:oMath xmlns:m="http://schemas.openxmlformats.org/officeDocument/2006/math">
+                        <m:r>
+                          <a:rPr lang="en-US" sz="2800" i="1" smtClean="0">
+                            <a:latin typeface="Cambria Math" panose="02040503050406030204" pitchFamily="18" charset="0"/>
+                          </a:rPr>
+                          <m:t>𝑖</m:t>
+                        </m:r>
+                        <m:r>
+                          <a:rPr lang="en-US" sz="2800" b="0" i="1" smtClean="0">
+                            <a:latin typeface="Cambria Math" panose="02040503050406030204" pitchFamily="18" charset="0"/>
+                          </a:rPr>
+                          <m:t>=3</m:t>
+                        </m:r>
+                      </m:oMath>
+                    </m:oMathPara>
+                  </a14:m>
+                  <a:endParaRPr lang="en-US" sz="2800" dirty="0">
+                    <a:latin typeface="Helvetica" pitchFamily="2" charset="0"/>
+                  </a:endParaRPr>
+                </a:p>
+              </p:txBody>
+            </p:sp>
+          </mc:Choice>
+          <mc:Fallback>
+            <p:sp>
+              <p:nvSpPr>
+                <p:cNvPr id="41" name="TextBox 40">
+                  <a:extLst>
+                    <a:ext uri="{FF2B5EF4-FFF2-40B4-BE49-F238E27FC236}">
+                      <a16:creationId xmlns:a16="http://schemas.microsoft.com/office/drawing/2014/main" id="{A33F834D-02F5-E4F5-6FF2-EFC7BA3D286D}"/>
+                    </a:ext>
+                  </a:extLst>
+                </p:cNvPr>
+                <p:cNvSpPr txBox="1">
+                  <a:spLocks noRot="1" noChangeAspect="1" noMove="1" noResize="1" noEditPoints="1" noAdjustHandles="1" noChangeArrowheads="1" noChangeShapeType="1" noTextEdit="1"/>
+                </p:cNvSpPr>
+                <p:nvPr/>
+              </p:nvSpPr>
+              <p:spPr>
+                <a:xfrm>
+                  <a:off x="1640773" y="5143422"/>
+                  <a:ext cx="890628" cy="430887"/>
+                </a:xfrm>
+                <a:prstGeom prst="rect">
+                  <a:avLst/>
+                </a:prstGeom>
+                <a:blipFill>
+                  <a:blip r:embed="rId22"/>
+                  <a:stretch>
+                    <a:fillRect l="-7042" r="-7042" b="-5882"/>
+                  </a:stretch>
+                </a:blipFill>
+              </p:spPr>
+              <p:txBody>
+                <a:bodyPr/>
+                <a:lstStyle/>
+                <a:p>
+                  <a:r>
+                    <a:rPr lang="en-US">
+                      <a:noFill/>
+                    </a:rPr>
+                    <a:t> </a:t>
+                  </a:r>
+                </a:p>
+              </p:txBody>
+            </p:sp>
+          </mc:Fallback>
+        </mc:AlternateContent>
+        <mc:AlternateContent xmlns:mc="http://schemas.openxmlformats.org/markup-compatibility/2006">
+          <mc:Choice xmlns:a14="http://schemas.microsoft.com/office/drawing/2010/main" Requires="a14">
+            <p:sp>
+              <p:nvSpPr>
+                <p:cNvPr id="42" name="TextBox 41">
+                  <a:extLst>
+                    <a:ext uri="{FF2B5EF4-FFF2-40B4-BE49-F238E27FC236}">
+                      <a16:creationId xmlns:a16="http://schemas.microsoft.com/office/drawing/2014/main" id="{BA1234A0-51DF-0DFD-25DF-E1F95C2F6EFE}"/>
+                    </a:ext>
+                  </a:extLst>
+                </p:cNvPr>
+                <p:cNvSpPr txBox="1"/>
+                <p:nvPr/>
+              </p:nvSpPr>
+              <p:spPr>
+                <a:xfrm>
+                  <a:off x="3712743" y="5725030"/>
+                  <a:ext cx="901401" cy="430887"/>
+                </a:xfrm>
+                <a:prstGeom prst="rect">
+                  <a:avLst/>
+                </a:prstGeom>
+                <a:noFill/>
+              </p:spPr>
+              <p:txBody>
+                <a:bodyPr wrap="none" lIns="0" tIns="0" rIns="0" bIns="0" rtlCol="0">
+                  <a:spAutoFit/>
+                </a:bodyPr>
+                <a:lstStyle/>
+                <a:p>
+                  <a:pPr/>
+                  <a14:m>
+                    <m:oMathPara xmlns:m="http://schemas.openxmlformats.org/officeDocument/2006/math">
+                      <m:oMathParaPr>
+                        <m:jc m:val="centerGroup"/>
+                      </m:oMathParaPr>
+                      <m:oMath xmlns:m="http://schemas.openxmlformats.org/officeDocument/2006/math">
+                        <m:r>
+                          <a:rPr lang="en-US" sz="2800" b="0" i="1" smtClean="0">
+                            <a:latin typeface="Cambria Math" panose="02040503050406030204" pitchFamily="18" charset="0"/>
+                          </a:rPr>
+                          <m:t>𝑗</m:t>
+                        </m:r>
+                        <m:r>
+                          <a:rPr lang="en-US" sz="2800" b="0" i="1" smtClean="0">
+                            <a:latin typeface="Cambria Math" panose="02040503050406030204" pitchFamily="18" charset="0"/>
+                          </a:rPr>
+                          <m:t>=1</m:t>
+                        </m:r>
+                      </m:oMath>
+                    </m:oMathPara>
+                  </a14:m>
+                  <a:endParaRPr lang="en-US" sz="2800" dirty="0">
+                    <a:latin typeface="Helvetica" pitchFamily="2" charset="0"/>
+                  </a:endParaRPr>
+                </a:p>
+              </p:txBody>
+            </p:sp>
+          </mc:Choice>
+          <mc:Fallback>
+            <p:sp>
+              <p:nvSpPr>
+                <p:cNvPr id="42" name="TextBox 41">
+                  <a:extLst>
+                    <a:ext uri="{FF2B5EF4-FFF2-40B4-BE49-F238E27FC236}">
+                      <a16:creationId xmlns:a16="http://schemas.microsoft.com/office/drawing/2014/main" id="{BA1234A0-51DF-0DFD-25DF-E1F95C2F6EFE}"/>
+                    </a:ext>
+                  </a:extLst>
+                </p:cNvPr>
+                <p:cNvSpPr txBox="1">
+                  <a:spLocks noRot="1" noChangeAspect="1" noMove="1" noResize="1" noEditPoints="1" noAdjustHandles="1" noChangeArrowheads="1" noChangeShapeType="1" noTextEdit="1"/>
+                </p:cNvSpPr>
+                <p:nvPr/>
+              </p:nvSpPr>
+              <p:spPr>
+                <a:xfrm>
+                  <a:off x="3712743" y="5725030"/>
+                  <a:ext cx="901401" cy="430887"/>
+                </a:xfrm>
+                <a:prstGeom prst="rect">
+                  <a:avLst/>
+                </a:prstGeom>
+                <a:blipFill>
+                  <a:blip r:embed="rId23"/>
+                  <a:stretch>
+                    <a:fillRect l="-11111" r="-6944" b="-28571"/>
+                  </a:stretch>
+                </a:blipFill>
+              </p:spPr>
+              <p:txBody>
+                <a:bodyPr/>
+                <a:lstStyle/>
+                <a:p>
+                  <a:r>
+                    <a:rPr lang="en-US">
+                      <a:noFill/>
+                    </a:rPr>
+                    <a:t> </a:t>
+                  </a:r>
+                </a:p>
+              </p:txBody>
+            </p:sp>
+          </mc:Fallback>
+        </mc:AlternateContent>
+        <mc:AlternateContent xmlns:mc="http://schemas.openxmlformats.org/markup-compatibility/2006">
+          <mc:Choice xmlns:a14="http://schemas.microsoft.com/office/drawing/2010/main" Requires="a14">
+            <p:sp>
+              <p:nvSpPr>
+                <p:cNvPr id="44" name="TextBox 43">
+                  <a:extLst>
+                    <a:ext uri="{FF2B5EF4-FFF2-40B4-BE49-F238E27FC236}">
+                      <a16:creationId xmlns:a16="http://schemas.microsoft.com/office/drawing/2014/main" id="{90E2FC68-F42C-9C40-E948-B09CE95F699C}"/>
+                    </a:ext>
+                  </a:extLst>
+                </p:cNvPr>
+                <p:cNvSpPr txBox="1"/>
+                <p:nvPr/>
+              </p:nvSpPr>
+              <p:spPr>
+                <a:xfrm>
+                  <a:off x="6151270" y="5488075"/>
+                  <a:ext cx="901401" cy="430887"/>
+                </a:xfrm>
+                <a:prstGeom prst="rect">
+                  <a:avLst/>
+                </a:prstGeom>
+                <a:noFill/>
+              </p:spPr>
+              <p:txBody>
+                <a:bodyPr wrap="none" lIns="0" tIns="0" rIns="0" bIns="0" rtlCol="0">
+                  <a:spAutoFit/>
+                </a:bodyPr>
+                <a:lstStyle/>
+                <a:p>
+                  <a:pPr/>
+                  <a14:m>
+                    <m:oMathPara xmlns:m="http://schemas.openxmlformats.org/officeDocument/2006/math">
+                      <m:oMathParaPr>
+                        <m:jc m:val="centerGroup"/>
+                      </m:oMathParaPr>
+                      <m:oMath xmlns:m="http://schemas.openxmlformats.org/officeDocument/2006/math">
+                        <m:r>
+                          <a:rPr lang="en-US" sz="2800" b="0" i="1" smtClean="0">
+                            <a:latin typeface="Cambria Math" panose="02040503050406030204" pitchFamily="18" charset="0"/>
+                          </a:rPr>
+                          <m:t>𝑗</m:t>
+                        </m:r>
+                        <m:r>
+                          <a:rPr lang="en-US" sz="2800" b="0" i="1" smtClean="0">
+                            <a:latin typeface="Cambria Math" panose="02040503050406030204" pitchFamily="18" charset="0"/>
+                          </a:rPr>
+                          <m:t>=3</m:t>
+                        </m:r>
+                      </m:oMath>
+                    </m:oMathPara>
+                  </a14:m>
+                  <a:endParaRPr lang="en-US" sz="2800" dirty="0">
+                    <a:latin typeface="Helvetica" pitchFamily="2" charset="0"/>
+                  </a:endParaRPr>
+                </a:p>
+              </p:txBody>
+            </p:sp>
+          </mc:Choice>
+          <mc:Fallback>
+            <p:sp>
+              <p:nvSpPr>
+                <p:cNvPr id="44" name="TextBox 43">
+                  <a:extLst>
+                    <a:ext uri="{FF2B5EF4-FFF2-40B4-BE49-F238E27FC236}">
+                      <a16:creationId xmlns:a16="http://schemas.microsoft.com/office/drawing/2014/main" id="{90E2FC68-F42C-9C40-E948-B09CE95F699C}"/>
+                    </a:ext>
+                  </a:extLst>
+                </p:cNvPr>
+                <p:cNvSpPr txBox="1">
+                  <a:spLocks noRot="1" noChangeAspect="1" noMove="1" noResize="1" noEditPoints="1" noAdjustHandles="1" noChangeArrowheads="1" noChangeShapeType="1" noTextEdit="1"/>
+                </p:cNvSpPr>
+                <p:nvPr/>
+              </p:nvSpPr>
+              <p:spPr>
+                <a:xfrm>
+                  <a:off x="6151270" y="5488075"/>
+                  <a:ext cx="901401" cy="430887"/>
+                </a:xfrm>
+                <a:prstGeom prst="rect">
+                  <a:avLst/>
+                </a:prstGeom>
+                <a:blipFill>
+                  <a:blip r:embed="rId24"/>
+                  <a:stretch>
+                    <a:fillRect l="-11111" r="-6944" b="-28571"/>
+                  </a:stretch>
+                </a:blipFill>
+              </p:spPr>
+              <p:txBody>
+                <a:bodyPr/>
+                <a:lstStyle/>
+                <a:p>
+                  <a:r>
+                    <a:rPr lang="en-US">
+                      <a:noFill/>
+                    </a:rPr>
+                    <a:t> </a:t>
+                  </a:r>
+                </a:p>
+              </p:txBody>
+            </p:sp>
+          </mc:Fallback>
+        </mc:AlternateContent>
+        <mc:AlternateContent xmlns:mc="http://schemas.openxmlformats.org/markup-compatibility/2006">
+          <mc:Choice xmlns:a14="http://schemas.microsoft.com/office/drawing/2010/main" Requires="a14">
+            <p:sp>
+              <p:nvSpPr>
+                <p:cNvPr id="45" name="TextBox 44">
+                  <a:extLst>
+                    <a:ext uri="{FF2B5EF4-FFF2-40B4-BE49-F238E27FC236}">
+                      <a16:creationId xmlns:a16="http://schemas.microsoft.com/office/drawing/2014/main" id="{B6BCB32A-EF5B-BC34-CE3B-C92FD1E32D29}"/>
+                    </a:ext>
+                  </a:extLst>
+                </p:cNvPr>
+                <p:cNvSpPr txBox="1"/>
+                <p:nvPr/>
+              </p:nvSpPr>
+              <p:spPr>
+                <a:xfrm>
+                  <a:off x="4979294" y="5619046"/>
+                  <a:ext cx="901401" cy="430887"/>
+                </a:xfrm>
+                <a:prstGeom prst="rect">
+                  <a:avLst/>
+                </a:prstGeom>
+                <a:noFill/>
+              </p:spPr>
+              <p:txBody>
+                <a:bodyPr wrap="none" lIns="0" tIns="0" rIns="0" bIns="0" rtlCol="0">
+                  <a:spAutoFit/>
+                </a:bodyPr>
+                <a:lstStyle/>
+                <a:p>
+                  <a:pPr/>
+                  <a14:m>
+                    <m:oMathPara xmlns:m="http://schemas.openxmlformats.org/officeDocument/2006/math">
+                      <m:oMathParaPr>
+                        <m:jc m:val="centerGroup"/>
+                      </m:oMathParaPr>
+                      <m:oMath xmlns:m="http://schemas.openxmlformats.org/officeDocument/2006/math">
+                        <m:r>
+                          <a:rPr lang="en-US" sz="2800" b="0" i="1" smtClean="0">
+                            <a:latin typeface="Cambria Math" panose="02040503050406030204" pitchFamily="18" charset="0"/>
+                          </a:rPr>
+                          <m:t>𝑗</m:t>
+                        </m:r>
+                        <m:r>
+                          <a:rPr lang="en-US" sz="2800" b="0" i="1" smtClean="0">
+                            <a:latin typeface="Cambria Math" panose="02040503050406030204" pitchFamily="18" charset="0"/>
+                          </a:rPr>
+                          <m:t>=2</m:t>
+                        </m:r>
+                      </m:oMath>
+                    </m:oMathPara>
+                  </a14:m>
+                  <a:endParaRPr lang="en-US" sz="2800" dirty="0">
+                    <a:latin typeface="Helvetica" pitchFamily="2" charset="0"/>
+                  </a:endParaRPr>
+                </a:p>
+              </p:txBody>
+            </p:sp>
+          </mc:Choice>
+          <mc:Fallback>
+            <p:sp>
+              <p:nvSpPr>
+                <p:cNvPr id="45" name="TextBox 44">
+                  <a:extLst>
+                    <a:ext uri="{FF2B5EF4-FFF2-40B4-BE49-F238E27FC236}">
+                      <a16:creationId xmlns:a16="http://schemas.microsoft.com/office/drawing/2014/main" id="{B6BCB32A-EF5B-BC34-CE3B-C92FD1E32D29}"/>
+                    </a:ext>
+                  </a:extLst>
+                </p:cNvPr>
+                <p:cNvSpPr txBox="1">
+                  <a:spLocks noRot="1" noChangeAspect="1" noMove="1" noResize="1" noEditPoints="1" noAdjustHandles="1" noChangeArrowheads="1" noChangeShapeType="1" noTextEdit="1"/>
+                </p:cNvSpPr>
+                <p:nvPr/>
+              </p:nvSpPr>
+              <p:spPr>
+                <a:xfrm>
+                  <a:off x="4979294" y="5619046"/>
+                  <a:ext cx="901401" cy="430887"/>
+                </a:xfrm>
+                <a:prstGeom prst="rect">
+                  <a:avLst/>
+                </a:prstGeom>
+                <a:blipFill>
+                  <a:blip r:embed="rId25"/>
+                  <a:stretch>
+                    <a:fillRect l="-11111" r="-6944" b="-28571"/>
+                  </a:stretch>
+                </a:blipFill>
+              </p:spPr>
+              <p:txBody>
+                <a:bodyPr/>
+                <a:lstStyle/>
+                <a:p>
+                  <a:r>
+                    <a:rPr lang="en-US">
+                      <a:noFill/>
+                    </a:rPr>
+                    <a:t> </a:t>
+                  </a:r>
+                </a:p>
+              </p:txBody>
+            </p:sp>
+          </mc:Fallback>
+        </mc:AlternateContent>
+        <mc:AlternateContent xmlns:mc="http://schemas.openxmlformats.org/markup-compatibility/2006">
+          <mc:Choice xmlns:a14="http://schemas.microsoft.com/office/drawing/2010/main" Requires="a14">
+            <p:sp>
+              <p:nvSpPr>
+                <p:cNvPr id="46" name="TextBox 45">
+                  <a:extLst>
+                    <a:ext uri="{FF2B5EF4-FFF2-40B4-BE49-F238E27FC236}">
+                      <a16:creationId xmlns:a16="http://schemas.microsoft.com/office/drawing/2014/main" id="{A861C131-556A-6A68-94D2-8EDD332464AD}"/>
+                    </a:ext>
+                  </a:extLst>
+                </p:cNvPr>
+                <p:cNvSpPr txBox="1"/>
+                <p:nvPr/>
+              </p:nvSpPr>
+              <p:spPr>
+                <a:xfrm>
+                  <a:off x="7236574" y="5357479"/>
+                  <a:ext cx="901401" cy="430887"/>
+                </a:xfrm>
+                <a:prstGeom prst="rect">
+                  <a:avLst/>
+                </a:prstGeom>
+                <a:noFill/>
+              </p:spPr>
+              <p:txBody>
+                <a:bodyPr wrap="none" lIns="0" tIns="0" rIns="0" bIns="0" rtlCol="0">
+                  <a:spAutoFit/>
+                </a:bodyPr>
+                <a:lstStyle/>
+                <a:p>
+                  <a:pPr/>
+                  <a14:m>
+                    <m:oMathPara xmlns:m="http://schemas.openxmlformats.org/officeDocument/2006/math">
+                      <m:oMathParaPr>
+                        <m:jc m:val="centerGroup"/>
+                      </m:oMathParaPr>
+                      <m:oMath xmlns:m="http://schemas.openxmlformats.org/officeDocument/2006/math">
+                        <m:r>
+                          <a:rPr lang="en-US" sz="2800" b="0" i="1" smtClean="0">
+                            <a:latin typeface="Cambria Math" panose="02040503050406030204" pitchFamily="18" charset="0"/>
+                          </a:rPr>
+                          <m:t>𝑗</m:t>
+                        </m:r>
+                        <m:r>
+                          <a:rPr lang="en-US" sz="2800" b="0" i="1" smtClean="0">
+                            <a:latin typeface="Cambria Math" panose="02040503050406030204" pitchFamily="18" charset="0"/>
+                          </a:rPr>
+                          <m:t>=4</m:t>
+                        </m:r>
+                      </m:oMath>
+                    </m:oMathPara>
+                  </a14:m>
+                  <a:endParaRPr lang="en-US" sz="2800" dirty="0">
+                    <a:latin typeface="Helvetica" pitchFamily="2" charset="0"/>
+                  </a:endParaRPr>
+                </a:p>
+              </p:txBody>
+            </p:sp>
+          </mc:Choice>
+          <mc:Fallback>
+            <p:sp>
+              <p:nvSpPr>
+                <p:cNvPr id="46" name="TextBox 45">
+                  <a:extLst>
+                    <a:ext uri="{FF2B5EF4-FFF2-40B4-BE49-F238E27FC236}">
+                      <a16:creationId xmlns:a16="http://schemas.microsoft.com/office/drawing/2014/main" id="{A861C131-556A-6A68-94D2-8EDD332464AD}"/>
+                    </a:ext>
+                  </a:extLst>
+                </p:cNvPr>
+                <p:cNvSpPr txBox="1">
+                  <a:spLocks noRot="1" noChangeAspect="1" noMove="1" noResize="1" noEditPoints="1" noAdjustHandles="1" noChangeArrowheads="1" noChangeShapeType="1" noTextEdit="1"/>
+                </p:cNvSpPr>
+                <p:nvPr/>
+              </p:nvSpPr>
+              <p:spPr>
+                <a:xfrm>
+                  <a:off x="7236574" y="5357479"/>
+                  <a:ext cx="901401" cy="430887"/>
+                </a:xfrm>
+                <a:prstGeom prst="rect">
+                  <a:avLst/>
+                </a:prstGeom>
+                <a:blipFill>
+                  <a:blip r:embed="rId26"/>
+                  <a:stretch>
+                    <a:fillRect l="-11111" r="-8333" b="-27778"/>
+                  </a:stretch>
+                </a:blipFill>
+              </p:spPr>
+              <p:txBody>
+                <a:bodyPr/>
+                <a:lstStyle/>
+                <a:p>
+                  <a:r>
+                    <a:rPr lang="en-US">
+                      <a:noFill/>
+                    </a:rPr>
+                    <a:t> </a:t>
+                  </a:r>
+                </a:p>
+              </p:txBody>
+            </p:sp>
+          </mc:Fallback>
+        </mc:AlternateContent>
+        <mc:AlternateContent xmlns:mc="http://schemas.openxmlformats.org/markup-compatibility/2006">
+          <mc:Choice xmlns:a14="http://schemas.microsoft.com/office/drawing/2010/main" Requires="a14">
+            <p:sp>
+              <p:nvSpPr>
+                <p:cNvPr id="47" name="TextBox 46">
+                  <a:extLst>
+                    <a:ext uri="{FF2B5EF4-FFF2-40B4-BE49-F238E27FC236}">
+                      <a16:creationId xmlns:a16="http://schemas.microsoft.com/office/drawing/2014/main" id="{9F7B7F51-0B8F-FAEC-24F2-EF17FD154B03}"/>
+                    </a:ext>
+                  </a:extLst>
+                </p:cNvPr>
+                <p:cNvSpPr txBox="1"/>
+                <p:nvPr/>
+              </p:nvSpPr>
+              <p:spPr>
+                <a:xfrm>
+                  <a:off x="8346690" y="5235112"/>
+                  <a:ext cx="901401" cy="430887"/>
+                </a:xfrm>
+                <a:prstGeom prst="rect">
+                  <a:avLst/>
+                </a:prstGeom>
+                <a:noFill/>
+              </p:spPr>
+              <p:txBody>
+                <a:bodyPr wrap="none" lIns="0" tIns="0" rIns="0" bIns="0" rtlCol="0">
+                  <a:spAutoFit/>
+                </a:bodyPr>
+                <a:lstStyle/>
+                <a:p>
+                  <a:pPr/>
+                  <a14:m>
+                    <m:oMathPara xmlns:m="http://schemas.openxmlformats.org/officeDocument/2006/math">
+                      <m:oMathParaPr>
+                        <m:jc m:val="centerGroup"/>
+                      </m:oMathParaPr>
+                      <m:oMath xmlns:m="http://schemas.openxmlformats.org/officeDocument/2006/math">
+                        <m:r>
+                          <a:rPr lang="en-US" sz="2800" b="0" i="1" smtClean="0">
+                            <a:latin typeface="Cambria Math" panose="02040503050406030204" pitchFamily="18" charset="0"/>
+                          </a:rPr>
+                          <m:t>𝑗</m:t>
+                        </m:r>
+                        <m:r>
+                          <a:rPr lang="en-US" sz="2800" b="0" i="1" smtClean="0">
+                            <a:latin typeface="Cambria Math" panose="02040503050406030204" pitchFamily="18" charset="0"/>
+                          </a:rPr>
+                          <m:t>=5</m:t>
+                        </m:r>
+                      </m:oMath>
+                    </m:oMathPara>
+                  </a14:m>
+                  <a:endParaRPr lang="en-US" sz="2800" dirty="0">
+                    <a:latin typeface="Helvetica" pitchFamily="2" charset="0"/>
+                  </a:endParaRPr>
+                </a:p>
+              </p:txBody>
+            </p:sp>
+          </mc:Choice>
+          <mc:Fallback>
+            <p:sp>
+              <p:nvSpPr>
+                <p:cNvPr id="47" name="TextBox 46">
+                  <a:extLst>
+                    <a:ext uri="{FF2B5EF4-FFF2-40B4-BE49-F238E27FC236}">
+                      <a16:creationId xmlns:a16="http://schemas.microsoft.com/office/drawing/2014/main" id="{9F7B7F51-0B8F-FAEC-24F2-EF17FD154B03}"/>
+                    </a:ext>
+                  </a:extLst>
+                </p:cNvPr>
+                <p:cNvSpPr txBox="1">
+                  <a:spLocks noRot="1" noChangeAspect="1" noMove="1" noResize="1" noEditPoints="1" noAdjustHandles="1" noChangeArrowheads="1" noChangeShapeType="1" noTextEdit="1"/>
+                </p:cNvSpPr>
+                <p:nvPr/>
+              </p:nvSpPr>
+              <p:spPr>
+                <a:xfrm>
+                  <a:off x="8346690" y="5235112"/>
+                  <a:ext cx="901401" cy="430887"/>
+                </a:xfrm>
+                <a:prstGeom prst="rect">
+                  <a:avLst/>
+                </a:prstGeom>
+                <a:blipFill>
+                  <a:blip r:embed="rId27"/>
+                  <a:stretch>
+                    <a:fillRect l="-12500" r="-8333" b="-32353"/>
+                  </a:stretch>
+                </a:blipFill>
+              </p:spPr>
+              <p:txBody>
+                <a:bodyPr/>
+                <a:lstStyle/>
+                <a:p>
+                  <a:r>
+                    <a:rPr lang="en-US">
+                      <a:noFill/>
+                    </a:rPr>
+                    <a:t> </a:t>
+                  </a:r>
+                </a:p>
+              </p:txBody>
+            </p:sp>
+          </mc:Fallback>
+        </mc:AlternateContent>
+        <p:grpSp>
+          <p:nvGrpSpPr>
+            <p:cNvPr id="51" name="Group 50">
+              <a:extLst>
+                <a:ext uri="{FF2B5EF4-FFF2-40B4-BE49-F238E27FC236}">
+                  <a16:creationId xmlns:a16="http://schemas.microsoft.com/office/drawing/2014/main" id="{50487391-4BB2-3303-30EB-5846D6B2C177}"/>
+                </a:ext>
+              </a:extLst>
+            </p:cNvPr>
+            <p:cNvGrpSpPr/>
+            <p:nvPr/>
+          </p:nvGrpSpPr>
+          <p:grpSpPr>
+            <a:xfrm>
+              <a:off x="2870200" y="3996203"/>
+              <a:ext cx="733494" cy="491208"/>
+              <a:chOff x="2791054" y="4102026"/>
+              <a:chExt cx="733494" cy="491208"/>
+            </a:xfrm>
+          </p:grpSpPr>
+          <mc:AlternateContent xmlns:mc="http://schemas.openxmlformats.org/markup-compatibility/2006">
+            <mc:Choice xmlns:a14="http://schemas.microsoft.com/office/drawing/2010/main" Requires="a14">
+              <p:sp>
+                <p:nvSpPr>
+                  <p:cNvPr id="54" name="TextBox 53">
+                    <a:extLst>
+                      <a:ext uri="{FF2B5EF4-FFF2-40B4-BE49-F238E27FC236}">
+                        <a16:creationId xmlns:a16="http://schemas.microsoft.com/office/drawing/2014/main" id="{A2A37FE0-F112-A216-E98E-ECD5DD44CBEE}"/>
+                      </a:ext>
+                    </a:extLst>
+                  </p:cNvPr>
+                  <p:cNvSpPr txBox="1"/>
+                  <p:nvPr/>
+                </p:nvSpPr>
+                <p:spPr>
+                  <a:xfrm>
+                    <a:off x="2847953" y="4162347"/>
+                    <a:ext cx="676595" cy="430887"/>
+                  </a:xfrm>
+                  <a:prstGeom prst="rect">
+                    <a:avLst/>
+                  </a:prstGeom>
+                  <a:noFill/>
+                </p:spPr>
+                <p:txBody>
+                  <a:bodyPr wrap="none" lIns="0" tIns="0" rIns="0" bIns="0" rtlCol="0">
+                    <a:spAutoFit/>
+                  </a:bodyPr>
+                  <a:lstStyle/>
+                  <a:p>
+                    <a:pPr/>
+                    <a14:m>
+                      <m:oMathPara xmlns:m="http://schemas.openxmlformats.org/officeDocument/2006/math">
+                        <m:oMathParaPr>
+                          <m:jc m:val="centerGroup"/>
+                        </m:oMathParaPr>
+                        <m:oMath xmlns:m="http://schemas.openxmlformats.org/officeDocument/2006/math">
+                          <m:sSub>
+                            <m:sSubPr>
+                              <m:ctrlPr>
+                                <a:rPr lang="en-US" sz="2800" b="0" i="1" smtClean="0">
+                                  <a:latin typeface="Cambria Math" panose="02040503050406030204" pitchFamily="18" charset="0"/>
+                                </a:rPr>
+                              </m:ctrlPr>
+                            </m:sSubPr>
+                            <m:e>
+                              <m:r>
+                                <a:rPr lang="en-US" sz="2800" i="1" smtClean="0">
+                                  <a:latin typeface="Cambria Math" panose="02040503050406030204" pitchFamily="18" charset="0"/>
+                                </a:rPr>
+                                <m:t>𝜆</m:t>
+                              </m:r>
+                            </m:e>
+                            <m:sub>
+                              <m:r>
+                                <a:rPr lang="en-US" sz="2800" b="0" i="1" smtClean="0">
+                                  <a:latin typeface="Cambria Math" panose="02040503050406030204" pitchFamily="18" charset="0"/>
+                                </a:rPr>
+                                <m:t>𝑠𝑚</m:t>
+                              </m:r>
+                            </m:sub>
+                          </m:sSub>
+                        </m:oMath>
+                      </m:oMathPara>
+                    </a14:m>
+                    <a:endParaRPr lang="en-US" sz="2800" dirty="0">
+                      <a:latin typeface="Helvetica" pitchFamily="2" charset="0"/>
+                    </a:endParaRPr>
+                  </a:p>
+                </p:txBody>
+              </p:sp>
+            </mc:Choice>
+            <mc:Fallback>
+              <p:sp>
+                <p:nvSpPr>
+                  <p:cNvPr id="54" name="TextBox 53">
+                    <a:extLst>
+                      <a:ext uri="{FF2B5EF4-FFF2-40B4-BE49-F238E27FC236}">
+                        <a16:creationId xmlns:a16="http://schemas.microsoft.com/office/drawing/2014/main" id="{A2A37FE0-F112-A216-E98E-ECD5DD44CBEE}"/>
+                      </a:ext>
+                    </a:extLst>
+                  </p:cNvPr>
+                  <p:cNvSpPr txBox="1">
+                    <a:spLocks noRot="1" noChangeAspect="1" noMove="1" noResize="1" noEditPoints="1" noAdjustHandles="1" noChangeArrowheads="1" noChangeShapeType="1" noTextEdit="1"/>
+                  </p:cNvSpPr>
+                  <p:nvPr/>
+                </p:nvSpPr>
+                <p:spPr>
+                  <a:xfrm>
+                    <a:off x="2847953" y="4162347"/>
+                    <a:ext cx="676595" cy="430887"/>
+                  </a:xfrm>
+                  <a:prstGeom prst="rect">
+                    <a:avLst/>
+                  </a:prstGeom>
+                  <a:blipFill>
+                    <a:blip r:embed="rId28"/>
+                    <a:stretch>
+                      <a:fillRect l="-11111" b="-8571"/>
+                    </a:stretch>
+                  </a:blipFill>
+                </p:spPr>
+                <p:txBody>
+                  <a:bodyPr/>
+                  <a:lstStyle/>
+                  <a:p>
+                    <a:r>
+                      <a:rPr lang="en-US">
+                        <a:noFill/>
+                      </a:rPr>
+                      <a:t> </a:t>
+                    </a:r>
+                  </a:p>
+                </p:txBody>
+              </p:sp>
+            </mc:Fallback>
+          </mc:AlternateContent>
+          <p:cxnSp>
+            <p:nvCxnSpPr>
+              <p:cNvPr id="55" name="Straight Arrow Connector 54">
+                <a:extLst>
+                  <a:ext uri="{FF2B5EF4-FFF2-40B4-BE49-F238E27FC236}">
+                    <a16:creationId xmlns:a16="http://schemas.microsoft.com/office/drawing/2014/main" id="{39970C48-AFF6-0D3B-C82C-B5CFE5E5AD7C}"/>
+                  </a:ext>
+                </a:extLst>
+              </p:cNvPr>
+              <p:cNvCxnSpPr>
+                <a:cxnSpLocks/>
+              </p:cNvCxnSpPr>
+              <p:nvPr/>
+            </p:nvCxnSpPr>
+            <p:spPr>
+              <a:xfrm flipV="1">
+                <a:off x="2791054" y="4102026"/>
+                <a:ext cx="677333" cy="54919"/>
+              </a:xfrm>
+              <a:prstGeom prst="straightConnector1">
+                <a:avLst/>
+              </a:prstGeom>
+              <a:ln w="38100">
+                <a:solidFill>
+                  <a:schemeClr val="tx1"/>
+                </a:solidFill>
+                <a:prstDash val="sysDot"/>
+                <a:headEnd type="triangle"/>
+                <a:tailEnd type="triangle"/>
+              </a:ln>
+            </p:spPr>
+            <p:style>
+              <a:lnRef idx="1">
+                <a:schemeClr val="accent1"/>
+              </a:lnRef>
+              <a:fillRef idx="0">
+                <a:schemeClr val="accent1"/>
+              </a:fillRef>
+              <a:effectRef idx="0">
+                <a:schemeClr val="accent1"/>
+              </a:effectRef>
+              <a:fontRef idx="minor">
+                <a:schemeClr val="tx1"/>
+              </a:fontRef>
+            </p:style>
+          </p:cxnSp>
+        </p:grpSp>
+        <mc:AlternateContent xmlns:mc="http://schemas.openxmlformats.org/markup-compatibility/2006">
+          <mc:Choice xmlns:a14="http://schemas.microsoft.com/office/drawing/2010/main" Requires="a14">
+            <p:sp>
+              <p:nvSpPr>
+                <p:cNvPr id="59" name="TextBox 58">
+                  <a:extLst>
+                    <a:ext uri="{FF2B5EF4-FFF2-40B4-BE49-F238E27FC236}">
+                      <a16:creationId xmlns:a16="http://schemas.microsoft.com/office/drawing/2014/main" id="{98011D14-F175-1A70-D42F-2F26BE2224D7}"/>
+                    </a:ext>
+                  </a:extLst>
+                </p:cNvPr>
+                <p:cNvSpPr txBox="1"/>
+                <p:nvPr/>
+              </p:nvSpPr>
+              <p:spPr>
+                <a:xfrm>
+                  <a:off x="4956786" y="3927336"/>
+                  <a:ext cx="891591" cy="465577"/>
+                </a:xfrm>
+                <a:prstGeom prst="rect">
+                  <a:avLst/>
+                </a:prstGeom>
+                <a:noFill/>
+              </p:spPr>
+              <p:txBody>
+                <a:bodyPr wrap="none" lIns="0" tIns="0" rIns="0" bIns="0" rtlCol="0">
+                  <a:spAutoFit/>
+                </a:bodyPr>
+                <a:lstStyle/>
+                <a:p>
+                  <a:pPr/>
+                  <a14:m>
+                    <m:oMathPara xmlns:m="http://schemas.openxmlformats.org/officeDocument/2006/math">
+                      <m:oMathParaPr>
+                        <m:jc m:val="centerGroup"/>
+                      </m:oMathParaPr>
+                      <m:oMath xmlns:m="http://schemas.openxmlformats.org/officeDocument/2006/math">
+                        <m:sSub>
+                          <m:sSubPr>
+                            <m:ctrlPr>
+                              <a:rPr lang="en-US" sz="2800" b="0" i="1" smtClean="0">
+                                <a:latin typeface="Cambria Math" panose="02040503050406030204" pitchFamily="18" charset="0"/>
+                              </a:rPr>
+                            </m:ctrlPr>
+                          </m:sSubPr>
+                          <m:e>
+                            <m:r>
+                              <a:rPr lang="en-US" sz="2800" i="1" smtClean="0">
+                                <a:latin typeface="Cambria Math" panose="02040503050406030204" pitchFamily="18" charset="0"/>
+                              </a:rPr>
+                              <m:t>𝜆</m:t>
+                            </m:r>
+                          </m:e>
+                          <m:sub>
+                            <m:r>
+                              <a:rPr lang="en-US" sz="2800" b="0" i="1" smtClean="0">
+                                <a:latin typeface="Cambria Math" panose="02040503050406030204" pitchFamily="18" charset="0"/>
+                              </a:rPr>
+                              <m:t>𝑚</m:t>
+                            </m:r>
+                            <m:r>
+                              <a:rPr lang="en-US" sz="2800" b="0" i="1" smtClean="0">
+                                <a:latin typeface="Cambria Math" panose="02040503050406030204" pitchFamily="18" charset="0"/>
+                              </a:rPr>
+                              <m:t>,</m:t>
+                            </m:r>
+                            <m:r>
+                              <a:rPr lang="en-US" sz="2800" b="0" i="1" smtClean="0">
+                                <a:latin typeface="Cambria Math" panose="02040503050406030204" pitchFamily="18" charset="0"/>
+                              </a:rPr>
+                              <m:t>𝑖</m:t>
+                            </m:r>
+                            <m:r>
+                              <a:rPr lang="en-US" sz="2800" b="0" i="1" smtClean="0">
+                                <a:latin typeface="Cambria Math" panose="02040503050406030204" pitchFamily="18" charset="0"/>
+                              </a:rPr>
+                              <m:t>,</m:t>
+                            </m:r>
+                            <m:r>
+                              <a:rPr lang="en-US" sz="2800" b="0" i="1" smtClean="0">
+                                <a:latin typeface="Cambria Math" panose="02040503050406030204" pitchFamily="18" charset="0"/>
+                              </a:rPr>
+                              <m:t>𝑗</m:t>
+                            </m:r>
+                          </m:sub>
+                        </m:sSub>
+                      </m:oMath>
+                    </m:oMathPara>
+                  </a14:m>
+                  <a:endParaRPr lang="en-US" sz="2800" dirty="0">
+                    <a:latin typeface="Helvetica" pitchFamily="2" charset="0"/>
+                  </a:endParaRPr>
+                </a:p>
+              </p:txBody>
+            </p:sp>
+          </mc:Choice>
+          <mc:Fallback>
+            <p:sp>
+              <p:nvSpPr>
+                <p:cNvPr id="59" name="TextBox 58">
+                  <a:extLst>
+                    <a:ext uri="{FF2B5EF4-FFF2-40B4-BE49-F238E27FC236}">
+                      <a16:creationId xmlns:a16="http://schemas.microsoft.com/office/drawing/2014/main" id="{98011D14-F175-1A70-D42F-2F26BE2224D7}"/>
+                    </a:ext>
+                  </a:extLst>
+                </p:cNvPr>
+                <p:cNvSpPr txBox="1">
+                  <a:spLocks noRot="1" noChangeAspect="1" noMove="1" noResize="1" noEditPoints="1" noAdjustHandles="1" noChangeArrowheads="1" noChangeShapeType="1" noTextEdit="1"/>
+                </p:cNvSpPr>
+                <p:nvPr/>
+              </p:nvSpPr>
+              <p:spPr>
+                <a:xfrm>
+                  <a:off x="4956786" y="3927336"/>
+                  <a:ext cx="891591" cy="465577"/>
+                </a:xfrm>
+                <a:prstGeom prst="rect">
+                  <a:avLst/>
+                </a:prstGeom>
+                <a:blipFill>
+                  <a:blip r:embed="rId29"/>
+                  <a:stretch>
+                    <a:fillRect l="-8451" r="-4225" b="-23684"/>
+                  </a:stretch>
+                </a:blipFill>
+              </p:spPr>
+              <p:txBody>
+                <a:bodyPr/>
+                <a:lstStyle/>
+                <a:p>
+                  <a:r>
+                    <a:rPr lang="en-US">
+                      <a:noFill/>
+                    </a:rPr>
+                    <a:t> </a:t>
+                  </a:r>
+                </a:p>
+              </p:txBody>
+            </p:sp>
+          </mc:Fallback>
+        </mc:AlternateContent>
+        <p:cxnSp>
+          <p:nvCxnSpPr>
+            <p:cNvPr id="60" name="Straight Arrow Connector 59">
+              <a:extLst>
+                <a:ext uri="{FF2B5EF4-FFF2-40B4-BE49-F238E27FC236}">
+                  <a16:creationId xmlns:a16="http://schemas.microsoft.com/office/drawing/2014/main" id="{30B18DFF-2DA1-DE13-707F-8D7021E5E292}"/>
+                </a:ext>
+              </a:extLst>
+            </p:cNvPr>
+            <p:cNvCxnSpPr>
+              <a:cxnSpLocks/>
+            </p:cNvCxnSpPr>
+            <p:nvPr/>
+          </p:nvCxnSpPr>
+          <p:spPr>
+            <a:xfrm flipV="1">
+              <a:off x="4688572" y="3957986"/>
+              <a:ext cx="1209057" cy="23608"/>
+            </a:xfrm>
+            <a:prstGeom prst="straightConnector1">
+              <a:avLst/>
+            </a:prstGeom>
+            <a:ln w="38100">
+              <a:solidFill>
+                <a:schemeClr val="tx1"/>
+              </a:solidFill>
+              <a:prstDash val="sysDot"/>
+              <a:headEnd type="triangle"/>
+              <a:tailEnd type="triangle"/>
+            </a:ln>
+          </p:spPr>
+          <p:style>
+            <a:lnRef idx="1">
+              <a:schemeClr val="accent1"/>
+            </a:lnRef>
+            <a:fillRef idx="0">
+              <a:schemeClr val="accent1"/>
+            </a:fillRef>
+            <a:effectRef idx="0">
+              <a:schemeClr val="accent1"/>
+            </a:effectRef>
+            <a:fontRef idx="minor">
+              <a:schemeClr val="tx1"/>
+            </a:fontRef>
+          </p:style>
+        </p:cxnSp>
+      </p:grpSp>
+    </p:spTree>
+    <p:extLst>
+      <p:ext uri="{BB962C8B-B14F-4D97-AF65-F5344CB8AC3E}">
+        <p14:creationId xmlns:p14="http://schemas.microsoft.com/office/powerpoint/2010/main" val="2666939569"/>
+      </p:ext>
+    </p:extLst>
+  </p:cSld>
+  <p:clrMapOvr>
+    <a:masterClrMapping/>
+  </p:clrMapOvr>
+</p:sld>
+</file>
+
+<file path=ppt/slides/slide3.xml><?xml version="1.0" encoding="utf-8"?>
+<p:sld xmlns:a="http://schemas.openxmlformats.org/drawingml/2006/main" xmlns:r="http://schemas.openxmlformats.org/officeDocument/2006/relationships" xmlns:p="http://schemas.openxmlformats.org/presentationml/2006/main">
+  <p:cSld>
+    <p:spTree>
+      <p:nvGrpSpPr>
+        <p:cNvPr id="1" name=""/>
+        <p:cNvGrpSpPr/>
+        <p:nvPr/>
+      </p:nvGrpSpPr>
+      <p:grpSpPr>
+        <a:xfrm>
+          <a:off x="0" y="0"/>
+          <a:ext cx="0" cy="0"/>
+          <a:chOff x="0" y="0"/>
+          <a:chExt cx="0" cy="0"/>
+        </a:xfrm>
+      </p:grpSpPr>
+      <p:grpSp>
+        <p:nvGrpSpPr>
+          <p:cNvPr id="3" name="Group 2">
+            <a:extLst>
+              <a:ext uri="{FF2B5EF4-FFF2-40B4-BE49-F238E27FC236}">
+                <a16:creationId xmlns:a16="http://schemas.microsoft.com/office/drawing/2014/main" id="{8172F81F-87AB-7FC2-05CC-D6620441649B}"/>
               </a:ext>
             </a:extLst>
           </p:cNvPr>
@@ -4415,8 +7358,8 @@
             </p:txBody>
           </p:sp>
         </p:grpSp>
-        <mc:AlternateContent xmlns:mc="http://schemas.openxmlformats.org/markup-compatibility/2006" xmlns:a14="http://schemas.microsoft.com/office/drawing/2010/main">
-          <mc:Choice Requires="a14">
+        <mc:AlternateContent xmlns:mc="http://schemas.openxmlformats.org/markup-compatibility/2006">
+          <mc:Choice xmlns:a14="http://schemas.microsoft.com/office/drawing/2010/main" Requires="a14">
             <p:sp>
               <p:nvSpPr>
                 <p:cNvPr id="33" name="TextBox 32">
@@ -4508,7 +7451,7 @@
               </p:txBody>
             </p:sp>
           </mc:Choice>
-          <mc:Fallback xmlns="">
+          <mc:Fallback>
             <p:sp>
               <p:nvSpPr>
                 <p:cNvPr id="33" name="TextBox 32">
@@ -4737,8 +7680,8 @@
             </p:style>
           </p:cxnSp>
         </p:grpSp>
-        <mc:AlternateContent xmlns:mc="http://schemas.openxmlformats.org/markup-compatibility/2006" xmlns:a14="http://schemas.microsoft.com/office/drawing/2010/main">
-          <mc:Choice Requires="a14">
+        <mc:AlternateContent xmlns:mc="http://schemas.openxmlformats.org/markup-compatibility/2006">
+          <mc:Choice xmlns:a14="http://schemas.microsoft.com/office/drawing/2010/main" Requires="a14">
             <p:sp>
               <p:nvSpPr>
                 <p:cNvPr id="41" name="TextBox 40">
@@ -4809,7 +7752,7 @@
               </p:txBody>
             </p:sp>
           </mc:Choice>
-          <mc:Fallback xmlns="">
+          <mc:Fallback>
             <p:sp>
               <p:nvSpPr>
                 <p:cNvPr id="41" name="TextBox 40">
@@ -5255,8 +8198,8 @@
             </mc:AlternateContent>
           </p:grpSp>
         </p:grpSp>
-        <mc:AlternateContent xmlns:mc="http://schemas.openxmlformats.org/markup-compatibility/2006" xmlns:a14="http://schemas.microsoft.com/office/drawing/2010/main">
-          <mc:Choice Requires="a14">
+        <mc:AlternateContent xmlns:mc="http://schemas.openxmlformats.org/markup-compatibility/2006">
+          <mc:Choice xmlns:a14="http://schemas.microsoft.com/office/drawing/2010/main" Requires="a14">
             <p:sp>
               <p:nvSpPr>
                 <p:cNvPr id="59" name="TextBox 58">
@@ -5327,7 +8270,7 @@
               </p:txBody>
             </p:sp>
           </mc:Choice>
-          <mc:Fallback xmlns="">
+          <mc:Fallback>
             <p:sp>
               <p:nvSpPr>
                 <p:cNvPr id="59" name="TextBox 58">
@@ -5372,8 +8315,8 @@
             </p:sp>
           </mc:Fallback>
         </mc:AlternateContent>
-        <mc:AlternateContent xmlns:mc="http://schemas.openxmlformats.org/markup-compatibility/2006" xmlns:a14="http://schemas.microsoft.com/office/drawing/2010/main">
-          <mc:Choice Requires="a14">
+        <mc:AlternateContent xmlns:mc="http://schemas.openxmlformats.org/markup-compatibility/2006">
+          <mc:Choice xmlns:a14="http://schemas.microsoft.com/office/drawing/2010/main" Requires="a14">
             <p:sp>
               <p:nvSpPr>
                 <p:cNvPr id="60" name="TextBox 59">
@@ -5444,7 +8387,7 @@
               </p:txBody>
             </p:sp>
           </mc:Choice>
-          <mc:Fallback xmlns="">
+          <mc:Fallback>
             <p:sp>
               <p:nvSpPr>
                 <p:cNvPr id="60" name="TextBox 59">
@@ -5489,8 +8432,8 @@
             </p:sp>
           </mc:Fallback>
         </mc:AlternateContent>
-        <mc:AlternateContent xmlns:mc="http://schemas.openxmlformats.org/markup-compatibility/2006" xmlns:a14="http://schemas.microsoft.com/office/drawing/2010/main">
-          <mc:Choice Requires="a14">
+        <mc:AlternateContent xmlns:mc="http://schemas.openxmlformats.org/markup-compatibility/2006">
+          <mc:Choice xmlns:a14="http://schemas.microsoft.com/office/drawing/2010/main" Requires="a14">
             <p:sp>
               <p:nvSpPr>
                 <p:cNvPr id="61" name="TextBox 60">
@@ -5561,7 +8504,7 @@
               </p:txBody>
             </p:sp>
           </mc:Choice>
-          <mc:Fallback xmlns="">
+          <mc:Fallback>
             <p:sp>
               <p:nvSpPr>
                 <p:cNvPr id="61" name="TextBox 60">
@@ -5606,8 +8549,8 @@
             </p:sp>
           </mc:Fallback>
         </mc:AlternateContent>
-        <mc:AlternateContent xmlns:mc="http://schemas.openxmlformats.org/markup-compatibility/2006" xmlns:a14="http://schemas.microsoft.com/office/drawing/2010/main">
-          <mc:Choice Requires="a14">
+        <mc:AlternateContent xmlns:mc="http://schemas.openxmlformats.org/markup-compatibility/2006">
+          <mc:Choice xmlns:a14="http://schemas.microsoft.com/office/drawing/2010/main" Requires="a14">
             <p:sp>
               <p:nvSpPr>
                 <p:cNvPr id="62" name="TextBox 61">
@@ -5678,7 +8621,7 @@
               </p:txBody>
             </p:sp>
           </mc:Choice>
-          <mc:Fallback xmlns="">
+          <mc:Fallback>
             <p:sp>
               <p:nvSpPr>
                 <p:cNvPr id="62" name="TextBox 61">
@@ -7840,364 +10783,45 @@
           </p:grpSp>
         </p:grpSp>
       </p:grpSp>
+      <p:sp>
+        <p:nvSpPr>
+          <p:cNvPr id="2" name="TextBox 1">
+            <a:extLst>
+              <a:ext uri="{FF2B5EF4-FFF2-40B4-BE49-F238E27FC236}">
+                <a16:creationId xmlns:a16="http://schemas.microsoft.com/office/drawing/2014/main" id="{421EBB2D-8B35-38F2-6F34-409C199BD9A1}"/>
+              </a:ext>
+            </a:extLst>
+          </p:cNvPr>
+          <p:cNvSpPr txBox="1"/>
+          <p:nvPr/>
+        </p:nvSpPr>
+        <p:spPr>
+          <a:xfrm>
+            <a:off x="736600" y="313267"/>
+            <a:ext cx="785793" cy="369332"/>
+          </a:xfrm>
+          <a:prstGeom prst="rect">
+            <a:avLst/>
+          </a:prstGeom>
+          <a:noFill/>
+        </p:spPr>
+        <p:txBody>
+          <a:bodyPr wrap="none" rtlCol="0">
+            <a:spAutoFit/>
+          </a:bodyPr>
+          <a:lstStyle/>
+          <a:p>
+            <a:r>
+              <a:rPr lang="en-US" dirty="0"/>
+              <a:t>Fig. S1</a:t>
+            </a:r>
+          </a:p>
+        </p:txBody>
+      </p:sp>
     </p:spTree>
     <p:extLst>
       <p:ext uri="{BB962C8B-B14F-4D97-AF65-F5344CB8AC3E}">
         <p14:creationId xmlns:p14="http://schemas.microsoft.com/office/powerpoint/2010/main" val="690115939"/>
-      </p:ext>
-    </p:extLst>
-  </p:cSld>
-  <p:clrMapOvr>
-    <a:masterClrMapping/>
-  </p:clrMapOvr>
-</p:sld>
-</file>
-
-<file path=ppt/slides/slide2.xml><?xml version="1.0" encoding="utf-8"?>
-<p:sld xmlns:a="http://schemas.openxmlformats.org/drawingml/2006/main" xmlns:r="http://schemas.openxmlformats.org/officeDocument/2006/relationships" xmlns:p="http://schemas.openxmlformats.org/presentationml/2006/main">
-  <p:cSld>
-    <p:spTree>
-      <p:nvGrpSpPr>
-        <p:cNvPr id="1" name=""/>
-        <p:cNvGrpSpPr/>
-        <p:nvPr/>
-      </p:nvGrpSpPr>
-      <p:grpSpPr>
-        <a:xfrm>
-          <a:off x="0" y="0"/>
-          <a:ext cx="0" cy="0"/>
-          <a:chOff x="0" y="0"/>
-          <a:chExt cx="0" cy="0"/>
-        </a:xfrm>
-      </p:grpSpPr>
-      <p:grpSp>
-        <p:nvGrpSpPr>
-          <p:cNvPr id="98" name="Group 97">
-            <a:extLst>
-              <a:ext uri="{FF2B5EF4-FFF2-40B4-BE49-F238E27FC236}">
-                <a16:creationId xmlns:a16="http://schemas.microsoft.com/office/drawing/2014/main" id="{6D10865E-9C54-C6B5-8D89-B894D1A0C51D}"/>
-              </a:ext>
-            </a:extLst>
-          </p:cNvPr>
-          <p:cNvGrpSpPr/>
-          <p:nvPr/>
-        </p:nvGrpSpPr>
-        <p:grpSpPr>
-          <a:xfrm>
-            <a:off x="-221209" y="1054160"/>
-            <a:ext cx="11871730" cy="4904243"/>
-            <a:chOff x="-221209" y="1054160"/>
-            <a:chExt cx="11871730" cy="4904243"/>
-          </a:xfrm>
-        </p:grpSpPr>
-        <p:pic>
-          <p:nvPicPr>
-            <p:cNvPr id="25" name="Picture 24" descr="A white rectangular object with holes&#10;&#10;Description automatically generated">
-              <a:extLst>
-                <a:ext uri="{FF2B5EF4-FFF2-40B4-BE49-F238E27FC236}">
-                  <a16:creationId xmlns:a16="http://schemas.microsoft.com/office/drawing/2014/main" id="{2D9BC8EB-40E5-6AA8-8B2A-80D6CDEA5820}"/>
-                </a:ext>
-              </a:extLst>
-            </p:cNvPr>
-            <p:cNvPicPr>
-              <a:picLocks noChangeAspect="1"/>
-            </p:cNvPicPr>
-            <p:nvPr/>
-          </p:nvPicPr>
-          <p:blipFill>
-            <a:blip r:embed="rId2"/>
-            <a:stretch>
-              <a:fillRect/>
-            </a:stretch>
-          </p:blipFill>
-          <p:spPr>
-            <a:xfrm>
-              <a:off x="954202" y="1586428"/>
-              <a:ext cx="7772400" cy="4371975"/>
-            </a:xfrm>
-            <a:prstGeom prst="rect">
-              <a:avLst/>
-            </a:prstGeom>
-          </p:spPr>
-        </p:pic>
-        <p:pic>
-          <p:nvPicPr>
-            <p:cNvPr id="38" name="Picture 37">
-              <a:extLst>
-                <a:ext uri="{FF2B5EF4-FFF2-40B4-BE49-F238E27FC236}">
-                  <a16:creationId xmlns:a16="http://schemas.microsoft.com/office/drawing/2014/main" id="{85C2701C-37F5-0A0B-E59D-3B4322C0BA15}"/>
-                </a:ext>
-              </a:extLst>
-            </p:cNvPr>
-            <p:cNvPicPr>
-              <a:picLocks noChangeAspect="1"/>
-            </p:cNvPicPr>
-            <p:nvPr/>
-          </p:nvPicPr>
-          <p:blipFill>
-            <a:blip r:embed="rId3"/>
-            <a:stretch>
-              <a:fillRect/>
-            </a:stretch>
-          </p:blipFill>
-          <p:spPr>
-            <a:xfrm rot="21440853">
-              <a:off x="-213814" y="1054160"/>
-              <a:ext cx="10287000" cy="1824162"/>
-            </a:xfrm>
-            <a:prstGeom prst="rect">
-              <a:avLst/>
-            </a:prstGeom>
-          </p:spPr>
-        </p:pic>
-        <p:pic>
-          <p:nvPicPr>
-            <p:cNvPr id="50" name="Picture 49">
-              <a:extLst>
-                <a:ext uri="{FF2B5EF4-FFF2-40B4-BE49-F238E27FC236}">
-                  <a16:creationId xmlns:a16="http://schemas.microsoft.com/office/drawing/2014/main" id="{E62967B4-6E6D-B7E8-8FCB-13850A2E8B4B}"/>
-                </a:ext>
-              </a:extLst>
-            </p:cNvPr>
-            <p:cNvPicPr>
-              <a:picLocks noChangeAspect="1"/>
-            </p:cNvPicPr>
-            <p:nvPr/>
-          </p:nvPicPr>
-          <p:blipFill>
-            <a:blip r:embed="rId4"/>
-            <a:stretch>
-              <a:fillRect/>
-            </a:stretch>
-          </p:blipFill>
-          <p:spPr>
-            <a:xfrm>
-              <a:off x="-221209" y="2168633"/>
-              <a:ext cx="10287000" cy="1828800"/>
-            </a:xfrm>
-            <a:prstGeom prst="rect">
-              <a:avLst/>
-            </a:prstGeom>
-          </p:spPr>
-        </p:pic>
-        <p:pic>
-          <p:nvPicPr>
-            <p:cNvPr id="52" name="Picture 51">
-              <a:extLst>
-                <a:ext uri="{FF2B5EF4-FFF2-40B4-BE49-F238E27FC236}">
-                  <a16:creationId xmlns:a16="http://schemas.microsoft.com/office/drawing/2014/main" id="{D73A6E5A-0449-064D-38CA-3CBCFBA4990D}"/>
-                </a:ext>
-              </a:extLst>
-            </p:cNvPr>
-            <p:cNvPicPr>
-              <a:picLocks/>
-            </p:cNvPicPr>
-            <p:nvPr/>
-          </p:nvPicPr>
-          <p:blipFill>
-            <a:blip r:embed="rId5"/>
-            <a:stretch>
-              <a:fillRect/>
-            </a:stretch>
-          </p:blipFill>
-          <p:spPr>
-            <a:xfrm rot="21370177">
-              <a:off x="-201311" y="3511615"/>
-              <a:ext cx="10287000" cy="1828800"/>
-            </a:xfrm>
-            <a:prstGeom prst="rect">
-              <a:avLst/>
-            </a:prstGeom>
-          </p:spPr>
-        </p:pic>
-        <p:sp>
-          <p:nvSpPr>
-            <p:cNvPr id="53" name="Right Arrow 52">
-              <a:extLst>
-                <a:ext uri="{FF2B5EF4-FFF2-40B4-BE49-F238E27FC236}">
-                  <a16:creationId xmlns:a16="http://schemas.microsoft.com/office/drawing/2014/main" id="{E3E0622D-AAA4-284A-AC79-368C5B0C17B6}"/>
-                </a:ext>
-              </a:extLst>
-            </p:cNvPr>
-            <p:cNvSpPr/>
-            <p:nvPr/>
-          </p:nvSpPr>
-          <p:spPr>
-            <a:xfrm>
-              <a:off x="8914130" y="3125850"/>
-              <a:ext cx="736979" cy="914400"/>
-            </a:xfrm>
-            <a:prstGeom prst="rightArrow">
-              <a:avLst/>
-            </a:prstGeom>
-            <a:solidFill>
-              <a:schemeClr val="tx1"/>
-            </a:solidFill>
-            <a:ln>
-              <a:noFill/>
-            </a:ln>
-          </p:spPr>
-          <p:style>
-            <a:lnRef idx="2">
-              <a:schemeClr val="accent1">
-                <a:shade val="15000"/>
-              </a:schemeClr>
-            </a:lnRef>
-            <a:fillRef idx="1">
-              <a:schemeClr val="accent1"/>
-            </a:fillRef>
-            <a:effectRef idx="0">
-              <a:schemeClr val="accent1"/>
-            </a:effectRef>
-            <a:fontRef idx="minor">
-              <a:schemeClr val="lt1"/>
-            </a:fontRef>
-          </p:style>
-          <p:txBody>
-            <a:bodyPr rtlCol="0" anchor="ctr"/>
-            <a:lstStyle/>
-            <a:p>
-              <a:pPr algn="ctr"/>
-              <a:endParaRPr lang="en-US"/>
-            </a:p>
-          </p:txBody>
-        </p:sp>
-        <mc:AlternateContent xmlns:mc="http://schemas.openxmlformats.org/markup-compatibility/2006">
-          <mc:Choice xmlns:a14="http://schemas.microsoft.com/office/drawing/2010/main" Requires="a14">
-            <p:sp>
-              <p:nvSpPr>
-                <p:cNvPr id="96" name="TextBox 95">
-                  <a:extLst>
-                    <a:ext uri="{FF2B5EF4-FFF2-40B4-BE49-F238E27FC236}">
-                      <a16:creationId xmlns:a16="http://schemas.microsoft.com/office/drawing/2014/main" id="{4A6A9771-030F-7D14-3CF1-31913C3E6F8B}"/>
-                    </a:ext>
-                  </a:extLst>
-                </p:cNvPr>
-                <p:cNvSpPr txBox="1"/>
-                <p:nvPr/>
-              </p:nvSpPr>
-              <p:spPr>
-                <a:xfrm>
-                  <a:off x="9688509" y="3047134"/>
-                  <a:ext cx="1962012" cy="1071832"/>
-                </a:xfrm>
-                <a:prstGeom prst="rect">
-                  <a:avLst/>
-                </a:prstGeom>
-                <a:noFill/>
-              </p:spPr>
-              <p:txBody>
-                <a:bodyPr wrap="none" lIns="0" tIns="0" rIns="0" bIns="0" rtlCol="0">
-                  <a:spAutoFit/>
-                </a:bodyPr>
-                <a:lstStyle/>
-                <a:p>
-                  <a14:m>
-                    <m:oMathPara xmlns:m="http://schemas.openxmlformats.org/officeDocument/2006/math">
-                      <m:oMathParaPr>
-                        <m:jc m:val="centerGroup"/>
-                      </m:oMathParaPr>
-                      <m:oMath xmlns:m="http://schemas.openxmlformats.org/officeDocument/2006/math">
-                        <m:r>
-                          <a:rPr lang="en-US" sz="5400" b="0" i="1" baseline="0" smtClean="0">
-                            <a:latin typeface="Cambria Math" panose="02040503050406030204" pitchFamily="18" charset="0"/>
-                          </a:rPr>
-                          <m:t>𝛥</m:t>
-                        </m:r>
-                        <m:sSubSup>
-                          <m:sSubSupPr>
-                            <m:ctrlPr>
-                              <a:rPr lang="en-US" sz="5400" i="1" smtClean="0">
-                                <a:latin typeface="Cambria Math" panose="02040503050406030204" pitchFamily="18" charset="0"/>
-                              </a:rPr>
-                            </m:ctrlPr>
-                          </m:sSubSupPr>
-                          <m:e>
-                            <m:r>
-                              <a:rPr lang="en-US" sz="5400" b="0" i="1" baseline="0" smtClean="0">
-                                <a:latin typeface="Cambria Math" panose="02040503050406030204" pitchFamily="18" charset="0"/>
-                              </a:rPr>
-                              <m:t>𝐺</m:t>
-                            </m:r>
-                          </m:e>
-                          <m:sub>
-                            <m:r>
-                              <a:rPr lang="en-US" sz="5400" b="0" i="1" baseline="0" smtClean="0">
-                                <a:latin typeface="Cambria Math" panose="02040503050406030204" pitchFamily="18" charset="0"/>
-                              </a:rPr>
-                              <m:t>𝑒𝑓𝑓</m:t>
-                            </m:r>
-                          </m:sub>
-                          <m:sup>
-                            <m:r>
-                              <a:rPr lang="en-US" sz="5400" b="0" i="1" baseline="0" smtClean="0">
-                                <a:latin typeface="Cambria Math" panose="02040503050406030204" pitchFamily="18" charset="0"/>
-                                <a:ea typeface="Cambria Math" panose="02040503050406030204" pitchFamily="18" charset="0"/>
-                              </a:rPr>
-                              <m:t>‡</m:t>
-                            </m:r>
-                          </m:sup>
-                        </m:sSubSup>
-                      </m:oMath>
-                    </m:oMathPara>
-                  </a14:m>
-                  <a:endParaRPr lang="en-US" sz="5400" i="1" dirty="0">
-                    <a:latin typeface="Helvetica" pitchFamily="2" charset="0"/>
-                  </a:endParaRPr>
-                </a:p>
-              </p:txBody>
-            </p:sp>
-          </mc:Choice>
-          <mc:Fallback>
-            <p:sp>
-              <p:nvSpPr>
-                <p:cNvPr id="96" name="TextBox 95">
-                  <a:extLst>
-                    <a:ext uri="{FF2B5EF4-FFF2-40B4-BE49-F238E27FC236}">
-                      <a16:creationId xmlns:a16="http://schemas.microsoft.com/office/drawing/2014/main" id="{4A6A9771-030F-7D14-3CF1-31913C3E6F8B}"/>
-                    </a:ext>
-                  </a:extLst>
-                </p:cNvPr>
-                <p:cNvSpPr txBox="1">
-                  <a:spLocks noRot="1" noChangeAspect="1" noMove="1" noResize="1" noEditPoints="1" noAdjustHandles="1" noChangeArrowheads="1" noChangeShapeType="1" noTextEdit="1"/>
-                </p:cNvSpPr>
-                <p:nvPr/>
-              </p:nvSpPr>
-              <p:spPr>
-                <a:xfrm>
-                  <a:off x="9688509" y="3047134"/>
-                  <a:ext cx="1962012" cy="1071832"/>
-                </a:xfrm>
-                <a:prstGeom prst="rect">
-                  <a:avLst/>
-                </a:prstGeom>
-                <a:blipFill>
-                  <a:blip r:embed="rId6"/>
-                  <a:stretch>
-                    <a:fillRect l="-6410" t="-1176" r="-3846" b="-20000"/>
-                  </a:stretch>
-                </a:blipFill>
-              </p:spPr>
-              <p:txBody>
-                <a:bodyPr/>
-                <a:lstStyle/>
-                <a:p>
-                  <a:r>
-                    <a:rPr lang="en-US">
-                      <a:noFill/>
-                    </a:rPr>
-                    <a:t> </a:t>
-                  </a:r>
-                </a:p>
-              </p:txBody>
-            </p:sp>
-          </mc:Fallback>
-        </mc:AlternateContent>
-      </p:grpSp>
-    </p:spTree>
-    <p:extLst>
-      <p:ext uri="{BB962C8B-B14F-4D97-AF65-F5344CB8AC3E}">
-        <p14:creationId xmlns:p14="http://schemas.microsoft.com/office/powerpoint/2010/main" val="985779647"/>
       </p:ext>
     </p:extLst>
   </p:cSld>

</xml_diff>